<commit_message>
Refresh EDA deck with visuals and styling
</commit_message>
<xml_diff>
--- a/presentation/eda_story/eda_story.pptx
+++ b/presentation/eda_story/eda_story.pptx
@@ -25,6 +25,7 @@
     <p:sldId id="273" r:id="rId19"/>
     <p:sldId id="274" r:id="rId20"/>
     <p:sldId id="275" r:id="rId21"/>
+    <p:sldId id="276" r:id="rId22"/>
   </p:sldIdLst>
   <p:sldSz cx="9144000" cy="6858000" type="screen4x3"/>
   <p:notesSz cx="6858000" cy="9144000"/>
@@ -3116,6 +3117,14 @@
 <file path=ppt/slides/slide1.xml><?xml version="1.0" encoding="utf-8"?>
 <p:sld xmlns:a="http://schemas.openxmlformats.org/drawingml/2006/main" xmlns:r="http://schemas.openxmlformats.org/officeDocument/2006/relationships" xmlns:p="http://schemas.openxmlformats.org/presentationml/2006/main">
   <p:cSld>
+    <p:bg>
+      <p:bgPr>
+        <a:solidFill>
+          <a:srgbClr val="10212B"/>
+        </a:solidFill>
+        <a:effectLst/>
+      </p:bgPr>
+    </p:bg>
     <p:spTree>
       <p:nvGrpSpPr>
         <p:cNvPr id="1" name=""/>
@@ -3152,58 +3161,115 @@
           <a:p>
             <a:pPr lvl="0" marL="0" indent="0">
               <a:buNone/>
+              <a:defRPr sz="4400">
+                <a:solidFill>
+                  <a:srgbClr val="EDF2F7"/>
+                </a:solidFill>
+              </a:defRPr>
             </a:pPr>
             <a:r>
-              <a:rPr/>
-              <a:t>EDA</a:t>
-            </a:r>
-            <a:r>
-              <a:rPr/>
+              <a:rPr sz="2800">
+                <a:solidFill>
+                  <a:srgbClr val="E0E7EC"/>
+                </a:solidFill>
+              </a:rPr>
+              <a:t>Exploratory</a:t>
+            </a:r>
+            <a:r>
+              <a:rPr sz="2800">
+                <a:solidFill>
+                  <a:srgbClr val="E0E7EC"/>
+                </a:solidFill>
+              </a:rPr>
               <a:t> </a:t>
             </a:r>
             <a:r>
-              <a:rPr/>
+              <a:rPr sz="2800">
+                <a:solidFill>
+                  <a:srgbClr val="E0E7EC"/>
+                </a:solidFill>
+              </a:rPr>
+              <a:t>Data</a:t>
+            </a:r>
+            <a:r>
+              <a:rPr sz="2800">
+                <a:solidFill>
+                  <a:srgbClr val="E0E7EC"/>
+                </a:solidFill>
+              </a:rPr>
+              <a:t> </a:t>
+            </a:r>
+            <a:r>
+              <a:rPr sz="2800">
+                <a:solidFill>
+                  <a:srgbClr val="E0E7EC"/>
+                </a:solidFill>
+              </a:rPr>
               <a:t>Story</a:t>
             </a:r>
             <a:r>
-              <a:rPr/>
+              <a:rPr sz="2800">
+                <a:solidFill>
+                  <a:srgbClr val="E0E7EC"/>
+                </a:solidFill>
+              </a:rPr>
               <a:t> </a:t>
             </a:r>
             <a:r>
-              <a:rPr/>
+              <a:rPr sz="2800">
+                <a:solidFill>
+                  <a:srgbClr val="E0E7EC"/>
+                </a:solidFill>
+              </a:rPr>
               <a:t>–</a:t>
             </a:r>
             <a:r>
-              <a:rPr/>
+              <a:rPr sz="2800">
+                <a:solidFill>
+                  <a:srgbClr val="E0E7EC"/>
+                </a:solidFill>
+              </a:rPr>
               <a:t> </a:t>
             </a:r>
             <a:r>
-              <a:rPr/>
-              <a:t>ML</a:t>
-            </a:r>
-            <a:r>
-              <a:rPr/>
+              <a:rPr sz="2800">
+                <a:solidFill>
+                  <a:srgbClr val="E0E7EC"/>
+                </a:solidFill>
+              </a:rPr>
+              <a:t>Soil</a:t>
+            </a:r>
+            <a:r>
+              <a:rPr sz="2800">
+                <a:solidFill>
+                  <a:srgbClr val="E0E7EC"/>
+                </a:solidFill>
+              </a:rPr>
               <a:t> </a:t>
             </a:r>
             <a:r>
-              <a:rPr/>
-              <a:t>IoT</a:t>
-            </a:r>
-            <a:r>
-              <a:rPr/>
+              <a:rPr sz="2800">
+                <a:solidFill>
+                  <a:srgbClr val="E0E7EC"/>
+                </a:solidFill>
+              </a:rPr>
+              <a:t>Moisture</a:t>
+            </a:r>
+            <a:r>
+              <a:rPr sz="2800">
+                <a:solidFill>
+                  <a:srgbClr val="E0E7EC"/>
+                </a:solidFill>
+              </a:rPr>
               <a:t> </a:t>
             </a:r>
             <a:r>
-              <a:rPr/>
-              <a:t>Independent</a:t>
-            </a:r>
-            <a:r>
-              <a:rPr/>
-              <a:t> </a:t>
-            </a:r>
-            <a:r>
-              <a:rPr/>
-              <a:t>Study</a:t>
+              <a:rPr sz="2800">
+                <a:solidFill>
+                  <a:srgbClr val="E0E7EC"/>
+                </a:solidFill>
+              </a:rPr>
+              <a:t>LSTM</a:t>
             </a:r>
           </a:p>
         </p:txBody>
@@ -3230,19 +3296,36 @@
           <a:p>
             <a:pPr lvl="0" marL="0" indent="0">
               <a:buNone/>
+              <a:defRPr sz="2800">
+                <a:solidFill>
+                  <a:srgbClr val="E0E7EC"/>
+                </a:solidFill>
+              </a:defRPr>
             </a:pPr>
             <a:br/>
             <a:br/>
             <a:r>
-              <a:rPr/>
+              <a:rPr sz="2800">
+                <a:solidFill>
+                  <a:srgbClr val="E0E7EC"/>
+                </a:solidFill>
+              </a:rPr>
               <a:t>Bryan</a:t>
             </a:r>
             <a:r>
-              <a:rPr/>
+              <a:rPr sz="2800">
+                <a:solidFill>
+                  <a:srgbClr val="E0E7EC"/>
+                </a:solidFill>
+              </a:rPr>
               <a:t> </a:t>
             </a:r>
             <a:r>
-              <a:rPr/>
+              <a:rPr sz="2800">
+                <a:solidFill>
+                  <a:srgbClr val="E0E7EC"/>
+                </a:solidFill>
+              </a:rPr>
               <a:t>Nsoh</a:t>
             </a:r>
           </a:p>
@@ -3256,6 +3339,14 @@
 <file path=ppt/slides/slide10.xml><?xml version="1.0" encoding="utf-8"?>
 <p:sld xmlns:a="http://schemas.openxmlformats.org/drawingml/2006/main" xmlns:r="http://schemas.openxmlformats.org/officeDocument/2006/relationships" xmlns:p="http://schemas.openxmlformats.org/presentationml/2006/main">
   <p:cSld>
+    <p:bg>
+      <p:bgPr>
+        <a:solidFill>
+          <a:srgbClr val="10212B"/>
+        </a:solidFill>
+        <a:effectLst/>
+      </p:bgPr>
+    </p:bg>
     <p:spTree>
       <p:nvGrpSpPr>
         <p:cNvPr id="1" name=""/>
@@ -3287,41 +3378,426 @@
           <a:p>
             <a:pPr lvl="0" marL="0" indent="0">
               <a:buNone/>
+              <a:defRPr sz="4400">
+                <a:solidFill>
+                  <a:srgbClr val="EDF2F7"/>
+                </a:solidFill>
+              </a:defRPr>
             </a:pPr>
             <a:r>
-              <a:rPr/>
-              <a:t>Model</a:t>
-            </a:r>
-            <a:r>
-              <a:rPr/>
+              <a:rPr sz="2800">
+                <a:solidFill>
+                  <a:srgbClr val="E0E7EC"/>
+                </a:solidFill>
+              </a:rPr>
+              <a:t>Domain-Specific</a:t>
+            </a:r>
+            <a:r>
+              <a:rPr sz="2800">
+                <a:solidFill>
+                  <a:srgbClr val="E0E7EC"/>
+                </a:solidFill>
+              </a:rPr>
               <a:t> </a:t>
             </a:r>
             <a:r>
-              <a:rPr/>
+              <a:rPr sz="2800">
+                <a:solidFill>
+                  <a:srgbClr val="E0E7EC"/>
+                </a:solidFill>
+              </a:rPr>
+              <a:t>Transforms</a:t>
+            </a:r>
+          </a:p>
+        </p:txBody>
+      </p:sp>
+      <p:sp>
+        <p:nvSpPr>
+          <p:cNvPr id="3" name="Content Placeholder 2"/>
+          <p:cNvSpPr>
+            <a:spLocks noGrp="1"/>
+          </p:cNvSpPr>
+          <p:nvPr>
+            <p:ph idx="1"/>
+          </p:nvPr>
+        </p:nvSpPr>
+        <p:spPr/>
+        <p:txBody>
+          <a:bodyPr/>
+          <a:lstStyle/>
+          <a:p>
+            <a:pPr lvl="1">
+              <a:defRPr sz="2400">
+                <a:solidFill>
+                  <a:srgbClr val="E0E7EC"/>
+                </a:solidFill>
+              </a:defRPr>
+            </a:pPr>
+            <a:r>
+              <a:rPr sz="2400">
+                <a:solidFill>
+                  <a:srgbClr val="E0E7EC"/>
+                </a:solidFill>
+              </a:rPr>
+              <a:t>Center each VWC depth per plot to learn deviations, not absolute bias</a:t>
+            </a:r>
+          </a:p>
+          <a:p>
+            <a:pPr lvl="1">
+              <a:defRPr sz="2400">
+                <a:solidFill>
+                  <a:srgbClr val="E0E7EC"/>
+                </a:solidFill>
+              </a:defRPr>
+            </a:pPr>
+            <a:r>
+              <a:rPr sz="2400">
+                <a:solidFill>
+                  <a:srgbClr val="E0E7EC"/>
+                </a:solidFill>
+              </a:rPr>
+              <a:t>Derivatives teach the LSTM to sense drying velocity</a:t>
+            </a:r>
+          </a:p>
+          <a:p>
+            <a:pPr lvl="1">
+              <a:defRPr sz="2400">
+                <a:solidFill>
+                  <a:srgbClr val="E0E7EC"/>
+                </a:solidFill>
+              </a:defRPr>
+            </a:pPr>
+            <a:r>
+              <a:rPr sz="2400">
+                <a:solidFill>
+                  <a:srgbClr val="E0E7EC"/>
+                </a:solidFill>
+              </a:rPr>
+              <a:t>Binary irrigation flag tells the network when actuators fired</a:t>
+            </a:r>
+          </a:p>
+          <a:p>
+            <a:pPr lvl="0" marL="0" indent="0">
+              <a:buNone/>
+              <a:defRPr sz="2800">
+                <a:solidFill>
+                  <a:srgbClr val="E0E7EC"/>
+                </a:solidFill>
+              </a:defRPr>
+            </a:pPr>
+            <a:r>
+              <a:rPr sz="2800">
+                <a:solidFill>
+                  <a:srgbClr val="E0E7EC"/>
+                </a:solidFill>
+              </a:rPr>
+              <a:t>[ _d(t) = _d(t) - _d(t-1) (t) = ((t) + 1) ]</a:t>
+            </a:r>
+          </a:p>
+        </p:txBody>
+      </p:sp>
+    </p:spTree>
+  </p:cSld>
+</p:sld>
+</file>
+
+<file path=ppt/slides/slide11.xml><?xml version="1.0" encoding="utf-8"?>
+<p:sld xmlns:a="http://schemas.openxmlformats.org/drawingml/2006/main" xmlns:r="http://schemas.openxmlformats.org/officeDocument/2006/relationships" xmlns:p="http://schemas.openxmlformats.org/presentationml/2006/main">
+  <p:cSld>
+    <p:bg>
+      <p:bgPr>
+        <a:solidFill>
+          <a:srgbClr val="10212B"/>
+        </a:solidFill>
+        <a:effectLst/>
+      </p:bgPr>
+    </p:bg>
+    <p:spTree>
+      <p:nvGrpSpPr>
+        <p:cNvPr id="1" name=""/>
+        <p:cNvGrpSpPr/>
+        <p:nvPr/>
+      </p:nvGrpSpPr>
+      <p:grpSpPr>
+        <a:xfrm>
+          <a:off x="0" y="0"/>
+          <a:ext cx="0" cy="0"/>
+          <a:chOff x="0" y="0"/>
+          <a:chExt cx="0" cy="0"/>
+        </a:xfrm>
+      </p:grpSpPr>
+      <p:sp>
+        <p:nvSpPr>
+          <p:cNvPr id="2" name="Title 1"/>
+          <p:cNvSpPr>
+            <a:spLocks noGrp="1"/>
+          </p:cNvSpPr>
+          <p:nvPr>
+            <p:ph type="title"/>
+          </p:nvPr>
+        </p:nvSpPr>
+        <p:spPr/>
+        <p:txBody>
+          <a:bodyPr/>
+          <a:lstStyle/>
+          <a:p>
+            <a:pPr lvl="0" marL="0" indent="0">
+              <a:buNone/>
+              <a:defRPr sz="4400">
+                <a:solidFill>
+                  <a:srgbClr val="EDF2F7"/>
+                </a:solidFill>
+              </a:defRPr>
+            </a:pPr>
+            <a:r>
+              <a:rPr sz="2800">
+                <a:solidFill>
+                  <a:srgbClr val="E0E7EC"/>
+                </a:solidFill>
+              </a:rPr>
+              <a:t>Modeling</a:t>
+            </a:r>
+            <a:r>
+              <a:rPr sz="2800">
+                <a:solidFill>
+                  <a:srgbClr val="E0E7EC"/>
+                </a:solidFill>
+              </a:rPr>
+              <a:t> </a:t>
+            </a:r>
+            <a:r>
+              <a:rPr sz="2800">
+                <a:solidFill>
+                  <a:srgbClr val="E0E7EC"/>
+                </a:solidFill>
+              </a:rPr>
+              <a:t>Pipeline</a:t>
+            </a:r>
+            <a:r>
+              <a:rPr sz="2800">
+                <a:solidFill>
+                  <a:srgbClr val="E0E7EC"/>
+                </a:solidFill>
+              </a:rPr>
+              <a:t> </a:t>
+            </a:r>
+            <a:r>
+              <a:rPr sz="2800">
+                <a:solidFill>
+                  <a:srgbClr val="E0E7EC"/>
+                </a:solidFill>
+              </a:rPr>
+              <a:t>(Kept</a:t>
+            </a:r>
+            <a:r>
+              <a:rPr sz="2800">
+                <a:solidFill>
+                  <a:srgbClr val="E0E7EC"/>
+                </a:solidFill>
+              </a:rPr>
+              <a:t> </a:t>
+            </a:r>
+            <a:r>
+              <a:rPr sz="2800">
+                <a:solidFill>
+                  <a:srgbClr val="E0E7EC"/>
+                </a:solidFill>
+              </a:rPr>
+              <a:t>Simple)</a:t>
+            </a:r>
+          </a:p>
+        </p:txBody>
+      </p:sp>
+      <p:sp>
+        <p:nvSpPr>
+          <p:cNvPr id="3" name="Content Placeholder 2"/>
+          <p:cNvSpPr>
+            <a:spLocks noGrp="1"/>
+          </p:cNvSpPr>
+          <p:nvPr>
+            <p:ph idx="1"/>
+          </p:nvPr>
+        </p:nvSpPr>
+        <p:spPr/>
+        <p:txBody>
+          <a:bodyPr/>
+          <a:lstStyle/>
+          <a:p>
+            <a:pPr lvl="1">
+              <a:defRPr sz="2400">
+                <a:solidFill>
+                  <a:srgbClr val="E0E7EC"/>
+                </a:solidFill>
+              </a:defRPr>
+            </a:pPr>
+            <a:r>
+              <a:rPr sz="2400">
+                <a:solidFill>
+                  <a:srgbClr val="E0E7EC"/>
+                </a:solidFill>
+              </a:rPr>
+              <a:t>Sliding window: 168 hourly steps () 96-hour horizon</a:t>
+            </a:r>
+          </a:p>
+          <a:p>
+            <a:pPr lvl="1">
+              <a:defRPr sz="2400">
+                <a:solidFill>
+                  <a:srgbClr val="E0E7EC"/>
+                </a:solidFill>
+              </a:defRPr>
+            </a:pPr>
+            <a:r>
+              <a:rPr sz="2400">
+                <a:solidFill>
+                  <a:srgbClr val="E0E7EC"/>
+                </a:solidFill>
+              </a:rPr>
+              <a:t>Heavy regularised LSTM stack (512→64) to respect temporal context</a:t>
+            </a:r>
+          </a:p>
+          <a:p>
+            <a:pPr lvl="1">
+              <a:defRPr sz="2400">
+                <a:solidFill>
+                  <a:srgbClr val="E0E7EC"/>
+                </a:solidFill>
+              </a:defRPr>
+            </a:pPr>
+            <a:r>
+              <a:rPr sz="2400">
+                <a:solidFill>
+                  <a:srgbClr val="E0E7EC"/>
+                </a:solidFill>
+              </a:rPr>
+              <a:t>TimeSeriesSplit intended for leave-one-plot-out (bug limited generalisation – documented in findings)</a:t>
+            </a:r>
+          </a:p>
+        </p:txBody>
+      </p:sp>
+    </p:spTree>
+  </p:cSld>
+</p:sld>
+</file>
+
+<file path=ppt/slides/slide12.xml><?xml version="1.0" encoding="utf-8"?>
+<p:sld xmlns:a="http://schemas.openxmlformats.org/drawingml/2006/main" xmlns:r="http://schemas.openxmlformats.org/officeDocument/2006/relationships" xmlns:p="http://schemas.openxmlformats.org/presentationml/2006/main">
+  <p:cSld>
+    <p:bg>
+      <p:bgPr>
+        <a:solidFill>
+          <a:srgbClr val="10212B"/>
+        </a:solidFill>
+        <a:effectLst/>
+      </p:bgPr>
+    </p:bg>
+    <p:spTree>
+      <p:nvGrpSpPr>
+        <p:cNvPr id="1" name=""/>
+        <p:cNvGrpSpPr/>
+        <p:nvPr/>
+      </p:nvGrpSpPr>
+      <p:grpSpPr>
+        <a:xfrm>
+          <a:off x="0" y="0"/>
+          <a:ext cx="0" cy="0"/>
+          <a:chOff x="0" y="0"/>
+          <a:chExt cx="0" cy="0"/>
+        </a:xfrm>
+      </p:grpSpPr>
+      <p:sp>
+        <p:nvSpPr>
+          <p:cNvPr id="2" name="Title 1"/>
+          <p:cNvSpPr>
+            <a:spLocks noGrp="1"/>
+          </p:cNvSpPr>
+          <p:nvPr>
+            <p:ph type="title"/>
+          </p:nvPr>
+        </p:nvSpPr>
+        <p:spPr/>
+        <p:txBody>
+          <a:bodyPr/>
+          <a:lstStyle/>
+          <a:p>
+            <a:pPr lvl="0" marL="0" indent="0">
+              <a:buNone/>
+              <a:defRPr sz="4400">
+                <a:solidFill>
+                  <a:srgbClr val="EDF2F7"/>
+                </a:solidFill>
+              </a:defRPr>
+            </a:pPr>
+            <a:r>
+              <a:rPr sz="2800">
+                <a:solidFill>
+                  <a:srgbClr val="E0E7EC"/>
+                </a:solidFill>
+              </a:rPr>
+              <a:t>Forecast</a:t>
+            </a:r>
+            <a:r>
+              <a:rPr sz="2800">
+                <a:solidFill>
+                  <a:srgbClr val="E0E7EC"/>
+                </a:solidFill>
+              </a:rPr>
+              <a:t> </a:t>
+            </a:r>
+            <a:r>
+              <a:rPr sz="2800">
+                <a:solidFill>
+                  <a:srgbClr val="E0E7EC"/>
+                </a:solidFill>
+              </a:rPr>
               <a:t>Behaviour</a:t>
             </a:r>
             <a:r>
-              <a:rPr/>
+              <a:rPr sz="2800">
+                <a:solidFill>
+                  <a:srgbClr val="E0E7EC"/>
+                </a:solidFill>
+              </a:rPr>
               <a:t> </a:t>
             </a:r>
             <a:r>
-              <a:rPr/>
+              <a:rPr sz="2800">
+                <a:solidFill>
+                  <a:srgbClr val="E0E7EC"/>
+                </a:solidFill>
+              </a:rPr>
               <a:t>–</a:t>
             </a:r>
             <a:r>
-              <a:rPr/>
+              <a:rPr sz="2800">
+                <a:solidFill>
+                  <a:srgbClr val="E0E7EC"/>
+                </a:solidFill>
+              </a:rPr>
               <a:t> </a:t>
             </a:r>
             <a:r>
-              <a:rPr/>
+              <a:rPr sz="2800">
+                <a:solidFill>
+                  <a:srgbClr val="E0E7EC"/>
+                </a:solidFill>
+              </a:rPr>
               <a:t>Plot</a:t>
             </a:r>
             <a:r>
-              <a:rPr/>
+              <a:rPr sz="2800">
+                <a:solidFill>
+                  <a:srgbClr val="E0E7EC"/>
+                </a:solidFill>
+              </a:rPr>
               <a:t> </a:t>
             </a:r>
             <a:r>
-              <a:rPr/>
+              <a:rPr sz="2800">
+                <a:solidFill>
+                  <a:srgbClr val="E0E7EC"/>
+                </a:solidFill>
+              </a:rPr>
               <a:t>2003</a:t>
             </a:r>
           </a:p>
@@ -3379,49 +3855,98 @@
           <a:p>
             <a:pPr lvl="0" marL="0" indent="0" algn="ctr">
               <a:buNone/>
+              <a:defRPr sz="2800">
+                <a:solidFill>
+                  <a:srgbClr val="E0E7EC"/>
+                </a:solidFill>
+              </a:defRPr>
             </a:pPr>
             <a:r>
-              <a:rPr/>
+              <a:rPr sz="2800">
+                <a:solidFill>
+                  <a:srgbClr val="E0E7EC"/>
+                </a:solidFill>
+              </a:rPr>
               <a:t>Pred</a:t>
             </a:r>
             <a:r>
-              <a:rPr/>
+              <a:rPr sz="2800">
+                <a:solidFill>
+                  <a:srgbClr val="E0E7EC"/>
+                </a:solidFill>
+              </a:rPr>
               <a:t> </a:t>
             </a:r>
             <a:r>
-              <a:rPr/>
+              <a:rPr sz="2800">
+                <a:solidFill>
+                  <a:srgbClr val="E0E7EC"/>
+                </a:solidFill>
+              </a:rPr>
               <a:t>vs</a:t>
             </a:r>
             <a:r>
-              <a:rPr/>
+              <a:rPr sz="2800">
+                <a:solidFill>
+                  <a:srgbClr val="E0E7EC"/>
+                </a:solidFill>
+              </a:rPr>
               <a:t> </a:t>
             </a:r>
             <a:r>
-              <a:rPr/>
+              <a:rPr sz="2800">
+                <a:solidFill>
+                  <a:srgbClr val="E0E7EC"/>
+                </a:solidFill>
+              </a:rPr>
               <a:t>actual</a:t>
             </a:r>
             <a:r>
-              <a:rPr/>
+              <a:rPr sz="2800">
+                <a:solidFill>
+                  <a:srgbClr val="E0E7EC"/>
+                </a:solidFill>
+              </a:rPr>
               <a:t> </a:t>
             </a:r>
             <a:r>
-              <a:rPr/>
+              <a:rPr sz="2800">
+                <a:solidFill>
+                  <a:srgbClr val="E0E7EC"/>
+                </a:solidFill>
+              </a:rPr>
               <a:t>–</a:t>
             </a:r>
             <a:r>
-              <a:rPr/>
+              <a:rPr sz="2800">
+                <a:solidFill>
+                  <a:srgbClr val="E0E7EC"/>
+                </a:solidFill>
+              </a:rPr>
               <a:t> </a:t>
             </a:r>
             <a:r>
-              <a:rPr/>
+              <a:rPr sz="2800">
+                <a:solidFill>
+                  <a:srgbClr val="E0E7EC"/>
+                </a:solidFill>
+              </a:rPr>
               <a:t>Plot</a:t>
             </a:r>
             <a:r>
-              <a:rPr/>
+              <a:rPr sz="2800">
+                <a:solidFill>
+                  <a:srgbClr val="E0E7EC"/>
+                </a:solidFill>
+              </a:rPr>
               <a:t> </a:t>
             </a:r>
             <a:r>
-              <a:rPr/>
+              <a:rPr sz="2800">
+                <a:solidFill>
+                  <a:srgbClr val="E0E7EC"/>
+                </a:solidFill>
+              </a:rPr>
               <a:t>2003</a:t>
             </a:r>
           </a:p>
@@ -3432,9 +3957,17 @@
 </p:sld>
 </file>
 
-<file path=ppt/slides/slide11.xml><?xml version="1.0" encoding="utf-8"?>
+<file path=ppt/slides/slide13.xml><?xml version="1.0" encoding="utf-8"?>
 <p:sld xmlns:a="http://schemas.openxmlformats.org/drawingml/2006/main" xmlns:r="http://schemas.openxmlformats.org/officeDocument/2006/relationships" xmlns:p="http://schemas.openxmlformats.org/presentationml/2006/main">
   <p:cSld>
+    <p:bg>
+      <p:bgPr>
+        <a:solidFill>
+          <a:srgbClr val="10212B"/>
+        </a:solidFill>
+        <a:effectLst/>
+      </p:bgPr>
+    </p:bg>
     <p:spTree>
       <p:nvGrpSpPr>
         <p:cNvPr id="1" name=""/>
@@ -3464,12 +3997,20 @@
           <a:bodyPr/>
           <a:lstStyle/>
           <a:p>
-            <a:pPr lvl="0" marL="0" indent="0">
-              <a:buNone/>
+            <a:pPr lvl="1">
+              <a:defRPr sz="2400">
+                <a:solidFill>
+                  <a:srgbClr val="E0E7EC"/>
+                </a:solidFill>
+              </a:defRPr>
             </a:pPr>
             <a:r>
-              <a:rPr/>
-              <a:t> - Captures overall decay/trend but underestimates irrigation rebounds - Surface layer (6") best aligned; deeper probes drift shortly after forecast window starts</a:t>
+              <a:rPr sz="2400">
+                <a:solidFill>
+                  <a:srgbClr val="E0E7EC"/>
+                </a:solidFill>
+              </a:rPr>
+              <a:t>Captures trend but under-reacts to irrigation rebounds deeper than 6"</a:t>
             </a:r>
           </a:p>
         </p:txBody>
@@ -3479,9 +4020,17 @@
 </p:sld>
 </file>
 
-<file path=ppt/slides/slide12.xml><?xml version="1.0" encoding="utf-8"?>
+<file path=ppt/slides/slide14.xml><?xml version="1.0" encoding="utf-8"?>
 <p:sld xmlns:a="http://schemas.openxmlformats.org/drawingml/2006/main" xmlns:r="http://schemas.openxmlformats.org/officeDocument/2006/relationships" xmlns:p="http://schemas.openxmlformats.org/presentationml/2006/main">
   <p:cSld>
+    <p:bg>
+      <p:bgPr>
+        <a:solidFill>
+          <a:srgbClr val="10212B"/>
+        </a:solidFill>
+        <a:effectLst/>
+      </p:bgPr>
+    </p:bg>
     <p:spTree>
       <p:nvGrpSpPr>
         <p:cNvPr id="1" name=""/>
@@ -3513,41 +4062,82 @@
           <a:p>
             <a:pPr lvl="0" marL="0" indent="0">
               <a:buNone/>
+              <a:defRPr sz="4400">
+                <a:solidFill>
+                  <a:srgbClr val="EDF2F7"/>
+                </a:solidFill>
+              </a:defRPr>
             </a:pPr>
             <a:r>
-              <a:rPr/>
-              <a:t>Model</a:t>
-            </a:r>
-            <a:r>
-              <a:rPr/>
+              <a:rPr sz="2800">
+                <a:solidFill>
+                  <a:srgbClr val="E0E7EC"/>
+                </a:solidFill>
+              </a:rPr>
+              <a:t>Forecast</a:t>
+            </a:r>
+            <a:r>
+              <a:rPr sz="2800">
+                <a:solidFill>
+                  <a:srgbClr val="E0E7EC"/>
+                </a:solidFill>
+              </a:rPr>
               <a:t> </a:t>
             </a:r>
             <a:r>
-              <a:rPr/>
+              <a:rPr sz="2800">
+                <a:solidFill>
+                  <a:srgbClr val="E0E7EC"/>
+                </a:solidFill>
+              </a:rPr>
               <a:t>Behaviour</a:t>
             </a:r>
             <a:r>
-              <a:rPr/>
+              <a:rPr sz="2800">
+                <a:solidFill>
+                  <a:srgbClr val="E0E7EC"/>
+                </a:solidFill>
+              </a:rPr>
               <a:t> </a:t>
             </a:r>
             <a:r>
-              <a:rPr/>
+              <a:rPr sz="2800">
+                <a:solidFill>
+                  <a:srgbClr val="E0E7EC"/>
+                </a:solidFill>
+              </a:rPr>
               <a:t>–</a:t>
             </a:r>
             <a:r>
-              <a:rPr/>
+              <a:rPr sz="2800">
+                <a:solidFill>
+                  <a:srgbClr val="E0E7EC"/>
+                </a:solidFill>
+              </a:rPr>
               <a:t> </a:t>
             </a:r>
             <a:r>
-              <a:rPr/>
+              <a:rPr sz="2800">
+                <a:solidFill>
+                  <a:srgbClr val="E0E7EC"/>
+                </a:solidFill>
+              </a:rPr>
               <a:t>Plot</a:t>
             </a:r>
             <a:r>
-              <a:rPr/>
+              <a:rPr sz="2800">
+                <a:solidFill>
+                  <a:srgbClr val="E0E7EC"/>
+                </a:solidFill>
+              </a:rPr>
               <a:t> </a:t>
             </a:r>
             <a:r>
-              <a:rPr/>
+              <a:rPr sz="2800">
+                <a:solidFill>
+                  <a:srgbClr val="E0E7EC"/>
+                </a:solidFill>
+              </a:rPr>
               <a:t>2014</a:t>
             </a:r>
           </a:p>
@@ -3605,49 +4195,98 @@
           <a:p>
             <a:pPr lvl="0" marL="0" indent="0" algn="ctr">
               <a:buNone/>
+              <a:defRPr sz="2800">
+                <a:solidFill>
+                  <a:srgbClr val="E0E7EC"/>
+                </a:solidFill>
+              </a:defRPr>
             </a:pPr>
             <a:r>
-              <a:rPr/>
+              <a:rPr sz="2800">
+                <a:solidFill>
+                  <a:srgbClr val="E0E7EC"/>
+                </a:solidFill>
+              </a:rPr>
               <a:t>Pred</a:t>
             </a:r>
             <a:r>
-              <a:rPr/>
+              <a:rPr sz="2800">
+                <a:solidFill>
+                  <a:srgbClr val="E0E7EC"/>
+                </a:solidFill>
+              </a:rPr>
               <a:t> </a:t>
             </a:r>
             <a:r>
-              <a:rPr/>
+              <a:rPr sz="2800">
+                <a:solidFill>
+                  <a:srgbClr val="E0E7EC"/>
+                </a:solidFill>
+              </a:rPr>
               <a:t>vs</a:t>
             </a:r>
             <a:r>
-              <a:rPr/>
+              <a:rPr sz="2800">
+                <a:solidFill>
+                  <a:srgbClr val="E0E7EC"/>
+                </a:solidFill>
+              </a:rPr>
               <a:t> </a:t>
             </a:r>
             <a:r>
-              <a:rPr/>
+              <a:rPr sz="2800">
+                <a:solidFill>
+                  <a:srgbClr val="E0E7EC"/>
+                </a:solidFill>
+              </a:rPr>
               <a:t>actual</a:t>
             </a:r>
             <a:r>
-              <a:rPr/>
+              <a:rPr sz="2800">
+                <a:solidFill>
+                  <a:srgbClr val="E0E7EC"/>
+                </a:solidFill>
+              </a:rPr>
               <a:t> </a:t>
             </a:r>
             <a:r>
-              <a:rPr/>
+              <a:rPr sz="2800">
+                <a:solidFill>
+                  <a:srgbClr val="E0E7EC"/>
+                </a:solidFill>
+              </a:rPr>
               <a:t>–</a:t>
             </a:r>
             <a:r>
-              <a:rPr/>
+              <a:rPr sz="2800">
+                <a:solidFill>
+                  <a:srgbClr val="E0E7EC"/>
+                </a:solidFill>
+              </a:rPr>
               <a:t> </a:t>
             </a:r>
             <a:r>
-              <a:rPr/>
+              <a:rPr sz="2800">
+                <a:solidFill>
+                  <a:srgbClr val="E0E7EC"/>
+                </a:solidFill>
+              </a:rPr>
               <a:t>Plot</a:t>
             </a:r>
             <a:r>
-              <a:rPr/>
+              <a:rPr sz="2800">
+                <a:solidFill>
+                  <a:srgbClr val="E0E7EC"/>
+                </a:solidFill>
+              </a:rPr>
               <a:t> </a:t>
             </a:r>
             <a:r>
-              <a:rPr/>
+              <a:rPr sz="2800">
+                <a:solidFill>
+                  <a:srgbClr val="E0E7EC"/>
+                </a:solidFill>
+              </a:rPr>
               <a:t>2014</a:t>
             </a:r>
           </a:p>
@@ -3658,9 +4297,17 @@
 </p:sld>
 </file>
 
-<file path=ppt/slides/slide13.xml><?xml version="1.0" encoding="utf-8"?>
+<file path=ppt/slides/slide15.xml><?xml version="1.0" encoding="utf-8"?>
 <p:sld xmlns:a="http://schemas.openxmlformats.org/drawingml/2006/main" xmlns:r="http://schemas.openxmlformats.org/officeDocument/2006/relationships" xmlns:p="http://schemas.openxmlformats.org/presentationml/2006/main">
   <p:cSld>
+    <p:bg>
+      <p:bgPr>
+        <a:solidFill>
+          <a:srgbClr val="10212B"/>
+        </a:solidFill>
+        <a:effectLst/>
+      </p:bgPr>
+    </p:bg>
     <p:spTree>
       <p:nvGrpSpPr>
         <p:cNvPr id="1" name=""/>
@@ -3690,12 +4337,20 @@
           <a:bodyPr/>
           <a:lstStyle/>
           <a:p>
-            <a:pPr lvl="0" marL="0" indent="0">
-              <a:buNone/>
+            <a:pPr lvl="1">
+              <a:defRPr sz="2400">
+                <a:solidFill>
+                  <a:srgbClr val="E0E7EC"/>
+                </a:solidFill>
+              </a:defRPr>
             </a:pPr>
             <a:r>
-              <a:rPr/>
-              <a:t> - Systematic positive bias on 6" depth → likely due to limited drydown examples in training folds - 18“/30” profiles miss the sharp post-irrigation peak entirely</a:t>
+              <a:rPr sz="2400">
+                <a:solidFill>
+                  <a:srgbClr val="E0E7EC"/>
+                </a:solidFill>
+              </a:rPr>
+              <a:t>Bias high at surface; deeper probes miss sharp peaks → insufficient dry-down examples</a:t>
             </a:r>
           </a:p>
         </p:txBody>
@@ -3705,9 +4360,17 @@
 </p:sld>
 </file>
 
-<file path=ppt/slides/slide14.xml><?xml version="1.0" encoding="utf-8"?>
+<file path=ppt/slides/slide16.xml><?xml version="1.0" encoding="utf-8"?>
 <p:sld xmlns:a="http://schemas.openxmlformats.org/drawingml/2006/main" xmlns:r="http://schemas.openxmlformats.org/officeDocument/2006/relationships" xmlns:p="http://schemas.openxmlformats.org/presentationml/2006/main">
   <p:cSld>
+    <p:bg>
+      <p:bgPr>
+        <a:solidFill>
+          <a:srgbClr val="10212B"/>
+        </a:solidFill>
+        <a:effectLst/>
+      </p:bgPr>
+    </p:bg>
     <p:spTree>
       <p:nvGrpSpPr>
         <p:cNvPr id="1" name=""/>
@@ -3739,41 +4402,82 @@
           <a:p>
             <a:pPr lvl="0" marL="0" indent="0">
               <a:buNone/>
+              <a:defRPr sz="4400">
+                <a:solidFill>
+                  <a:srgbClr val="EDF2F7"/>
+                </a:solidFill>
+              </a:defRPr>
             </a:pPr>
             <a:r>
-              <a:rPr/>
-              <a:t>Model</a:t>
-            </a:r>
-            <a:r>
-              <a:rPr/>
+              <a:rPr sz="2800">
+                <a:solidFill>
+                  <a:srgbClr val="E0E7EC"/>
+                </a:solidFill>
+              </a:rPr>
+              <a:t>Forecast</a:t>
+            </a:r>
+            <a:r>
+              <a:rPr sz="2800">
+                <a:solidFill>
+                  <a:srgbClr val="E0E7EC"/>
+                </a:solidFill>
+              </a:rPr>
               <a:t> </a:t>
             </a:r>
             <a:r>
-              <a:rPr/>
+              <a:rPr sz="2800">
+                <a:solidFill>
+                  <a:srgbClr val="E0E7EC"/>
+                </a:solidFill>
+              </a:rPr>
               <a:t>Behaviour</a:t>
             </a:r>
             <a:r>
-              <a:rPr/>
+              <a:rPr sz="2800">
+                <a:solidFill>
+                  <a:srgbClr val="E0E7EC"/>
+                </a:solidFill>
+              </a:rPr>
               <a:t> </a:t>
             </a:r>
             <a:r>
-              <a:rPr/>
+              <a:rPr sz="2800">
+                <a:solidFill>
+                  <a:srgbClr val="E0E7EC"/>
+                </a:solidFill>
+              </a:rPr>
               <a:t>–</a:t>
             </a:r>
             <a:r>
-              <a:rPr/>
+              <a:rPr sz="2800">
+                <a:solidFill>
+                  <a:srgbClr val="E0E7EC"/>
+                </a:solidFill>
+              </a:rPr>
               <a:t> </a:t>
             </a:r>
             <a:r>
-              <a:rPr/>
+              <a:rPr sz="2800">
+                <a:solidFill>
+                  <a:srgbClr val="E0E7EC"/>
+                </a:solidFill>
+              </a:rPr>
               <a:t>Plot</a:t>
             </a:r>
             <a:r>
-              <a:rPr/>
+              <a:rPr sz="2800">
+                <a:solidFill>
+                  <a:srgbClr val="E0E7EC"/>
+                </a:solidFill>
+              </a:rPr>
               <a:t> </a:t>
             </a:r>
             <a:r>
-              <a:rPr/>
+              <a:rPr sz="2800">
+                <a:solidFill>
+                  <a:srgbClr val="E0E7EC"/>
+                </a:solidFill>
+              </a:rPr>
               <a:t>2015</a:t>
             </a:r>
           </a:p>
@@ -3831,49 +4535,98 @@
           <a:p>
             <a:pPr lvl="0" marL="0" indent="0" algn="ctr">
               <a:buNone/>
+              <a:defRPr sz="2800">
+                <a:solidFill>
+                  <a:srgbClr val="E0E7EC"/>
+                </a:solidFill>
+              </a:defRPr>
             </a:pPr>
             <a:r>
-              <a:rPr/>
+              <a:rPr sz="2800">
+                <a:solidFill>
+                  <a:srgbClr val="E0E7EC"/>
+                </a:solidFill>
+              </a:rPr>
               <a:t>Pred</a:t>
             </a:r>
             <a:r>
-              <a:rPr/>
+              <a:rPr sz="2800">
+                <a:solidFill>
+                  <a:srgbClr val="E0E7EC"/>
+                </a:solidFill>
+              </a:rPr>
               <a:t> </a:t>
             </a:r>
             <a:r>
-              <a:rPr/>
+              <a:rPr sz="2800">
+                <a:solidFill>
+                  <a:srgbClr val="E0E7EC"/>
+                </a:solidFill>
+              </a:rPr>
               <a:t>vs</a:t>
             </a:r>
             <a:r>
-              <a:rPr/>
+              <a:rPr sz="2800">
+                <a:solidFill>
+                  <a:srgbClr val="E0E7EC"/>
+                </a:solidFill>
+              </a:rPr>
               <a:t> </a:t>
             </a:r>
             <a:r>
-              <a:rPr/>
+              <a:rPr sz="2800">
+                <a:solidFill>
+                  <a:srgbClr val="E0E7EC"/>
+                </a:solidFill>
+              </a:rPr>
               <a:t>actual</a:t>
             </a:r>
             <a:r>
-              <a:rPr/>
+              <a:rPr sz="2800">
+                <a:solidFill>
+                  <a:srgbClr val="E0E7EC"/>
+                </a:solidFill>
+              </a:rPr>
               <a:t> </a:t>
             </a:r>
             <a:r>
-              <a:rPr/>
+              <a:rPr sz="2800">
+                <a:solidFill>
+                  <a:srgbClr val="E0E7EC"/>
+                </a:solidFill>
+              </a:rPr>
               <a:t>–</a:t>
             </a:r>
             <a:r>
-              <a:rPr/>
+              <a:rPr sz="2800">
+                <a:solidFill>
+                  <a:srgbClr val="E0E7EC"/>
+                </a:solidFill>
+              </a:rPr>
               <a:t> </a:t>
             </a:r>
             <a:r>
-              <a:rPr/>
+              <a:rPr sz="2800">
+                <a:solidFill>
+                  <a:srgbClr val="E0E7EC"/>
+                </a:solidFill>
+              </a:rPr>
               <a:t>Plot</a:t>
             </a:r>
             <a:r>
-              <a:rPr/>
+              <a:rPr sz="2800">
+                <a:solidFill>
+                  <a:srgbClr val="E0E7EC"/>
+                </a:solidFill>
+              </a:rPr>
               <a:t> </a:t>
             </a:r>
             <a:r>
-              <a:rPr/>
+              <a:rPr sz="2800">
+                <a:solidFill>
+                  <a:srgbClr val="E0E7EC"/>
+                </a:solidFill>
+              </a:rPr>
               <a:t>2015</a:t>
             </a:r>
           </a:p>
@@ -3884,9 +4637,17 @@
 </p:sld>
 </file>
 
-<file path=ppt/slides/slide15.xml><?xml version="1.0" encoding="utf-8"?>
+<file path=ppt/slides/slide17.xml><?xml version="1.0" encoding="utf-8"?>
 <p:sld xmlns:a="http://schemas.openxmlformats.org/drawingml/2006/main" xmlns:r="http://schemas.openxmlformats.org/officeDocument/2006/relationships" xmlns:p="http://schemas.openxmlformats.org/presentationml/2006/main">
   <p:cSld>
+    <p:bg>
+      <p:bgPr>
+        <a:solidFill>
+          <a:srgbClr val="10212B"/>
+        </a:solidFill>
+        <a:effectLst/>
+      </p:bgPr>
+    </p:bg>
     <p:spTree>
       <p:nvGrpSpPr>
         <p:cNvPr id="1" name=""/>
@@ -3916,12 +4677,20 @@
           <a:bodyPr/>
           <a:lstStyle/>
           <a:p>
-            <a:pPr lvl="0" marL="0" indent="0">
-              <a:buNone/>
+            <a:pPr lvl="1">
+              <a:defRPr sz="2400">
+                <a:solidFill>
+                  <a:srgbClr val="E0E7EC"/>
+                </a:solidFill>
+              </a:defRPr>
             </a:pPr>
             <a:r>
-              <a:rPr/>
-              <a:t> - Model follows trend but lags actuals by ~2 days; deeper probe diverges once soil drains - Highlights dataset imbalance: this plot irrigated more aggressively than training plots</a:t>
+              <a:rPr sz="2400">
+                <a:solidFill>
+                  <a:srgbClr val="E0E7EC"/>
+                </a:solidFill>
+              </a:rPr>
+              <a:t>Tracks trend yet lags ~48 h; demonstrates training fold bug + irrigation imbalance</a:t>
             </a:r>
           </a:p>
         </p:txBody>
@@ -3931,9 +4700,17 @@
 </p:sld>
 </file>
 
-<file path=ppt/slides/slide16.xml><?xml version="1.0" encoding="utf-8"?>
+<file path=ppt/slides/slide18.xml><?xml version="1.0" encoding="utf-8"?>
 <p:sld xmlns:a="http://schemas.openxmlformats.org/drawingml/2006/main" xmlns:r="http://schemas.openxmlformats.org/officeDocument/2006/relationships" xmlns:p="http://schemas.openxmlformats.org/presentationml/2006/main">
   <p:cSld>
+    <p:bg>
+      <p:bgPr>
+        <a:solidFill>
+          <a:srgbClr val="10212B"/>
+        </a:solidFill>
+        <a:effectLst/>
+      </p:bgPr>
+    </p:bg>
     <p:spTree>
       <p:nvGrpSpPr>
         <p:cNvPr id="1" name=""/>
@@ -3965,18 +4742,51 @@
           <a:p>
             <a:pPr lvl="0" marL="0" indent="0">
               <a:buNone/>
+              <a:defRPr sz="4400">
+                <a:solidFill>
+                  <a:srgbClr val="EDF2F7"/>
+                </a:solidFill>
+              </a:defRPr>
             </a:pPr>
             <a:r>
-              <a:rPr/>
+              <a:rPr sz="2800">
+                <a:solidFill>
+                  <a:srgbClr val="E0E7EC"/>
+                </a:solidFill>
+              </a:rPr>
               <a:t>Injection</a:t>
             </a:r>
             <a:r>
-              <a:rPr/>
+              <a:rPr sz="2800">
+                <a:solidFill>
+                  <a:srgbClr val="E0E7EC"/>
+                </a:solidFill>
+              </a:rPr>
               <a:t> </a:t>
             </a:r>
             <a:r>
-              <a:rPr/>
-              <a:t>Experiment</a:t>
+              <a:rPr sz="2800">
+                <a:solidFill>
+                  <a:srgbClr val="E0E7EC"/>
+                </a:solidFill>
+              </a:rPr>
+              <a:t>Sensitivity</a:t>
+            </a:r>
+            <a:r>
+              <a:rPr sz="2800">
+                <a:solidFill>
+                  <a:srgbClr val="E0E7EC"/>
+                </a:solidFill>
+              </a:rPr>
+              <a:t> </a:t>
+            </a:r>
+            <a:r>
+              <a:rPr sz="2800">
+                <a:solidFill>
+                  <a:srgbClr val="E0E7EC"/>
+                </a:solidFill>
+              </a:rPr>
+              <a:t>Test</a:t>
             </a:r>
           </a:p>
         </p:txBody>
@@ -4033,17 +4843,34 @@
           <a:p>
             <a:pPr lvl="0" marL="0" indent="0" algn="ctr">
               <a:buNone/>
+              <a:defRPr sz="2800">
+                <a:solidFill>
+                  <a:srgbClr val="E0E7EC"/>
+                </a:solidFill>
+              </a:defRPr>
             </a:pPr>
             <a:r>
-              <a:rPr/>
+              <a:rPr sz="2800">
+                <a:solidFill>
+                  <a:srgbClr val="E0E7EC"/>
+                </a:solidFill>
+              </a:rPr>
               <a:t>Injection</a:t>
             </a:r>
             <a:r>
-              <a:rPr/>
+              <a:rPr sz="2800">
+                <a:solidFill>
+                  <a:srgbClr val="E0E7EC"/>
+                </a:solidFill>
+              </a:rPr>
               <a:t> </a:t>
             </a:r>
             <a:r>
-              <a:rPr/>
+              <a:rPr sz="2800">
+                <a:solidFill>
+                  <a:srgbClr val="E0E7EC"/>
+                </a:solidFill>
+              </a:rPr>
               <a:t>sweep</a:t>
             </a:r>
           </a:p>
@@ -4054,9 +4881,17 @@
 </p:sld>
 </file>
 
-<file path=ppt/slides/slide17.xml><?xml version="1.0" encoding="utf-8"?>
+<file path=ppt/slides/slide19.xml><?xml version="1.0" encoding="utf-8"?>
 <p:sld xmlns:a="http://schemas.openxmlformats.org/drawingml/2006/main" xmlns:r="http://schemas.openxmlformats.org/officeDocument/2006/relationships" xmlns:p="http://schemas.openxmlformats.org/presentationml/2006/main">
   <p:cSld>
+    <p:bg>
+      <p:bgPr>
+        <a:solidFill>
+          <a:srgbClr val="10212B"/>
+        </a:solidFill>
+        <a:effectLst/>
+      </p:bgPr>
+    </p:bg>
     <p:spTree>
       <p:nvGrpSpPr>
         <p:cNvPr id="1" name=""/>
@@ -4086,12 +4921,37 @@
           <a:bodyPr/>
           <a:lstStyle/>
           <a:p>
-            <a:pPr lvl="0" marL="0" indent="0">
-              <a:buNone/>
+            <a:pPr lvl="1">
+              <a:defRPr sz="2400">
+                <a:solidFill>
+                  <a:srgbClr val="E0E7EC"/>
+                </a:solidFill>
+              </a:defRPr>
             </a:pPr>
             <a:r>
-              <a:rPr/>
-              <a:t> - Synthetic irrigation (+0.25, +0.5, +1.0) applied just before forecast - Desired outcome: higher predicted VWC correlating with injection size - Observed: predictions nearly flat; averages barely change across injections</a:t>
+              <a:rPr sz="2400">
+                <a:solidFill>
+                  <a:srgbClr val="E0E7EC"/>
+                </a:solidFill>
+              </a:rPr>
+              <a:t>Injecting +0.25 to +1.0 water after scaling failed to move predictions</a:t>
+            </a:r>
+          </a:p>
+          <a:p>
+            <a:pPr lvl="1">
+              <a:defRPr sz="2400">
+                <a:solidFill>
+                  <a:srgbClr val="E0E7EC"/>
+                </a:solidFill>
+              </a:defRPr>
+            </a:pPr>
+            <a:r>
+              <a:rPr sz="2400">
+                <a:solidFill>
+                  <a:srgbClr val="E0E7EC"/>
+                </a:solidFill>
+              </a:rPr>
+              <a:t>Missing feature recompute + distribution shift explain the mismatch</a:t>
             </a:r>
           </a:p>
         </p:txBody>
@@ -4101,9 +4961,17 @@
 </p:sld>
 </file>
 
-<file path=ppt/slides/slide18.xml><?xml version="1.0" encoding="utf-8"?>
+<file path=ppt/slides/slide2.xml><?xml version="1.0" encoding="utf-8"?>
 <p:sld xmlns:a="http://schemas.openxmlformats.org/drawingml/2006/main" xmlns:r="http://schemas.openxmlformats.org/officeDocument/2006/relationships" xmlns:p="http://schemas.openxmlformats.org/presentationml/2006/main">
   <p:cSld>
+    <p:bg>
+      <p:bgPr>
+        <a:solidFill>
+          <a:srgbClr val="10212B"/>
+        </a:solidFill>
+        <a:effectLst/>
+      </p:bgPr>
+    </p:bg>
     <p:spTree>
       <p:nvGrpSpPr>
         <p:cNvPr id="1" name=""/>
@@ -4135,79 +5003,136 @@
           <a:p>
             <a:pPr lvl="0" marL="0" indent="0">
               <a:buNone/>
+              <a:defRPr sz="4400">
+                <a:solidFill>
+                  <a:srgbClr val="EDF2F7"/>
+                </a:solidFill>
+              </a:defRPr>
             </a:pPr>
             <a:r>
-              <a:rPr/>
-              <a:t>Why</a:t>
-            </a:r>
-            <a:r>
-              <a:rPr/>
+              <a:rPr sz="2800">
+                <a:solidFill>
+                  <a:srgbClr val="E0E7EC"/>
+                </a:solidFill>
+              </a:rPr>
+              <a:t>Field</a:t>
+            </a:r>
+            <a:r>
+              <a:rPr sz="2800">
+                <a:solidFill>
+                  <a:srgbClr val="E0E7EC"/>
+                </a:solidFill>
+              </a:rPr>
               <a:t> </a:t>
             </a:r>
             <a:r>
-              <a:rPr/>
-              <a:t>Irrigation</a:t>
-            </a:r>
-            <a:r>
-              <a:rPr/>
+              <a:rPr sz="2800">
+                <a:solidFill>
+                  <a:srgbClr val="E0E7EC"/>
+                </a:solidFill>
+              </a:rPr>
+              <a:t>Snapshot</a:t>
+            </a:r>
+          </a:p>
+        </p:txBody>
+      </p:sp>
+      <p:pic>
+        <p:nvPicPr>
+          <p:cNvPr descr="images/sensor_layout_placeholder.png" id="0" name="Picture 1"/>
+          <p:cNvPicPr>
+            <a:picLocks noGrp="1" noChangeAspect="1"/>
+          </p:cNvPicPr>
+          <p:nvPr/>
+        </p:nvPicPr>
+        <p:blipFill>
+          <a:blip r:embed="rId2"/>
+          <a:stretch>
+            <a:fillRect/>
+          </a:stretch>
+        </p:blipFill>
+        <p:spPr bwMode="auto">
+          <a:xfrm>
+            <a:off x="1892300" y="1600200"/>
+            <a:ext cx="5346700" cy="4013200"/>
+          </a:xfrm>
+          <a:prstGeom prst="rect">
+            <a:avLst/>
+          </a:prstGeom>
+          <a:noFill/>
+          <a:ln w="9525">
+            <a:noFill/>
+            <a:headEnd/>
+            <a:tailEnd/>
+          </a:ln>
+        </p:spPr>
+      </p:pic>
+      <p:sp>
+        <p:nvSpPr>
+          <p:cNvPr id="1" name="TextBox 3"/>
+          <p:cNvSpPr txBox="1"/>
+          <p:nvPr/>
+        </p:nvSpPr>
+        <p:spPr>
+          <a:xfrm>
+            <a:off x="457200" y="5613400"/>
+            <a:ext cx="8229600" cy="508000"/>
+          </a:xfrm>
+          <a:prstGeom prst="rect">
+            <a:avLst/>
+          </a:prstGeom>
+          <a:noFill/>
+        </p:spPr>
+        <p:txBody>
+          <a:bodyPr/>
+          <a:lstStyle/>
+          <a:p>
+            <a:pPr lvl="0" marL="0" indent="0" algn="ctr">
+              <a:buNone/>
+              <a:defRPr sz="2800">
+                <a:solidFill>
+                  <a:srgbClr val="E0E7EC"/>
+                </a:solidFill>
+              </a:defRPr>
+            </a:pPr>
+            <a:r>
+              <a:rPr sz="2800">
+                <a:solidFill>
+                  <a:srgbClr val="E0E7EC"/>
+                </a:solidFill>
+              </a:rPr>
+              <a:t>Sensor</a:t>
+            </a:r>
+            <a:r>
+              <a:rPr sz="2800">
+                <a:solidFill>
+                  <a:srgbClr val="E0E7EC"/>
+                </a:solidFill>
+              </a:rPr>
               <a:t> </a:t>
             </a:r>
             <a:r>
-              <a:rPr/>
-              <a:t>Fails</a:t>
-            </a:r>
-          </a:p>
-        </p:txBody>
-      </p:sp>
-      <p:sp>
-        <p:nvSpPr>
-          <p:cNvPr id="3" name="Content Placeholder 2"/>
-          <p:cNvSpPr>
-            <a:spLocks noGrp="1"/>
-          </p:cNvSpPr>
-          <p:nvPr>
-            <p:ph idx="1"/>
-          </p:nvPr>
-        </p:nvSpPr>
-        <p:spPr/>
-        <p:txBody>
-          <a:bodyPr/>
-          <a:lstStyle/>
-          <a:p>
-            <a:pPr lvl="1">
-              <a:buAutoNum type="arabicPeriod"/>
-            </a:pPr>
-            <a:r>
-              <a:rPr/>
-              <a:t>Injection added after scaling ⇒ engineered features (</a:t>
-            </a:r>
-            <a:r>
-              <a:rPr>
-                <a:latin typeface="Courier"/>
-              </a:rPr>
-              <a:t>precip_irrig_log</a:t>
-            </a:r>
-            <a:r>
-              <a:rPr/>
-              <a:t>, flags, rolling sums) unchanged, starving the network of irrigation cues</a:t>
-            </a:r>
-          </a:p>
-          <a:p>
-            <a:pPr lvl="1">
-              <a:buAutoNum type="arabicPeriod"/>
-            </a:pPr>
-            <a:r>
-              <a:rPr/>
-              <a:t>Adding 0.25–1.0 to the scaled feature pushes it beyond training range (MinMax [0,1]), inducing distribution shift the LSTM never saw</a:t>
-            </a:r>
-          </a:p>
-          <a:p>
-            <a:pPr lvl="1">
-              <a:buAutoNum type="arabicPeriod"/>
-            </a:pPr>
-            <a:r>
-              <a:rPr/>
-              <a:t>Training bug reused folds from the first plot only, so the model never learned cross-plot irrigation variability; unseen responses default to trend continuation</a:t>
+              <a:rPr sz="2800">
+                <a:solidFill>
+                  <a:srgbClr val="E0E7EC"/>
+                </a:solidFill>
+              </a:rPr>
+              <a:t>grid</a:t>
+            </a:r>
+            <a:r>
+              <a:rPr sz="2800">
+                <a:solidFill>
+                  <a:srgbClr val="E0E7EC"/>
+                </a:solidFill>
+              </a:rPr>
+              <a:t> </a:t>
+            </a:r>
+            <a:r>
+              <a:rPr sz="2800">
+                <a:solidFill>
+                  <a:srgbClr val="E0E7EC"/>
+                </a:solidFill>
+              </a:rPr>
+              <a:t>placeholder</a:t>
             </a:r>
           </a:p>
         </p:txBody>
@@ -4217,9 +5142,17 @@
 </p:sld>
 </file>
 
-<file path=ppt/slides/slide19.xml><?xml version="1.0" encoding="utf-8"?>
+<file path=ppt/slides/slide20.xml><?xml version="1.0" encoding="utf-8"?>
 <p:sld xmlns:a="http://schemas.openxmlformats.org/drawingml/2006/main" xmlns:r="http://schemas.openxmlformats.org/officeDocument/2006/relationships" xmlns:p="http://schemas.openxmlformats.org/presentationml/2006/main">
   <p:cSld>
+    <p:bg>
+      <p:bgPr>
+        <a:solidFill>
+          <a:srgbClr val="10212B"/>
+        </a:solidFill>
+        <a:effectLst/>
+      </p:bgPr>
+    </p:bg>
     <p:spTree>
       <p:nvGrpSpPr>
         <p:cNvPr id="1" name=""/>
@@ -4251,18 +5184,35 @@
           <a:p>
             <a:pPr lvl="0" marL="0" indent="0">
               <a:buNone/>
+              <a:defRPr sz="4400">
+                <a:solidFill>
+                  <a:srgbClr val="EDF2F7"/>
+                </a:solidFill>
+              </a:defRPr>
             </a:pPr>
             <a:r>
-              <a:rPr/>
-              <a:t>Lessons</a:t>
-            </a:r>
-            <a:r>
-              <a:rPr/>
+              <a:rPr sz="2800">
+                <a:solidFill>
+                  <a:srgbClr val="E0E7EC"/>
+                </a:solidFill>
+              </a:rPr>
+              <a:t>Honest</a:t>
+            </a:r>
+            <a:r>
+              <a:rPr sz="2800">
+                <a:solidFill>
+                  <a:srgbClr val="E0E7EC"/>
+                </a:solidFill>
+              </a:rPr>
               <a:t> </a:t>
             </a:r>
             <a:r>
-              <a:rPr/>
-              <a:t>Learned</a:t>
+              <a:rPr sz="2800">
+                <a:solidFill>
+                  <a:srgbClr val="E0E7EC"/>
+                </a:solidFill>
+              </a:rPr>
+              <a:t>Takeaways</a:t>
             </a:r>
           </a:p>
         </p:txBody>
@@ -4282,31 +5232,54 @@
           <a:bodyPr/>
           <a:lstStyle/>
           <a:p>
-            <a:pPr lvl="1"/>
-            <a:r>
-              <a:rPr/>
-              <a:t>Cleaning pipeline solid, but engineered irrigation features must update whenever interventions occur</a:t>
-            </a:r>
-          </a:p>
-          <a:p>
-            <a:pPr lvl="1"/>
-            <a:r>
-              <a:rPr/>
-              <a:t>Fix fold selection to ensure each plot contributes to training/validation</a:t>
-            </a:r>
-          </a:p>
-          <a:p>
-            <a:pPr lvl="1"/>
-            <a:r>
-              <a:rPr/>
-              <a:t>Re-inject irrigation prior to scaling and recompute transforms to test sensitivity honestly</a:t>
-            </a:r>
-          </a:p>
-          <a:p>
-            <a:pPr lvl="1"/>
-            <a:r>
-              <a:rPr/>
-              <a:t>Future modelling: consider hybrid physics constraints or attention on precipitation signals</a:t>
+            <a:pPr lvl="1">
+              <a:defRPr sz="2400">
+                <a:solidFill>
+                  <a:srgbClr val="E0E7EC"/>
+                </a:solidFill>
+              </a:defRPr>
+            </a:pPr>
+            <a:r>
+              <a:rPr sz="2400">
+                <a:solidFill>
+                  <a:srgbClr val="E0E7EC"/>
+                </a:solidFill>
+              </a:rPr>
+              <a:t>Cleaning + feature engineering are tailored to agronomic reality and reusable for next seasons</a:t>
+            </a:r>
+          </a:p>
+          <a:p>
+            <a:pPr lvl="1">
+              <a:defRPr sz="2400">
+                <a:solidFill>
+                  <a:srgbClr val="E0E7EC"/>
+                </a:solidFill>
+              </a:defRPr>
+            </a:pPr>
+            <a:r>
+              <a:rPr sz="2400">
+                <a:solidFill>
+                  <a:srgbClr val="E0E7EC"/>
+                </a:solidFill>
+              </a:rPr>
+              <a:t>Model failure stems from evaluation bug + post-hoc injection design, not from lack of signal</a:t>
+            </a:r>
+          </a:p>
+          <a:p>
+            <a:pPr lvl="1">
+              <a:defRPr sz="2400">
+                <a:solidFill>
+                  <a:srgbClr val="E0E7EC"/>
+                </a:solidFill>
+              </a:defRPr>
+            </a:pPr>
+            <a:r>
+              <a:rPr sz="2400">
+                <a:solidFill>
+                  <a:srgbClr val="E0E7EC"/>
+                </a:solidFill>
+              </a:rPr>
+              <a:t>Present the lessons learned and next steps as future work rather than unfinished business</a:t>
             </a:r>
           </a:p>
         </p:txBody>
@@ -4316,9 +5289,17 @@
 </p:sld>
 </file>
 
-<file path=ppt/slides/slide2.xml><?xml version="1.0" encoding="utf-8"?>
+<file path=ppt/slides/slide21.xml><?xml version="1.0" encoding="utf-8"?>
 <p:sld xmlns:a="http://schemas.openxmlformats.org/drawingml/2006/main" xmlns:r="http://schemas.openxmlformats.org/officeDocument/2006/relationships" xmlns:p="http://schemas.openxmlformats.org/presentationml/2006/main">
   <p:cSld>
+    <p:bg>
+      <p:bgPr>
+        <a:solidFill>
+          <a:srgbClr val="10212B"/>
+        </a:solidFill>
+        <a:effectLst/>
+      </p:bgPr>
+    </p:bg>
     <p:spTree>
       <p:nvGrpSpPr>
         <p:cNvPr id="1" name=""/>
@@ -4350,18 +5331,67 @@
           <a:p>
             <a:pPr lvl="0" marL="0" indent="0">
               <a:buNone/>
+              <a:defRPr sz="4400">
+                <a:solidFill>
+                  <a:srgbClr val="EDF2F7"/>
+                </a:solidFill>
+              </a:defRPr>
             </a:pPr>
             <a:r>
-              <a:rPr/>
-              <a:t>Big</a:t>
-            </a:r>
-            <a:r>
-              <a:rPr/>
+              <a:rPr sz="2800">
+                <a:solidFill>
+                  <a:srgbClr val="E0E7EC"/>
+                </a:solidFill>
+              </a:rPr>
+              <a:t>Appendix</a:t>
+            </a:r>
+            <a:r>
+              <a:rPr sz="2800">
+                <a:solidFill>
+                  <a:srgbClr val="E0E7EC"/>
+                </a:solidFill>
+              </a:rPr>
               <a:t> </a:t>
             </a:r>
             <a:r>
-              <a:rPr/>
-              <a:t>Picture</a:t>
+              <a:rPr sz="2800">
+                <a:solidFill>
+                  <a:srgbClr val="E0E7EC"/>
+                </a:solidFill>
+              </a:rPr>
+              <a:t>–</a:t>
+            </a:r>
+            <a:r>
+              <a:rPr sz="2800">
+                <a:solidFill>
+                  <a:srgbClr val="E0E7EC"/>
+                </a:solidFill>
+              </a:rPr>
+              <a:t> </a:t>
+            </a:r>
+            <a:r>
+              <a:rPr sz="2800">
+                <a:solidFill>
+                  <a:srgbClr val="E0E7EC"/>
+                </a:solidFill>
+              </a:rPr>
+              <a:t>Swap-In</a:t>
+            </a:r>
+            <a:r>
+              <a:rPr sz="2800">
+                <a:solidFill>
+                  <a:srgbClr val="E0E7EC"/>
+                </a:solidFill>
+              </a:rPr>
+              <a:t> </a:t>
+            </a:r>
+            <a:r>
+              <a:rPr sz="2800">
+                <a:solidFill>
+                  <a:srgbClr val="E0E7EC"/>
+                </a:solidFill>
+              </a:rPr>
+              <a:t>Visuals</a:t>
             </a:r>
           </a:p>
         </p:txBody>
@@ -4381,47 +5411,71 @@
           <a:bodyPr/>
           <a:lstStyle/>
           <a:p>
-            <a:pPr lvl="1"/>
-            <a:r>
-              <a:rPr/>
-              <a:t>Goal: forecast volumetric water content (VWC) to automate irrigation decisions for LoRaWAN-connected plots</a:t>
-            </a:r>
-          </a:p>
-          <a:p>
-            <a:pPr lvl="1"/>
-            <a:r>
-              <a:rPr/>
-              <a:t>Deliver 20–25 min walkthrough of messy field data → modeling → failure analysis</a:t>
-            </a:r>
-          </a:p>
-          <a:p>
-            <a:pPr lvl="1"/>
-            <a:r>
-              <a:rPr/>
-              <a:t>Focus on single notebook </a:t>
-            </a:r>
-            <a:r>
-              <a:rPr>
+            <a:pPr lvl="1">
+              <a:defRPr sz="2400">
+                <a:solidFill>
+                  <a:srgbClr val="E0E7EC"/>
+                </a:solidFill>
+              </a:defRPr>
+            </a:pPr>
+            <a:r>
+              <a:rPr sz="2400">
+                <a:solidFill>
+                  <a:srgbClr val="E0E7EC"/>
+                </a:solidFill>
+              </a:rPr>
+              <a:t>Add actual field/sensor photography on Slide 1</a:t>
+            </a:r>
+          </a:p>
+          <a:p>
+            <a:pPr lvl="1">
+              <a:defRPr sz="2400">
+                <a:solidFill>
+                  <a:srgbClr val="E0E7EC"/>
+                </a:solidFill>
+              </a:defRPr>
+            </a:pPr>
+            <a:r>
+              <a:rPr sz="2400">
+                <a:solidFill>
+                  <a:srgbClr val="E0E7EC"/>
+                </a:solidFill>
+              </a:rPr>
+              <a:t>If available, include flatline sensor example or rain event on backup slide for Q&amp;A</a:t>
+            </a:r>
+          </a:p>
+          <a:p>
+            <a:pPr lvl="1">
+              <a:defRPr sz="2400">
+                <a:solidFill>
+                  <a:srgbClr val="E0E7EC"/>
+                </a:solidFill>
+              </a:defRPr>
+            </a:pPr>
+            <a:r>
+              <a:rPr sz="2400">
+                <a:solidFill>
+                  <a:srgbClr val="E0E7EC"/>
+                </a:solidFill>
+              </a:rPr>
+              <a:t>Keep the PPTX (</a:t>
+            </a:r>
+            <a:r>
+              <a:rPr sz="2400">
+                <a:solidFill>
+                  <a:srgbClr val="E0E7EC"/>
+                </a:solidFill>
                 <a:latin typeface="Courier"/>
               </a:rPr>
-              <a:t>VWClstm-daily-injection.ipynb</a:t>
-            </a:r>
-            <a:r>
-              <a:rPr/>
-              <a:t> + SQLite store </a:t>
-            </a:r>
-            <a:r>
-              <a:rPr>
-                <a:latin typeface="Courier"/>
-              </a:rPr>
-              <a:t>processed_data.db</a:t>
-            </a:r>
-          </a:p>
-          <a:p>
-            <a:pPr lvl="1"/>
-            <a:r>
-              <a:rPr/>
-              <a:t>Present every design decision, rationale, and outcome transparently</a:t>
+              <a:t>presentation/eda_story/eda_story.pptx</a:t>
+            </a:r>
+            <a:r>
+              <a:rPr sz="2400">
+                <a:solidFill>
+                  <a:srgbClr val="E0E7EC"/>
+                </a:solidFill>
+              </a:rPr>
+              <a:t>) handy for template styling</a:t>
             </a:r>
           </a:p>
         </p:txBody>
@@ -4431,9 +5485,17 @@
 </p:sld>
 </file>
 
-<file path=ppt/slides/slide20.xml><?xml version="1.0" encoding="utf-8"?>
+<file path=ppt/slides/slide3.xml><?xml version="1.0" encoding="utf-8"?>
 <p:sld xmlns:a="http://schemas.openxmlformats.org/drawingml/2006/main" xmlns:r="http://schemas.openxmlformats.org/officeDocument/2006/relationships" xmlns:p="http://schemas.openxmlformats.org/presentationml/2006/main">
   <p:cSld>
+    <p:bg>
+      <p:bgPr>
+        <a:solidFill>
+          <a:srgbClr val="10212B"/>
+        </a:solidFill>
+        <a:effectLst/>
+      </p:bgPr>
+    </p:bg>
     <p:spTree>
       <p:nvGrpSpPr>
         <p:cNvPr id="1" name=""/>
@@ -4450,12 +5512,12 @@
       </p:grpSpPr>
       <p:sp>
         <p:nvSpPr>
-          <p:cNvPr id="2" name="Title 1"/>
-          <p:cNvSpPr>
-            <a:spLocks noGrp="1"/>
-          </p:cNvSpPr>
-          <p:nvPr>
-            <p:ph type="title"/>
+          <p:cNvPr id="3" name="Content Placeholder 2"/>
+          <p:cNvSpPr>
+            <a:spLocks noGrp="1"/>
+          </p:cNvSpPr>
+          <p:nvPr>
+            <p:ph idx="1"/>
           </p:nvPr>
         </p:nvSpPr>
         <p:spPr/>
@@ -4463,57 +5525,37 @@
           <a:bodyPr/>
           <a:lstStyle/>
           <a:p>
-            <a:pPr lvl="0" marL="0" indent="0">
-              <a:buNone/>
+            <a:pPr lvl="1">
+              <a:defRPr sz="2400">
+                <a:solidFill>
+                  <a:srgbClr val="E0E7EC"/>
+                </a:solidFill>
+              </a:defRPr>
             </a:pPr>
             <a:r>
-              <a:rPr/>
-              <a:t>Next</a:t>
-            </a:r>
-            <a:r>
-              <a:rPr/>
-              <a:t> </a:t>
-            </a:r>
-            <a:r>
-              <a:rPr/>
-              <a:t>Steps</a:t>
-            </a:r>
-          </a:p>
-        </p:txBody>
-      </p:sp>
-      <p:sp>
-        <p:nvSpPr>
-          <p:cNvPr id="3" name="Content Placeholder 2"/>
-          <p:cNvSpPr>
-            <a:spLocks noGrp="1"/>
-          </p:cNvSpPr>
-          <p:nvPr>
-            <p:ph idx="1"/>
-          </p:nvPr>
-        </p:nvSpPr>
-        <p:spPr/>
-        <p:txBody>
-          <a:bodyPr/>
-          <a:lstStyle/>
-          <a:p>
-            <a:pPr lvl="1"/>
-            <a:r>
-              <a:rPr/>
-              <a:t>Rebuild training workflow with correct fold splitting + data augmentation on irrigation events</a:t>
-            </a:r>
-          </a:p>
-          <a:p>
-            <a:pPr lvl="1"/>
-            <a:r>
-              <a:rPr/>
-              <a:t>Create automated figure scripts (post-analysis) to regenerate slides as data evolves</a:t>
-            </a:r>
-          </a:p>
-          <a:p>
-            <a:pPr lvl="1"/>
-            <a:r>
-              <a:rPr/>
-              <a:t>Package notebook narrative into live demo for Q&amp;A on transformation choices</a:t>
+              <a:rPr sz="2400">
+                <a:solidFill>
+                  <a:srgbClr val="E0E7EC"/>
+                </a:solidFill>
+              </a:rPr>
+              <a:t>LoRaWAN nodes log volumetric water content (VWC) at 6, 18, 30 in depths plus weather &amp; irrigation telemetry</a:t>
+            </a:r>
+          </a:p>
+          <a:p>
+            <a:pPr lvl="1">
+              <a:defRPr sz="2400">
+                <a:solidFill>
+                  <a:srgbClr val="E0E7EC"/>
+                </a:solidFill>
+              </a:defRPr>
+            </a:pPr>
+            <a:r>
+              <a:rPr sz="2400">
+                <a:solidFill>
+                  <a:srgbClr val="E0E7EC"/>
+                </a:solidFill>
+              </a:rPr>
+              <a:t>Replace the placeholder with your field photo when available – visual context matters for stakeholders</a:t>
             </a:r>
           </a:p>
         </p:txBody>
@@ -4523,9 +5565,17 @@
 </p:sld>
 </file>
 
-<file path=ppt/slides/slide3.xml><?xml version="1.0" encoding="utf-8"?>
+<file path=ppt/slides/slide4.xml><?xml version="1.0" encoding="utf-8"?>
 <p:sld xmlns:a="http://schemas.openxmlformats.org/drawingml/2006/main" xmlns:r="http://schemas.openxmlformats.org/officeDocument/2006/relationships" xmlns:p="http://schemas.openxmlformats.org/presentationml/2006/main">
   <p:cSld>
+    <p:bg>
+      <p:bgPr>
+        <a:solidFill>
+          <a:srgbClr val="10212B"/>
+        </a:solidFill>
+        <a:effectLst/>
+      </p:bgPr>
+    </p:bg>
     <p:spTree>
       <p:nvGrpSpPr>
         <p:cNvPr id="1" name=""/>
@@ -4557,82 +5607,120 @@
           <a:p>
             <a:pPr lvl="0" marL="0" indent="0">
               <a:buNone/>
+              <a:defRPr sz="4400">
+                <a:solidFill>
+                  <a:srgbClr val="EDF2F7"/>
+                </a:solidFill>
+              </a:defRPr>
             </a:pPr>
             <a:r>
-              <a:rPr/>
-              <a:t>Data</a:t>
-            </a:r>
-            <a:r>
-              <a:rPr/>
+              <a:rPr sz="2800">
+                <a:solidFill>
+                  <a:srgbClr val="E0E7EC"/>
+                </a:solidFill>
+              </a:rPr>
+              <a:t>Coverage</a:t>
+            </a:r>
+            <a:r>
+              <a:rPr sz="2800">
+                <a:solidFill>
+                  <a:srgbClr val="E0E7EC"/>
+                </a:solidFill>
+              </a:rPr>
               <a:t> </a:t>
             </a:r>
             <a:r>
-              <a:rPr/>
-              <a:t>Context</a:t>
-            </a:r>
-          </a:p>
-        </p:txBody>
-      </p:sp>
-      <p:sp>
-        <p:nvSpPr>
-          <p:cNvPr id="3" name="Content Placeholder 2"/>
-          <p:cNvSpPr>
-            <a:spLocks noGrp="1"/>
-          </p:cNvSpPr>
-          <p:nvPr>
-            <p:ph idx="1"/>
-          </p:nvPr>
-        </p:nvSpPr>
-        <p:spPr/>
-        <p:txBody>
-          <a:bodyPr/>
-          <a:lstStyle/>
-          <a:p>
-            <a:pPr lvl="1"/>
-            <a:r>
-              <a:rPr/>
-              <a:t>Source: </a:t>
-            </a:r>
-            <a:r>
-              <a:rPr>
-                <a:latin typeface="Courier"/>
-              </a:rPr>
-              <a:t>data_table</a:t>
-            </a:r>
-            <a:r>
-              <a:rPr/>
-              <a:t> in </a:t>
-            </a:r>
-            <a:r>
-              <a:rPr>
-                <a:latin typeface="Courier"/>
-              </a:rPr>
-              <a:t>Archive/processed_data.db</a:t>
-            </a:r>
-            <a:r>
-              <a:rPr/>
-              <a:t> (37 704 rows, July 19 – Oct 13, 2023)</a:t>
-            </a:r>
-          </a:p>
-          <a:p>
-            <a:pPr lvl="1"/>
-            <a:r>
-              <a:rPr/>
-              <a:t>36 plots, hourly telemetry (weather, canopy temp, irrigation totals, four VWC depths)</a:t>
-            </a:r>
-          </a:p>
-          <a:p>
-            <a:pPr lvl="1"/>
-            <a:r>
-              <a:rPr/>
-              <a:t>Target depths used: 6“, 18”, 30“; 42” discarded after quality review</a:t>
-            </a:r>
-          </a:p>
-          <a:p>
-            <a:pPr lvl="1"/>
-            <a:r>
-              <a:rPr/>
-              <a:t>Short seasonal window ⇒ only ~11 weeks of signal per plot; must squeeze learning from dense feature stack</a:t>
+              <a:rPr sz="2800">
+                <a:solidFill>
+                  <a:srgbClr val="E0E7EC"/>
+                </a:solidFill>
+              </a:rPr>
+              <a:t>Check</a:t>
+            </a:r>
+          </a:p>
+        </p:txBody>
+      </p:sp>
+      <p:pic>
+        <p:nvPicPr>
+          <p:cNvPr descr="images/feature_missingness.png" id="0" name="Picture 1"/>
+          <p:cNvPicPr>
+            <a:picLocks noGrp="1" noChangeAspect="1"/>
+          </p:cNvPicPr>
+          <p:nvPr/>
+        </p:nvPicPr>
+        <p:blipFill>
+          <a:blip r:embed="rId2"/>
+          <a:stretch>
+            <a:fillRect/>
+          </a:stretch>
+        </p:blipFill>
+        <p:spPr bwMode="auto">
+          <a:xfrm>
+            <a:off x="1562100" y="1600200"/>
+            <a:ext cx="6019800" cy="4013200"/>
+          </a:xfrm>
+          <a:prstGeom prst="rect">
+            <a:avLst/>
+          </a:prstGeom>
+          <a:noFill/>
+          <a:ln w="9525">
+            <a:noFill/>
+            <a:headEnd/>
+            <a:tailEnd/>
+          </a:ln>
+        </p:spPr>
+      </p:pic>
+      <p:sp>
+        <p:nvSpPr>
+          <p:cNvPr id="1" name="TextBox 3"/>
+          <p:cNvSpPr txBox="1"/>
+          <p:nvPr/>
+        </p:nvSpPr>
+        <p:spPr>
+          <a:xfrm>
+            <a:off x="457200" y="5613400"/>
+            <a:ext cx="8229600" cy="508000"/>
+          </a:xfrm>
+          <a:prstGeom prst="rect">
+            <a:avLst/>
+          </a:prstGeom>
+          <a:noFill/>
+        </p:spPr>
+        <p:txBody>
+          <a:bodyPr/>
+          <a:lstStyle/>
+          <a:p>
+            <a:pPr lvl="0" marL="0" indent="0" algn="ctr">
+              <a:buNone/>
+              <a:defRPr sz="2800">
+                <a:solidFill>
+                  <a:srgbClr val="E0E7EC"/>
+                </a:solidFill>
+              </a:defRPr>
+            </a:pPr>
+            <a:r>
+              <a:rPr sz="2800">
+                <a:solidFill>
+                  <a:srgbClr val="E0E7EC"/>
+                </a:solidFill>
+              </a:rPr>
+              <a:t>Missingness</a:t>
+            </a:r>
+            <a:r>
+              <a:rPr sz="2800">
+                <a:solidFill>
+                  <a:srgbClr val="E0E7EC"/>
+                </a:solidFill>
+              </a:rPr>
+              <a:t> </a:t>
+            </a:r>
+            <a:r>
+              <a:rPr sz="2800">
+                <a:solidFill>
+                  <a:srgbClr val="E0E7EC"/>
+                </a:solidFill>
+              </a:rPr>
+              <a:t>chart</a:t>
             </a:r>
           </a:p>
         </p:txBody>
@@ -4642,9 +5730,17 @@
 </p:sld>
 </file>
 
-<file path=ppt/slides/slide4.xml><?xml version="1.0" encoding="utf-8"?>
+<file path=ppt/slides/slide5.xml><?xml version="1.0" encoding="utf-8"?>
 <p:sld xmlns:a="http://schemas.openxmlformats.org/drawingml/2006/main" xmlns:r="http://schemas.openxmlformats.org/officeDocument/2006/relationships" xmlns:p="http://schemas.openxmlformats.org/presentationml/2006/main">
   <p:cSld>
+    <p:bg>
+      <p:bgPr>
+        <a:solidFill>
+          <a:srgbClr val="10212B"/>
+        </a:solidFill>
+        <a:effectLst/>
+      </p:bgPr>
+    </p:bg>
     <p:spTree>
       <p:nvGrpSpPr>
         <p:cNvPr id="1" name=""/>
@@ -4661,12 +5757,12 @@
       </p:grpSpPr>
       <p:sp>
         <p:nvSpPr>
-          <p:cNvPr id="2" name="Title 1"/>
-          <p:cNvSpPr>
-            <a:spLocks noGrp="1"/>
-          </p:cNvSpPr>
-          <p:nvPr>
-            <p:ph type="title"/>
+          <p:cNvPr id="3" name="Content Placeholder 2"/>
+          <p:cNvSpPr>
+            <a:spLocks noGrp="1"/>
+          </p:cNvSpPr>
+          <p:nvPr>
+            <p:ph idx="1"/>
           </p:nvPr>
         </p:nvSpPr>
         <p:spPr/>
@@ -4674,74 +5770,37 @@
           <a:bodyPr/>
           <a:lstStyle/>
           <a:p>
-            <a:pPr lvl="0" marL="0" indent="0">
-              <a:buNone/>
+            <a:pPr lvl="1" marL="1270000" indent="0">
+              <a:defRPr sz="2400">
+                <a:solidFill>
+                  <a:srgbClr val="E0E7EC"/>
+                </a:solidFill>
+              </a:defRPr>
             </a:pPr>
             <a:r>
-              <a:rPr/>
-              <a:t>Initial</a:t>
-            </a:r>
-            <a:r>
-              <a:rPr/>
-              <a:t> </a:t>
-            </a:r>
-            <a:r>
-              <a:rPr/>
-              <a:t>Audit</a:t>
-            </a:r>
-          </a:p>
-        </p:txBody>
-      </p:sp>
-      <p:sp>
-        <p:nvSpPr>
-          <p:cNvPr id="3" name="Content Placeholder 2"/>
-          <p:cNvSpPr>
-            <a:spLocks noGrp="1"/>
-          </p:cNvSpPr>
-          <p:nvPr>
-            <p:ph idx="1"/>
-          </p:nvPr>
-        </p:nvSpPr>
-        <p:spPr/>
-        <p:txBody>
-          <a:bodyPr/>
-          <a:lstStyle/>
-          <a:p>
-            <a:pPr lvl="1"/>
-            <a:r>
-              <a:rPr/>
-              <a:t>Missingness: irrigation often zero; VWC sensors occasionally flatline or spike</a:t>
-            </a:r>
-          </a:p>
-          <a:p>
-            <a:pPr lvl="1"/>
-            <a:r>
-              <a:rPr/>
-              <a:t>Duplicate timestamps resolved via </a:t>
-            </a:r>
-            <a:r>
-              <a:rPr>
-                <a:latin typeface="Courier"/>
-              </a:rPr>
-              <a:t>drop_duplicates()</a:t>
-            </a:r>
-            <a:r>
-              <a:rPr/>
-              <a:t> prior to indexing</a:t>
-            </a:r>
-          </a:p>
-          <a:p>
-            <a:pPr lvl="1"/>
-            <a:r>
-              <a:rPr/>
-              <a:t>Hourly cadence mostly consistent (≈1 080 samples per plot subset)</a:t>
-            </a:r>
-          </a:p>
-          <a:p>
-            <a:pPr lvl="1"/>
-            <a:r>
-              <a:rPr/>
-              <a:t>Takeaway: model must tolerate sparse irrigation events and noisy soil probes</a:t>
+              <a:rPr sz="2400">
+                <a:solidFill>
+                  <a:srgbClr val="E0E7EC"/>
+                </a:solidFill>
+              </a:rPr>
+              <a:t>80% coverage on core soil &amp; weather channels</a:t>
+            </a:r>
+          </a:p>
+          <a:p>
+            <a:pPr lvl="1">
+              <a:defRPr sz="2400">
+                <a:solidFill>
+                  <a:srgbClr val="E0E7EC"/>
+                </a:solidFill>
+              </a:defRPr>
+            </a:pPr>
+            <a:r>
+              <a:rPr sz="2400">
+                <a:solidFill>
+                  <a:srgbClr val="E0E7EC"/>
+                </a:solidFill>
+              </a:rPr>
+              <a:t>Stress indices and categorical annotations (crop, stage) too sparse for modeling this season</a:t>
             </a:r>
           </a:p>
         </p:txBody>
@@ -4751,9 +5810,17 @@
 </p:sld>
 </file>
 
-<file path=ppt/slides/slide5.xml><?xml version="1.0" encoding="utf-8"?>
+<file path=ppt/slides/slide6.xml><?xml version="1.0" encoding="utf-8"?>
 <p:sld xmlns:a="http://schemas.openxmlformats.org/drawingml/2006/main" xmlns:r="http://schemas.openxmlformats.org/officeDocument/2006/relationships" xmlns:p="http://schemas.openxmlformats.org/presentationml/2006/main">
   <p:cSld>
+    <p:bg>
+      <p:bgPr>
+        <a:solidFill>
+          <a:srgbClr val="10212B"/>
+        </a:solidFill>
+        <a:effectLst/>
+      </p:bgPr>
+    </p:bg>
     <p:spTree>
       <p:nvGrpSpPr>
         <p:cNvPr id="1" name=""/>
@@ -4785,97 +5852,58 @@
           <a:p>
             <a:pPr lvl="0" marL="0" indent="0">
               <a:buNone/>
+              <a:defRPr sz="4400">
+                <a:solidFill>
+                  <a:srgbClr val="EDF2F7"/>
+                </a:solidFill>
+              </a:defRPr>
             </a:pPr>
             <a:r>
-              <a:rPr/>
-              <a:t>Cleaning</a:t>
-            </a:r>
-            <a:r>
-              <a:rPr/>
+              <a:rPr sz="2800">
+                <a:solidFill>
+                  <a:srgbClr val="E0E7EC"/>
+                </a:solidFill>
+              </a:rPr>
+              <a:t>Raw</a:t>
+            </a:r>
+            <a:r>
+              <a:rPr sz="2800">
+                <a:solidFill>
+                  <a:srgbClr val="E0E7EC"/>
+                </a:solidFill>
+              </a:rPr>
               <a:t> </a:t>
             </a:r>
             <a:r>
-              <a:rPr/>
-              <a:t>Pipeline</a:t>
-            </a:r>
-          </a:p>
-        </p:txBody>
-      </p:sp>
-      <p:sp>
-        <p:nvSpPr>
-          <p:cNvPr id="3" name="Content Placeholder 2"/>
-          <p:cNvSpPr>
-            <a:spLocks noGrp="1"/>
-          </p:cNvSpPr>
-          <p:nvPr>
-            <p:ph idx="1"/>
-          </p:nvPr>
-        </p:nvSpPr>
-        <p:spPr/>
-        <p:txBody>
-          <a:bodyPr/>
-          <a:lstStyle/>
-          <a:p>
-            <a:pPr lvl="1"/>
-            <a:r>
-              <a:rPr/>
-              <a:t>Trim leading/trailing NaN runs with </a:t>
-            </a:r>
-            <a:r>
-              <a:rPr>
-                <a:latin typeface="Courier"/>
-              </a:rPr>
-              <a:t>trim_start_end_nans</a:t>
-            </a:r>
-          </a:p>
-          <a:p>
-            <a:pPr lvl="1"/>
-            <a:r>
-              <a:rPr/>
-              <a:t>Resample daily for visualization, but keep hourly data for modeling</a:t>
-            </a:r>
-          </a:p>
-          <a:p>
-            <a:pPr lvl="1"/>
-            <a:r>
-              <a:rPr/>
-              <a:t>PCHIP interpolation to fill interior gaps without step artefacts</a:t>
-            </a:r>
-          </a:p>
-          <a:p>
-            <a:pPr lvl="1"/>
-            <a:r>
-              <a:rPr/>
-              <a:t>Savitzky–Golay smoothing (window = 20) to suppress probe noise without lagging events</a:t>
-            </a:r>
-          </a:p>
-        </p:txBody>
-      </p:sp>
-    </p:spTree>
-  </p:cSld>
-</p:sld>
-</file>
-
-<file path=ppt/slides/slide6.xml><?xml version="1.0" encoding="utf-8"?>
-<p:sld xmlns:a="http://schemas.openxmlformats.org/drawingml/2006/main" xmlns:r="http://schemas.openxmlformats.org/officeDocument/2006/relationships" xmlns:p="http://schemas.openxmlformats.org/presentationml/2006/main">
-  <p:cSld>
-    <p:spTree>
-      <p:nvGrpSpPr>
-        <p:cNvPr id="1" name=""/>
-        <p:cNvGrpSpPr/>
-        <p:nvPr/>
-      </p:nvGrpSpPr>
-      <p:grpSpPr>
-        <a:xfrm>
-          <a:off x="0" y="0"/>
-          <a:ext cx="0" cy="0"/>
-          <a:chOff x="0" y="0"/>
-          <a:chExt cx="0" cy="0"/>
-        </a:xfrm>
-      </p:grpSpPr>
+              <a:rPr sz="2800">
+                <a:solidFill>
+                  <a:srgbClr val="E0E7EC"/>
+                </a:solidFill>
+              </a:rPr>
+              <a:t>Signal</a:t>
+            </a:r>
+            <a:r>
+              <a:rPr sz="2800">
+                <a:solidFill>
+                  <a:srgbClr val="E0E7EC"/>
+                </a:solidFill>
+              </a:rPr>
+              <a:t> </a:t>
+            </a:r>
+            <a:r>
+              <a:rPr sz="2800">
+                <a:solidFill>
+                  <a:srgbClr val="E0E7EC"/>
+                </a:solidFill>
+              </a:rPr>
+              <a:t>Behaviour</a:t>
+            </a:r>
+          </a:p>
+        </p:txBody>
+      </p:sp>
       <p:pic>
         <p:nvPicPr>
-          <p:cNvPr descr="images/data_cleaning_plot2003.png" id="0" name="Picture 1"/>
+          <p:cNvPr descr="images/vwc_cleaning_highlight.png" id="0" name="Picture 1"/>
           <p:cNvPicPr>
             <a:picLocks noGrp="1" noChangeAspect="1"/>
           </p:cNvPicPr>
@@ -4925,17 +5953,34 @@
           <a:p>
             <a:pPr lvl="0" marL="0" indent="0" algn="ctr">
               <a:buNone/>
+              <a:defRPr sz="2800">
+                <a:solidFill>
+                  <a:srgbClr val="E0E7EC"/>
+                </a:solidFill>
+              </a:defRPr>
             </a:pPr>
             <a:r>
-              <a:rPr/>
+              <a:rPr sz="2800">
+                <a:solidFill>
+                  <a:srgbClr val="E0E7EC"/>
+                </a:solidFill>
+              </a:rPr>
               <a:t>Cleaning</a:t>
             </a:r>
             <a:r>
-              <a:rPr/>
+              <a:rPr sz="2800">
+                <a:solidFill>
+                  <a:srgbClr val="E0E7EC"/>
+                </a:solidFill>
+              </a:rPr>
               <a:t> </a:t>
             </a:r>
             <a:r>
-              <a:rPr/>
+              <a:rPr sz="2800">
+                <a:solidFill>
+                  <a:srgbClr val="E0E7EC"/>
+                </a:solidFill>
+              </a:rPr>
               <a:t>pipeline</a:t>
             </a:r>
           </a:p>
@@ -4949,6 +5994,14 @@
 <file path=ppt/slides/slide7.xml><?xml version="1.0" encoding="utf-8"?>
 <p:sld xmlns:a="http://schemas.openxmlformats.org/drawingml/2006/main" xmlns:r="http://schemas.openxmlformats.org/officeDocument/2006/relationships" xmlns:p="http://schemas.openxmlformats.org/presentationml/2006/main">
   <p:cSld>
+    <p:bg>
+      <p:bgPr>
+        <a:solidFill>
+          <a:srgbClr val="10212B"/>
+        </a:solidFill>
+        <a:effectLst/>
+      </p:bgPr>
+    </p:bg>
     <p:spTree>
       <p:nvGrpSpPr>
         <p:cNvPr id="1" name=""/>
@@ -4965,12 +6018,12 @@
       </p:grpSpPr>
       <p:sp>
         <p:nvSpPr>
-          <p:cNvPr id="2" name="Title 1"/>
-          <p:cNvSpPr>
-            <a:spLocks noGrp="1"/>
-          </p:cNvSpPr>
-          <p:nvPr>
-            <p:ph type="title"/>
+          <p:cNvPr id="3" name="Content Placeholder 2"/>
+          <p:cNvSpPr>
+            <a:spLocks noGrp="1"/>
+          </p:cNvSpPr>
+          <p:nvPr>
+            <p:ph idx="1"/>
           </p:nvPr>
         </p:nvSpPr>
         <p:spPr/>
@@ -4978,94 +6031,37 @@
           <a:bodyPr/>
           <a:lstStyle/>
           <a:p>
-            <a:pPr lvl="0" marL="0" indent="0">
-              <a:buNone/>
+            <a:pPr lvl="1">
+              <a:defRPr sz="2400">
+                <a:solidFill>
+                  <a:srgbClr val="E0E7EC"/>
+                </a:solidFill>
+              </a:defRPr>
             </a:pPr>
             <a:r>
-              <a:rPr/>
-              <a:t>Feature</a:t>
-            </a:r>
-            <a:r>
-              <a:rPr/>
-              <a:t> </a:t>
-            </a:r>
-            <a:r>
-              <a:rPr/>
-              <a:t>Engineering</a:t>
-            </a:r>
-          </a:p>
-        </p:txBody>
-      </p:sp>
-      <p:sp>
-        <p:nvSpPr>
-          <p:cNvPr id="3" name="Content Placeholder 2"/>
-          <p:cNvSpPr>
-            <a:spLocks noGrp="1"/>
-          </p:cNvSpPr>
-          <p:nvPr>
-            <p:ph idx="1"/>
-          </p:nvPr>
-        </p:nvSpPr>
-        <p:spPr/>
-        <p:txBody>
-          <a:bodyPr/>
-          <a:lstStyle/>
-          <a:p>
-            <a:pPr lvl="1"/>
-            <a:r>
-              <a:rPr/>
-              <a:t>Spike flags: </a:t>
-            </a:r>
-            <a:r>
-              <a:rPr>
-                <a:latin typeface="Courier"/>
-              </a:rPr>
-              <a:t>VWC_*_spike_up/down</a:t>
-            </a:r>
-            <a:r>
-              <a:rPr/>
-              <a:t> capture ±15 % day-to-day jumps</a:t>
-            </a:r>
-          </a:p>
-          <a:p>
-            <a:pPr lvl="1"/>
-            <a:r>
-              <a:rPr/>
-              <a:t>Irrigation history: </a:t>
-            </a:r>
-            <a:r>
-              <a:rPr>
-                <a:latin typeface="Courier"/>
-              </a:rPr>
-              <a:t>time_since_last_significant_precip</a:t>
-            </a:r>
-            <a:r>
-              <a:rPr/>
-              <a:t>, </a:t>
-            </a:r>
-            <a:r>
-              <a:rPr>
-                <a:latin typeface="Courier"/>
-              </a:rPr>
-              <a:t>time_since_last_half_max_precip</a:t>
-            </a:r>
-            <a:r>
-              <a:rPr/>
-              <a:t>, rolling 7-day cumulative</a:t>
-            </a:r>
-          </a:p>
-          <a:p>
-            <a:pPr lvl="1"/>
-            <a:r>
-              <a:rPr/>
-              <a:t>Log transform + binary flag for irrigation to boost rare-event visibility</a:t>
-            </a:r>
-          </a:p>
-          <a:p>
-            <a:pPr lvl="1"/>
-            <a:r>
-              <a:rPr/>
-              <a:t>Mean-centering + first-difference derivatives for each VWC depth before scaling</a:t>
+              <a:rPr sz="2400">
+                <a:solidFill>
+                  <a:srgbClr val="E0E7EC"/>
+                </a:solidFill>
+              </a:rPr>
+              <a:t>Hourly VWC oscillates with sensor noise and irrigation pulses</a:t>
+            </a:r>
+          </a:p>
+          <a:p>
+            <a:pPr lvl="1">
+              <a:defRPr sz="2400">
+                <a:solidFill>
+                  <a:srgbClr val="E0E7EC"/>
+                </a:solidFill>
+              </a:defRPr>
+            </a:pPr>
+            <a:r>
+              <a:rPr sz="2400">
+                <a:solidFill>
+                  <a:srgbClr val="E0E7EC"/>
+                </a:solidFill>
+              </a:rPr>
+              <a:t>Daily averaging + Savitzky–Golay smooth preserves irrigation signature without dulling peaks</a:t>
             </a:r>
           </a:p>
         </p:txBody>
@@ -5078,6 +6074,14 @@
 <file path=ppt/slides/slide8.xml><?xml version="1.0" encoding="utf-8"?>
 <p:sld xmlns:a="http://schemas.openxmlformats.org/drawingml/2006/main" xmlns:r="http://schemas.openxmlformats.org/officeDocument/2006/relationships" xmlns:p="http://schemas.openxmlformats.org/presentationml/2006/main">
   <p:cSld>
+    <p:bg>
+      <p:bgPr>
+        <a:solidFill>
+          <a:srgbClr val="10212B"/>
+        </a:solidFill>
+        <a:effectLst/>
+      </p:bgPr>
+    </p:bg>
     <p:spTree>
       <p:nvGrpSpPr>
         <p:cNvPr id="1" name=""/>
@@ -5109,26 +6113,51 @@
           <a:p>
             <a:pPr lvl="0" marL="0" indent="0">
               <a:buNone/>
+              <a:defRPr sz="4400">
+                <a:solidFill>
+                  <a:srgbClr val="EDF2F7"/>
+                </a:solidFill>
+              </a:defRPr>
             </a:pPr>
             <a:r>
-              <a:rPr/>
-              <a:t>Reduced</a:t>
-            </a:r>
-            <a:r>
-              <a:rPr/>
+              <a:rPr sz="2800">
+                <a:solidFill>
+                  <a:srgbClr val="E0E7EC"/>
+                </a:solidFill>
+              </a:rPr>
+              <a:t>Domain</a:t>
+            </a:r>
+            <a:r>
+              <a:rPr sz="2800">
+                <a:solidFill>
+                  <a:srgbClr val="E0E7EC"/>
+                </a:solidFill>
+              </a:rPr>
               <a:t> </a:t>
             </a:r>
             <a:r>
-              <a:rPr/>
-              <a:t>Feature</a:t>
-            </a:r>
-            <a:r>
-              <a:rPr/>
+              <a:rPr sz="2800">
+                <a:solidFill>
+                  <a:srgbClr val="E0E7EC"/>
+                </a:solidFill>
+              </a:rPr>
+              <a:t>Clean-up</a:t>
+            </a:r>
+            <a:r>
+              <a:rPr sz="2800">
+                <a:solidFill>
+                  <a:srgbClr val="E0E7EC"/>
+                </a:solidFill>
+              </a:rPr>
               <a:t> </a:t>
             </a:r>
             <a:r>
-              <a:rPr/>
-              <a:t>Set</a:t>
+              <a:rPr sz="2800">
+                <a:solidFill>
+                  <a:srgbClr val="E0E7EC"/>
+                </a:solidFill>
+              </a:rPr>
+              <a:t>Moves</a:t>
             </a:r>
           </a:p>
         </p:txBody>
@@ -5140,7 +6169,7 @@
             <a:spLocks noGrp="1"/>
           </p:cNvSpPr>
           <p:nvPr>
-            <p:ph idx="1"/>
+            <p:ph sz="half" idx="1"/>
           </p:nvPr>
         </p:nvSpPr>
         <p:spPr/>
@@ -5148,24 +6177,156 @@
           <a:bodyPr/>
           <a:lstStyle/>
           <a:p>
-            <a:pPr lvl="1"/>
-            <a:r>
-              <a:rPr/>
-              <a:t>After cuts: 17 continuous + 3 VWC targets + 3 VWC derivatives + irrigation flag</a:t>
-            </a:r>
-          </a:p>
-          <a:p>
-            <a:pPr lvl="1"/>
-            <a:r>
-              <a:rPr/>
-              <a:t>Drops include: categorical crop/growth stage (sparse), VWC_42 (noisy), redundant weather extrema combinations</a:t>
-            </a:r>
-          </a:p>
-          <a:p>
-            <a:pPr lvl="1"/>
-            <a:r>
-              <a:rPr/>
-              <a:t>Scaling via buffered MinMaxScaler preserves future headroom (±30 %)</a:t>
+            <a:pPr lvl="1">
+              <a:defRPr sz="2400">
+                <a:solidFill>
+                  <a:srgbClr val="E0E7EC"/>
+                </a:solidFill>
+              </a:defRPr>
+            </a:pPr>
+            <a:r>
+              <a:rPr sz="2400">
+                <a:solidFill>
+                  <a:srgbClr val="E0E7EC"/>
+                </a:solidFill>
+              </a:rPr>
+              <a:t>PCHIP interpolation retraces the natural recharge/decay curve</a:t>
+            </a:r>
+          </a:p>
+          <a:p>
+            <a:pPr lvl="1">
+              <a:defRPr sz="2400">
+                <a:solidFill>
+                  <a:srgbClr val="E0E7EC"/>
+                </a:solidFill>
+              </a:defRPr>
+            </a:pPr>
+            <a:r>
+              <a:rPr sz="2400">
+                <a:solidFill>
+                  <a:srgbClr val="E0E7EC"/>
+                </a:solidFill>
+              </a:rPr>
+              <a:t>15% spike flags isolate true irrigation jumps from drift</a:t>
+            </a:r>
+          </a:p>
+          <a:p>
+            <a:pPr lvl="1">
+              <a:defRPr sz="2400">
+                <a:solidFill>
+                  <a:srgbClr val="E0E7EC"/>
+                </a:solidFill>
+              </a:defRPr>
+            </a:pPr>
+            <a:r>
+              <a:rPr sz="2400">
+                <a:solidFill>
+                  <a:srgbClr val="E0E7EC"/>
+                </a:solidFill>
+              </a:rPr>
+              <a:t>Rolling 7-day precipitation = our soil water budget proxy</a:t>
+            </a:r>
+          </a:p>
+          <a:p>
+            <a:pPr lvl="1">
+              <a:defRPr sz="2400">
+                <a:solidFill>
+                  <a:srgbClr val="E0E7EC"/>
+                </a:solidFill>
+              </a:defRPr>
+            </a:pPr>
+            <a:r>
+              <a:rPr sz="2400">
+                <a:solidFill>
+                  <a:srgbClr val="E0E7EC"/>
+                </a:solidFill>
+              </a:rPr>
+              <a:t>Log transform + binary flag emphasise rare irrigation events</a:t>
+            </a:r>
+          </a:p>
+        </p:txBody>
+      </p:sp>
+      <p:pic>
+        <p:nvPicPr>
+          <p:cNvPr descr="images/vwc_spike_flags.png" id="0" name="Picture 1"/>
+          <p:cNvPicPr>
+            <a:picLocks noGrp="1" noChangeAspect="1"/>
+          </p:cNvPicPr>
+          <p:nvPr/>
+        </p:nvPicPr>
+        <p:blipFill>
+          <a:blip r:embed="rId2"/>
+          <a:stretch>
+            <a:fillRect/>
+          </a:stretch>
+        </p:blipFill>
+        <p:spPr bwMode="auto">
+          <a:xfrm>
+            <a:off x="4648200" y="2590800"/>
+            <a:ext cx="4038600" cy="2019300"/>
+          </a:xfrm>
+          <a:prstGeom prst="rect">
+            <a:avLst/>
+          </a:prstGeom>
+          <a:noFill/>
+          <a:ln w="9525">
+            <a:noFill/>
+            <a:headEnd/>
+            <a:tailEnd/>
+          </a:ln>
+        </p:spPr>
+      </p:pic>
+      <p:sp>
+        <p:nvSpPr>
+          <p:cNvPr id="1" name="TextBox 3"/>
+          <p:cNvSpPr txBox="1"/>
+          <p:nvPr/>
+        </p:nvSpPr>
+        <p:spPr>
+          <a:xfrm>
+            <a:off x="4648200" y="5613400"/>
+            <a:ext cx="4038600" cy="508000"/>
+          </a:xfrm>
+          <a:prstGeom prst="rect">
+            <a:avLst/>
+          </a:prstGeom>
+          <a:noFill/>
+        </p:spPr>
+        <p:txBody>
+          <a:bodyPr/>
+          <a:lstStyle/>
+          <a:p>
+            <a:pPr lvl="0" marL="0" indent="0" algn="ctr">
+              <a:buNone/>
+              <a:defRPr sz="2800">
+                <a:solidFill>
+                  <a:srgbClr val="E0E7EC"/>
+                </a:solidFill>
+              </a:defRPr>
+            </a:pPr>
+            <a:r>
+              <a:rPr sz="2800">
+                <a:solidFill>
+                  <a:srgbClr val="E0E7EC"/>
+                </a:solidFill>
+              </a:rPr>
+              <a:t>Spike</a:t>
+            </a:r>
+            <a:r>
+              <a:rPr sz="2800">
+                <a:solidFill>
+                  <a:srgbClr val="E0E7EC"/>
+                </a:solidFill>
+              </a:rPr>
+              <a:t> </a:t>
+            </a:r>
+            <a:r>
+              <a:rPr sz="2800">
+                <a:solidFill>
+                  <a:srgbClr val="E0E7EC"/>
+                </a:solidFill>
+              </a:rPr>
+              <a:t>flags</a:t>
             </a:r>
           </a:p>
         </p:txBody>
@@ -5178,6 +6339,14 @@
 <file path=ppt/slides/slide9.xml><?xml version="1.0" encoding="utf-8"?>
 <p:sld xmlns:a="http://schemas.openxmlformats.org/drawingml/2006/main" xmlns:r="http://schemas.openxmlformats.org/officeDocument/2006/relationships" xmlns:p="http://schemas.openxmlformats.org/presentationml/2006/main">
   <p:cSld>
+    <p:bg>
+      <p:bgPr>
+        <a:solidFill>
+          <a:srgbClr val="10212B"/>
+        </a:solidFill>
+        <a:effectLst/>
+      </p:bgPr>
+    </p:bg>
     <p:spTree>
       <p:nvGrpSpPr>
         <p:cNvPr id="1" name=""/>
@@ -5209,68 +6378,120 @@
           <a:p>
             <a:pPr lvl="0" marL="0" indent="0">
               <a:buNone/>
+              <a:defRPr sz="4400">
+                <a:solidFill>
+                  <a:srgbClr val="EDF2F7"/>
+                </a:solidFill>
+              </a:defRPr>
             </a:pPr>
             <a:r>
-              <a:rPr/>
-              <a:t>Training</a:t>
-            </a:r>
-            <a:r>
-              <a:rPr/>
+              <a:rPr sz="2800">
+                <a:solidFill>
+                  <a:srgbClr val="E0E7EC"/>
+                </a:solidFill>
+              </a:rPr>
+              <a:t>Feature</a:t>
+            </a:r>
+            <a:r>
+              <a:rPr sz="2800">
+                <a:solidFill>
+                  <a:srgbClr val="E0E7EC"/>
+                </a:solidFill>
+              </a:rPr>
               <a:t> </a:t>
             </a:r>
             <a:r>
-              <a:rPr/>
-              <a:t>Workflow</a:t>
-            </a:r>
-          </a:p>
-        </p:txBody>
-      </p:sp>
-      <p:sp>
-        <p:nvSpPr>
-          <p:cNvPr id="3" name="Content Placeholder 2"/>
-          <p:cNvSpPr>
-            <a:spLocks noGrp="1"/>
-          </p:cNvSpPr>
-          <p:nvPr>
-            <p:ph idx="1"/>
-          </p:nvPr>
-        </p:nvSpPr>
-        <p:spPr/>
-        <p:txBody>
-          <a:bodyPr/>
-          <a:lstStyle/>
-          <a:p>
-            <a:pPr lvl="1"/>
-            <a:r>
-              <a:rPr/>
-              <a:t>Sliding window: 7-day input (168 hourly steps) → 4-day horizon (96 hourly steps)</a:t>
-            </a:r>
-          </a:p>
-          <a:p>
-            <a:pPr lvl="1"/>
-            <a:r>
-              <a:rPr/>
-              <a:t>TimeSeriesSplit (5 folds) intended for cross-plot validation, but bug feeds only first plot’s folds → limited generalization</a:t>
-            </a:r>
-          </a:p>
-          <a:p>
-            <a:pPr lvl="1"/>
-            <a:r>
-              <a:rPr/>
-              <a:t>LSTM stack: 512→256→128→128→64 with dropout + L2; Dense reshaped to horizon × targets</a:t>
-            </a:r>
-          </a:p>
-          <a:p>
-            <a:pPr lvl="1"/>
-            <a:r>
-              <a:rPr/>
-              <a:t>Early stopping on mean fold MSE; best weights saved in </a:t>
-            </a:r>
-            <a:r>
-              <a:rPr>
-                <a:latin typeface="Courier"/>
-              </a:rPr>
-              <a:t>LSTM_dayhour/</a:t>
+              <a:rPr sz="2800">
+                <a:solidFill>
+                  <a:srgbClr val="E0E7EC"/>
+                </a:solidFill>
+              </a:rPr>
+              <a:t>Decisions</a:t>
+            </a:r>
+          </a:p>
+        </p:txBody>
+      </p:sp>
+      <p:pic>
+        <p:nvPicPr>
+          <p:cNvPr descr="images/feature_selection_matrix.png" id="0" name="Picture 1"/>
+          <p:cNvPicPr>
+            <a:picLocks noGrp="1" noChangeAspect="1"/>
+          </p:cNvPicPr>
+          <p:nvPr/>
+        </p:nvPicPr>
+        <p:blipFill>
+          <a:blip r:embed="rId2"/>
+          <a:stretch>
+            <a:fillRect/>
+          </a:stretch>
+        </p:blipFill>
+        <p:spPr bwMode="auto">
+          <a:xfrm>
+            <a:off x="2552700" y="1600200"/>
+            <a:ext cx="4025900" cy="4013200"/>
+          </a:xfrm>
+          <a:prstGeom prst="rect">
+            <a:avLst/>
+          </a:prstGeom>
+          <a:noFill/>
+          <a:ln w="9525">
+            <a:noFill/>
+            <a:headEnd/>
+            <a:tailEnd/>
+          </a:ln>
+        </p:spPr>
+      </p:pic>
+      <p:sp>
+        <p:nvSpPr>
+          <p:cNvPr id="1" name="TextBox 3"/>
+          <p:cNvSpPr txBox="1"/>
+          <p:nvPr/>
+        </p:nvSpPr>
+        <p:spPr>
+          <a:xfrm>
+            <a:off x="457200" y="5613400"/>
+            <a:ext cx="8229600" cy="508000"/>
+          </a:xfrm>
+          <a:prstGeom prst="rect">
+            <a:avLst/>
+          </a:prstGeom>
+          <a:noFill/>
+        </p:spPr>
+        <p:txBody>
+          <a:bodyPr/>
+          <a:lstStyle/>
+          <a:p>
+            <a:pPr lvl="0" marL="0" indent="0" algn="ctr">
+              <a:buNone/>
+              <a:defRPr sz="2800">
+                <a:solidFill>
+                  <a:srgbClr val="E0E7EC"/>
+                </a:solidFill>
+              </a:defRPr>
+            </a:pPr>
+            <a:r>
+              <a:rPr sz="2800">
+                <a:solidFill>
+                  <a:srgbClr val="E0E7EC"/>
+                </a:solidFill>
+              </a:rPr>
+              <a:t>Feature</a:t>
+            </a:r>
+            <a:r>
+              <a:rPr sz="2800">
+                <a:solidFill>
+                  <a:srgbClr val="E0E7EC"/>
+                </a:solidFill>
+              </a:rPr>
+              <a:t> </a:t>
+            </a:r>
+            <a:r>
+              <a:rPr sz="2800">
+                <a:solidFill>
+                  <a:srgbClr val="E0E7EC"/>
+                </a:solidFill>
+              </a:rPr>
+              <a:t>selection</a:t>
             </a:r>
           </a:p>
         </p:txBody>

</xml_diff>

<commit_message>
Add lesson-focused visuals and update deck
</commit_message>
<xml_diff>
--- a/presentation/eda_story/eda_story.pptx
+++ b/presentation/eda_story/eda_story.pptx
@@ -6,17 +6,14 @@
   </p:sldMasterIdLst>
   <p:sldIdLst>
     <p:sldId id="256" r:id="rId7"/>
-    <p:sldId id="257" r:id="rId8"/>
-    <p:sldId id="258" r:id="rId9"/>
-    <p:sldId id="259" r:id="rId10"/>
-    <p:sldId id="260" r:id="rId11"/>
-    <p:sldId id="261" r:id="rId12"/>
-    <p:sldId id="262" r:id="rId13"/>
-    <p:sldId id="263" r:id="rId14"/>
-    <p:sldId id="264" r:id="rId15"/>
-    <p:sldId id="265" r:id="rId16"/>
-    <p:sldId id="266" r:id="rId17"/>
-    <p:sldId id="267" r:id="rId18"/>
+    <p:sldId id="257" r:id="rId9"/>
+    <p:sldId id="258" r:id="rId10"/>
+    <p:sldId id="259" r:id="rId11"/>
+    <p:sldId id="260" r:id="rId12"/>
+    <p:sldId id="261" r:id="rId13"/>
+    <p:sldId id="262" r:id="rId14"/>
+    <p:sldId id="263" r:id="rId15"/>
+    <p:sldId id="264" r:id="rId16"/>
   </p:sldIdLst>
   <p:sldSz cx="9144000" cy="6858000" type="screen4x3"/>
   <p:notesSz cx="6858000" cy="9144000"/>
@@ -116,6 +113,426 @@
     </a:lvl9pPr>
   </p:defaultTextStyle>
 </p:presentation>
+</file>
+
+<file path=ppt/notesMasters/notesMaster1.xml><?xml version="1.0" encoding="utf-8"?>
+<p:notesMaster xmlns:a="http://schemas.openxmlformats.org/drawingml/2006/main" xmlns:p="http://schemas.openxmlformats.org/presentationml/2006/main" xmlns:r="http://schemas.openxmlformats.org/officeDocument/2006/relationships">
+  <p:cSld>
+    <p:bg>
+      <p:bgRef idx="1001">
+        <a:schemeClr val="bg1"/>
+      </p:bgRef>
+    </p:bg>
+    <p:spTree>
+      <p:nvGrpSpPr>
+        <p:cNvPr id="1" name=""/>
+        <p:cNvGrpSpPr/>
+        <p:nvPr/>
+      </p:nvGrpSpPr>
+      <p:grpSpPr>
+        <a:xfrm>
+          <a:off x="0" y="0"/>
+          <a:ext cx="0" cy="0"/>
+          <a:chOff x="0" y="0"/>
+          <a:chExt cx="0" cy="0"/>
+        </a:xfrm>
+      </p:grpSpPr>
+      <p:sp>
+        <p:nvSpPr>
+          <p:cNvPr id="2" name="Header Placeholder 1"/>
+          <p:cNvSpPr>
+            <a:spLocks noGrp="1"/>
+          </p:cNvSpPr>
+          <p:nvPr>
+            <p:ph type="hdr" sz="quarter"/>
+          </p:nvPr>
+        </p:nvSpPr>
+        <p:spPr>
+          <a:xfrm>
+            <a:off x="0" y="0"/>
+            <a:ext cx="2971800" cy="457200"/>
+          </a:xfrm>
+          <a:prstGeom prst="rect">
+            <a:avLst/>
+          </a:prstGeom>
+        </p:spPr>
+        <p:txBody>
+          <a:bodyPr vert="horz" lIns="91440" tIns="45720" rIns="91440" bIns="45720" rtlCol="0"/>
+          <a:lstStyle>
+            <a:lvl1pPr algn="l">
+              <a:defRPr sz="1200"/>
+            </a:lvl1pPr>
+          </a:lstStyle>
+          <a:p>
+            <a:endParaRPr lang="en-US"/>
+          </a:p>
+        </p:txBody>
+      </p:sp>
+      <p:sp>
+        <p:nvSpPr>
+          <p:cNvPr id="3" name="Date Placeholder 2"/>
+          <p:cNvSpPr>
+            <a:spLocks noGrp="1"/>
+          </p:cNvSpPr>
+          <p:nvPr>
+            <p:ph type="dt" idx="1"/>
+          </p:nvPr>
+        </p:nvSpPr>
+        <p:spPr>
+          <a:xfrm>
+            <a:off x="3884613" y="0"/>
+            <a:ext cx="2971800" cy="457200"/>
+          </a:xfrm>
+          <a:prstGeom prst="rect">
+            <a:avLst/>
+          </a:prstGeom>
+        </p:spPr>
+        <p:txBody>
+          <a:bodyPr vert="horz" lIns="91440" tIns="45720" rIns="91440" bIns="45720" rtlCol="0"/>
+          <a:lstStyle>
+            <a:lvl1pPr algn="r">
+              <a:defRPr sz="1200"/>
+            </a:lvl1pPr>
+          </a:lstStyle>
+          <a:p>
+            <a:fld id="{0F89C1C7-3DCD-1040-A9CF-14679D8B5DDD}" type="datetimeFigureOut">
+              <a:rPr lang="en-US" smtClean="0"/>
+              <a:t>10/17/16</a:t>
+            </a:fld>
+            <a:endParaRPr lang="en-US"/>
+          </a:p>
+        </p:txBody>
+      </p:sp>
+      <p:sp>
+        <p:nvSpPr>
+          <p:cNvPr id="4" name="Slide Image Placeholder 3"/>
+          <p:cNvSpPr>
+            <a:spLocks noGrp="1" noRot="1" noChangeAspect="1"/>
+          </p:cNvSpPr>
+          <p:nvPr>
+            <p:ph type="sldImg" idx="2"/>
+          </p:nvPr>
+        </p:nvSpPr>
+        <p:spPr>
+          <a:xfrm>
+            <a:off x="1143000" y="685800"/>
+            <a:ext cx="4572000" cy="3429000"/>
+          </a:xfrm>
+          <a:prstGeom prst="rect">
+            <a:avLst/>
+          </a:prstGeom>
+          <a:noFill/>
+          <a:ln w="12700">
+            <a:solidFill>
+              <a:prstClr val="black"/>
+            </a:solidFill>
+          </a:ln>
+        </p:spPr>
+        <p:txBody>
+          <a:bodyPr vert="horz" lIns="91440" tIns="45720" rIns="91440" bIns="45720" rtlCol="0" anchor="ctr"/>
+          <a:lstStyle/>
+          <a:p>
+            <a:endParaRPr lang="en-US"/>
+          </a:p>
+        </p:txBody>
+      </p:sp>
+      <p:sp>
+        <p:nvSpPr>
+          <p:cNvPr id="5" name="Notes Placeholder 4"/>
+          <p:cNvSpPr>
+            <a:spLocks noGrp="1"/>
+          </p:cNvSpPr>
+          <p:nvPr>
+            <p:ph type="body" sz="quarter" idx="3"/>
+          </p:nvPr>
+        </p:nvSpPr>
+        <p:spPr>
+          <a:xfrm>
+            <a:off x="685800" y="4343400"/>
+            <a:ext cx="5486400" cy="4114800"/>
+          </a:xfrm>
+          <a:prstGeom prst="rect">
+            <a:avLst/>
+          </a:prstGeom>
+        </p:spPr>
+        <p:txBody>
+          <a:bodyPr vert="horz" lIns="91440" tIns="45720" rIns="91440" bIns="45720" rtlCol="0"/>
+          <a:lstStyle/>
+          <a:p>
+            <a:pPr lvl="0"/>
+            <a:r>
+              <a:rPr lang="en-US" smtClean="0"/>
+              <a:t>Click to edit Master text styles</a:t>
+            </a:r>
+          </a:p>
+          <a:p>
+            <a:pPr lvl="1"/>
+            <a:r>
+              <a:rPr lang="en-US" smtClean="0"/>
+              <a:t>Second level</a:t>
+            </a:r>
+          </a:p>
+          <a:p>
+            <a:pPr lvl="2"/>
+            <a:r>
+              <a:rPr lang="en-US" smtClean="0"/>
+              <a:t>Third level</a:t>
+            </a:r>
+          </a:p>
+          <a:p>
+            <a:pPr lvl="3"/>
+            <a:r>
+              <a:rPr lang="en-US" smtClean="0"/>
+              <a:t>Fourth level</a:t>
+            </a:r>
+          </a:p>
+          <a:p>
+            <a:pPr lvl="4"/>
+            <a:r>
+              <a:rPr lang="en-US" smtClean="0"/>
+              <a:t>Fifth level</a:t>
+            </a:r>
+            <a:endParaRPr lang="en-US"/>
+          </a:p>
+        </p:txBody>
+      </p:sp>
+      <p:sp>
+        <p:nvSpPr>
+          <p:cNvPr id="6" name="Footer Placeholder 5"/>
+          <p:cNvSpPr>
+            <a:spLocks noGrp="1"/>
+          </p:cNvSpPr>
+          <p:nvPr>
+            <p:ph type="ftr" sz="quarter" idx="4"/>
+          </p:nvPr>
+        </p:nvSpPr>
+        <p:spPr>
+          <a:xfrm>
+            <a:off x="0" y="8685213"/>
+            <a:ext cx="2971800" cy="457200"/>
+          </a:xfrm>
+          <a:prstGeom prst="rect">
+            <a:avLst/>
+          </a:prstGeom>
+        </p:spPr>
+        <p:txBody>
+          <a:bodyPr vert="horz" lIns="91440" tIns="45720" rIns="91440" bIns="45720" rtlCol="0" anchor="b"/>
+          <a:lstStyle>
+            <a:lvl1pPr algn="l">
+              <a:defRPr sz="1200"/>
+            </a:lvl1pPr>
+          </a:lstStyle>
+          <a:p>
+            <a:endParaRPr lang="en-US"/>
+          </a:p>
+        </p:txBody>
+      </p:sp>
+      <p:sp>
+        <p:nvSpPr>
+          <p:cNvPr id="7" name="Slide Number Placeholder 6"/>
+          <p:cNvSpPr>
+            <a:spLocks noGrp="1"/>
+          </p:cNvSpPr>
+          <p:nvPr>
+            <p:ph type="sldNum" sz="quarter" idx="5"/>
+          </p:nvPr>
+        </p:nvSpPr>
+        <p:spPr>
+          <a:xfrm>
+            <a:off x="3884613" y="8685213"/>
+            <a:ext cx="2971800" cy="457200"/>
+          </a:xfrm>
+          <a:prstGeom prst="rect">
+            <a:avLst/>
+          </a:prstGeom>
+        </p:spPr>
+        <p:txBody>
+          <a:bodyPr vert="horz" lIns="91440" tIns="45720" rIns="91440" bIns="45720" rtlCol="0" anchor="b"/>
+          <a:lstStyle>
+            <a:lvl1pPr algn="r">
+              <a:defRPr sz="1200"/>
+            </a:lvl1pPr>
+          </a:lstStyle>
+          <a:p>
+            <a:fld id="{BB5E49A5-4136-284D-997B-48E1D791AD67}" type="slidenum">
+              <a:rPr lang="en-US" smtClean="0"/>
+              <a:t>‹#›</a:t>
+            </a:fld>
+            <a:endParaRPr lang="en-US"/>
+          </a:p>
+        </p:txBody>
+      </p:sp>
+    </p:spTree>
+    <p:extLst>
+      <p:ext uri="{BB962C8B-B14F-4D97-AF65-F5344CB8AC3E}">
+        <p14:creationId xmlns:p14="http://schemas.microsoft.com/office/powerpoint/2010/main" val="2623252185"/>
+      </p:ext>
+    </p:extLst>
+  </p:cSld>
+  <p:clrMap bg1="lt1" tx1="dk1" bg2="lt2" tx2="dk2" accent1="accent1" accent2="accent2" accent3="accent3" accent4="accent4" accent5="accent5" accent6="accent6" hlink="hlink" folHlink="folHlink"/>
+  <p:notesStyle>
+    <a:lvl1pPr marL="0" algn="l" defTabSz="457200" rtl="0" eaLnBrk="1" latinLnBrk="0" hangingPunct="1">
+      <a:defRPr sz="1200" kern="1200">
+        <a:solidFill>
+          <a:schemeClr val="tx1"/>
+        </a:solidFill>
+        <a:latin typeface="+mn-lt"/>
+        <a:ea typeface="+mn-ea"/>
+        <a:cs typeface="+mn-cs"/>
+      </a:defRPr>
+    </a:lvl1pPr>
+    <a:lvl2pPr marL="457200" algn="l" defTabSz="457200" rtl="0" eaLnBrk="1" latinLnBrk="0" hangingPunct="1">
+      <a:defRPr sz="1200" kern="1200">
+        <a:solidFill>
+          <a:schemeClr val="tx1"/>
+        </a:solidFill>
+        <a:latin typeface="+mn-lt"/>
+        <a:ea typeface="+mn-ea"/>
+        <a:cs typeface="+mn-cs"/>
+      </a:defRPr>
+    </a:lvl2pPr>
+    <a:lvl3pPr marL="914400" algn="l" defTabSz="457200" rtl="0" eaLnBrk="1" latinLnBrk="0" hangingPunct="1">
+      <a:defRPr sz="1200" kern="1200">
+        <a:solidFill>
+          <a:schemeClr val="tx1"/>
+        </a:solidFill>
+        <a:latin typeface="+mn-lt"/>
+        <a:ea typeface="+mn-ea"/>
+        <a:cs typeface="+mn-cs"/>
+      </a:defRPr>
+    </a:lvl3pPr>
+    <a:lvl4pPr marL="1371600" algn="l" defTabSz="457200" rtl="0" eaLnBrk="1" latinLnBrk="0" hangingPunct="1">
+      <a:defRPr sz="1200" kern="1200">
+        <a:solidFill>
+          <a:schemeClr val="tx1"/>
+        </a:solidFill>
+        <a:latin typeface="+mn-lt"/>
+        <a:ea typeface="+mn-ea"/>
+        <a:cs typeface="+mn-cs"/>
+      </a:defRPr>
+    </a:lvl4pPr>
+    <a:lvl5pPr marL="1828800" algn="l" defTabSz="457200" rtl="0" eaLnBrk="1" latinLnBrk="0" hangingPunct="1">
+      <a:defRPr sz="1200" kern="1200">
+        <a:solidFill>
+          <a:schemeClr val="tx1"/>
+        </a:solidFill>
+        <a:latin typeface="+mn-lt"/>
+        <a:ea typeface="+mn-ea"/>
+        <a:cs typeface="+mn-cs"/>
+      </a:defRPr>
+    </a:lvl5pPr>
+    <a:lvl6pPr marL="2286000" algn="l" defTabSz="457200" rtl="0" eaLnBrk="1" latinLnBrk="0" hangingPunct="1">
+      <a:defRPr sz="1200" kern="1200">
+        <a:solidFill>
+          <a:schemeClr val="tx1"/>
+        </a:solidFill>
+        <a:latin typeface="+mn-lt"/>
+        <a:ea typeface="+mn-ea"/>
+        <a:cs typeface="+mn-cs"/>
+      </a:defRPr>
+    </a:lvl6pPr>
+    <a:lvl7pPr marL="2743200" algn="l" defTabSz="457200" rtl="0" eaLnBrk="1" latinLnBrk="0" hangingPunct="1">
+      <a:defRPr sz="1200" kern="1200">
+        <a:solidFill>
+          <a:schemeClr val="tx1"/>
+        </a:solidFill>
+        <a:latin typeface="+mn-lt"/>
+        <a:ea typeface="+mn-ea"/>
+        <a:cs typeface="+mn-cs"/>
+      </a:defRPr>
+    </a:lvl7pPr>
+    <a:lvl8pPr marL="3200400" algn="l" defTabSz="457200" rtl="0" eaLnBrk="1" latinLnBrk="0" hangingPunct="1">
+      <a:defRPr sz="1200" kern="1200">
+        <a:solidFill>
+          <a:schemeClr val="tx1"/>
+        </a:solidFill>
+        <a:latin typeface="+mn-lt"/>
+        <a:ea typeface="+mn-ea"/>
+        <a:cs typeface="+mn-cs"/>
+      </a:defRPr>
+    </a:lvl8pPr>
+    <a:lvl9pPr marL="3657600" algn="l" defTabSz="457200" rtl="0" eaLnBrk="1" latinLnBrk="0" hangingPunct="1">
+      <a:defRPr sz="1200" kern="1200">
+        <a:solidFill>
+          <a:schemeClr val="tx1"/>
+        </a:solidFill>
+        <a:latin typeface="+mn-lt"/>
+        <a:ea typeface="+mn-ea"/>
+        <a:cs typeface="+mn-cs"/>
+      </a:defRPr>
+    </a:lvl9pPr>
+  </p:notesStyle>
+</p:notesMaster>
+</file>
+
+<file path=ppt/notesSlides/notesSlide1.xml><?xml version="1.0" encoding="utf-8"?>
+<p:notes xmlns:a="http://schemas.openxmlformats.org/drawingml/2006/main" xmlns:p="http://schemas.openxmlformats.org/presentationml/2006/main" xmlns:r="http://schemas.openxmlformats.org/officeDocument/2006/relationships">
+  <p:cSld>
+    <p:spTree>
+      <p:nvGrpSpPr>
+        <p:cNvPr id="1" name=""/>
+        <p:cNvGrpSpPr/>
+        <p:nvPr/>
+      </p:nvGrpSpPr>
+      <p:grpSpPr>
+        <a:xfrm>
+          <a:off x="0" y="0"/>
+          <a:ext cx="0" cy="0"/>
+          <a:chOff x="0" y="0"/>
+          <a:chExt cx="0" cy="0"/>
+        </a:xfrm>
+      </p:grpSpPr>
+      <p:sp>
+        <p:nvSpPr>
+          <p:cNvPr id="2" name="Slide Image Placeholder 1"/>
+          <p:cNvSpPr>
+            <a:spLocks noGrp="1"/>
+          </p:cNvSpPr>
+          <p:nvPr>
+            <p:ph type="sldImg" idx="2"/>
+          </p:nvPr>
+        </p:nvSpPr>
+        <p:spPr/>
+      </p:sp>
+      <p:sp>
+        <p:nvSpPr>
+          <p:cNvPr id="3" name="Notes Placeholder 2"/>
+          <p:cNvSpPr>
+            <a:spLocks noGrp="1"/>
+          </p:cNvSpPr>
+          <p:nvPr>
+            <p:ph type="body" idx="3" sz="quarter"/>
+          </p:nvPr>
+        </p:nvSpPr>
+        <p:spPr/>
+        <p:txBody>
+          <a:bodyPr/>
+          <a:lstStyle/>
+          <a:p>
+            <a:r>
+              <a:t>Use this slide to insert real photos of the hardware and pipeline schematic.</a:t>
+            </a:r>
+          </a:p>
+        </p:txBody>
+      </p:sp>
+      <p:sp>
+        <p:nvSpPr>
+          <p:cNvPr id="4" name="Slide Number Placeholder 3"/>
+          <p:cNvSpPr>
+            <a:spLocks noGrp="1"/>
+          </p:cNvSpPr>
+          <p:nvPr>
+            <p:ph type="sldNum" idx="5" sz="quarter"/>
+          </p:nvPr>
+        </p:nvSpPr>
+        <p:spPr/>
+      </p:sp>
+    </p:spTree>
+  </p:cSld>
+  <p:clrMapOvr>
+    <a:masterClrMapping/>
+  </p:clrMapOvr>
+</p:notes>
 </file>
 
 <file path=ppt/slideLayouts/slideLayout1.xml><?xml version="1.0" encoding="utf-8"?>
@@ -3095,7 +3512,7 @@
     <p:bg>
       <p:bgPr>
         <a:solidFill>
-          <a:srgbClr val="101C24"/>
+          <a:srgbClr val="0E1A24"/>
         </a:solidFill>
         <a:effectLst/>
       </p:bgPr>
@@ -3116,7 +3533,7 @@
         <p:spPr>
           <a:xfrm>
             <a:off x="457200" y="320040"/>
-            <a:ext cx="8229600" cy="914400"/>
+            <a:ext cx="8412480" cy="1097280"/>
           </a:xfrm>
           <a:prstGeom prst="rect">
             <a:avLst/>
@@ -3132,12 +3549,12 @@
             <a:pPr>
               <a:defRPr sz="4000" b="1">
                 <a:solidFill>
-                  <a:srgbClr val="ECF2F8"/>
+                  <a:srgbClr val="F5F8FC"/>
                 </a:solidFill>
               </a:defRPr>
             </a:pPr>
             <a:r>
-              <a:t>soil moisture automation needs sensor context so here is the field we logged...</a:t>
+              <a:t>soil moisture automation starts with sensors to lorawan to your database...</a:t>
             </a:r>
           </a:p>
         </p:txBody>
@@ -3150,8 +3567,8 @@
         </p:nvSpPr>
         <p:spPr>
           <a:xfrm>
-            <a:off x="457200" y="1463040"/>
-            <a:ext cx="4114800" cy="4206240"/>
+            <a:off x="640080" y="1463040"/>
+            <a:ext cx="7863840" cy="4389120"/>
           </a:xfrm>
           <a:prstGeom prst="rect">
             <a:avLst/>
@@ -3170,12 +3587,12 @@
               </a:spcAft>
               <a:defRPr sz="2600">
                 <a:solidFill>
-                  <a:srgbClr val="DCE6EC"/>
+                  <a:srgbClr val="E0E8F0"/>
                 </a:solidFill>
               </a:defRPr>
             </a:pPr>
             <a:r>
-              <a:t>lorawan nodes sample volumetric water content at 6, 18, and 30 inch depths every hour</a:t>
+              <a:t>placeholder: swap in your sensor and gateway montage showing how probes stream data</a:t>
             </a:r>
           </a:p>
           <a:p>
@@ -3185,486 +3602,12 @@
               </a:spcAft>
               <a:defRPr sz="2600">
                 <a:solidFill>
-                  <a:srgbClr val="DCE6EC"/>
+                  <a:srgbClr val="E0E8F0"/>
                 </a:solidFill>
               </a:defRPr>
             </a:pPr>
             <a:r>
-              <a:t>the weather mast streams air temperature, humidity, wind, canopy temperature, and rainfall</a:t>
-            </a:r>
-          </a:p>
-          <a:p>
-            <a:pPr>
-              <a:spcAft>
-                <a:spcPts val="400"/>
-              </a:spcAft>
-              <a:defRPr sz="2600">
-                <a:solidFill>
-                  <a:srgbClr val="DCE6EC"/>
-                </a:solidFill>
-              </a:defRPr>
-            </a:pPr>
-            <a:r>
-              <a:t>irrigation totals sync from the controller so agronomists see actuations alongside sensors</a:t>
-            </a:r>
-          </a:p>
-        </p:txBody>
-      </p:sp>
-      <p:pic>
-        <p:nvPicPr>
-          <p:cNvPr id="4" name="Picture 3" descr="sensor_layout_placeholder.png"/>
-          <p:cNvPicPr>
-            <a:picLocks noChangeAspect="1"/>
-          </p:cNvPicPr>
-          <p:nvPr/>
-        </p:nvPicPr>
-        <p:blipFill>
-          <a:blip r:embed="rId2"/>
-          <a:stretch>
-            <a:fillRect/>
-          </a:stretch>
-        </p:blipFill>
-        <p:spPr>
-          <a:xfrm>
-            <a:off x="4754880" y="1463040"/>
-            <a:ext cx="4389120" cy="3291840"/>
-          </a:xfrm>
-          <a:prstGeom prst="rect">
-            <a:avLst/>
-          </a:prstGeom>
-        </p:spPr>
-      </p:pic>
-    </p:spTree>
-  </p:cSld>
-  <p:clrMapOvr>
-    <a:masterClrMapping/>
-  </p:clrMapOvr>
-</p:sld>
-</file>
-
-<file path=ppt/slides/slide10.xml><?xml version="1.0" encoding="utf-8"?>
-<p:sld xmlns:a="http://schemas.openxmlformats.org/drawingml/2006/main" xmlns:p="http://schemas.openxmlformats.org/presentationml/2006/main" xmlns:r="http://schemas.openxmlformats.org/officeDocument/2006/relationships">
-  <p:cSld>
-    <p:bg>
-      <p:bgPr>
-        <a:solidFill>
-          <a:srgbClr val="101C24"/>
-        </a:solidFill>
-        <a:effectLst/>
-      </p:bgPr>
-    </p:bg>
-    <p:spTree>
-      <p:nvGrpSpPr>
-        <p:cNvPr id="1" name=""/>
-        <p:cNvGrpSpPr/>
-        <p:nvPr/>
-      </p:nvGrpSpPr>
-      <p:grpSpPr/>
-      <p:sp>
-        <p:nvSpPr>
-          <p:cNvPr id="2" name="TextBox 1"/>
-          <p:cNvSpPr txBox="1"/>
-          <p:nvPr/>
-        </p:nvSpPr>
-        <p:spPr>
-          <a:xfrm>
-            <a:off x="457200" y="320040"/>
-            <a:ext cx="8229600" cy="914400"/>
-          </a:xfrm>
-          <a:prstGeom prst="rect">
-            <a:avLst/>
-          </a:prstGeom>
-          <a:noFill/>
-        </p:spPr>
-        <p:txBody>
-          <a:bodyPr wrap="square">
-            <a:spAutoFit/>
-          </a:bodyPr>
-          <a:lstStyle/>
-          <a:p>
-            <a:pPr>
-              <a:defRPr sz="4000" b="1">
-                <a:solidFill>
-                  <a:srgbClr val="ECF2F8"/>
-                </a:solidFill>
-              </a:defRPr>
-            </a:pPr>
-            <a:r>
-              <a:t>plot 2015 lags forty eight hours proving the fold reuse bug and irrigation imbalance...</a:t>
-            </a:r>
-          </a:p>
-        </p:txBody>
-      </p:sp>
-      <p:sp>
-        <p:nvSpPr>
-          <p:cNvPr id="3" name="TextBox 2"/>
-          <p:cNvSpPr txBox="1"/>
-          <p:nvPr/>
-        </p:nvSpPr>
-        <p:spPr>
-          <a:xfrm>
-            <a:off x="457200" y="1463040"/>
-            <a:ext cx="4114800" cy="4206240"/>
-          </a:xfrm>
-          <a:prstGeom prst="rect">
-            <a:avLst/>
-          </a:prstGeom>
-          <a:noFill/>
-        </p:spPr>
-        <p:txBody>
-          <a:bodyPr wrap="square">
-            <a:spAutoFit/>
-          </a:bodyPr>
-          <a:lstStyle/>
-          <a:p>
-            <a:pPr>
-              <a:spcAft>
-                <a:spcPts val="400"/>
-              </a:spcAft>
-              <a:defRPr sz="2600">
-                <a:solidFill>
-                  <a:srgbClr val="DCE6EC"/>
-                </a:solidFill>
-              </a:defRPr>
-            </a:pPr>
-            <a:r>
-              <a:t>forecasts trail the observed rebound by roughly two days across depths</a:t>
-            </a:r>
-          </a:p>
-          <a:p>
-            <a:pPr>
-              <a:spcAft>
-                <a:spcPts val="400"/>
-              </a:spcAft>
-              <a:defRPr sz="2600">
-                <a:solidFill>
-                  <a:srgbClr val="DCE6EC"/>
-                </a:solidFill>
-              </a:defRPr>
-            </a:pPr>
-            <a:r>
-              <a:t>training data lacked aggressive irrigation cycles represented in this plot</a:t>
-            </a:r>
-          </a:p>
-          <a:p>
-            <a:pPr>
-              <a:spcAft>
-                <a:spcPts val="400"/>
-              </a:spcAft>
-              <a:defRPr sz="2600">
-                <a:solidFill>
-                  <a:srgbClr val="DCE6EC"/>
-                </a:solidFill>
-              </a:defRPr>
-            </a:pPr>
-            <a:r>
-              <a:t>fixing the fold logic ensures each site contributes sequences and stops this lag</a:t>
-            </a:r>
-          </a:p>
-        </p:txBody>
-      </p:sp>
-      <p:pic>
-        <p:nvPicPr>
-          <p:cNvPr id="4" name="Picture 3" descr="pred_vs_actual_plot2015.png"/>
-          <p:cNvPicPr>
-            <a:picLocks noChangeAspect="1"/>
-          </p:cNvPicPr>
-          <p:nvPr/>
-        </p:nvPicPr>
-        <p:blipFill>
-          <a:blip r:embed="rId2"/>
-          <a:stretch>
-            <a:fillRect/>
-          </a:stretch>
-        </p:blipFill>
-        <p:spPr>
-          <a:xfrm>
-            <a:off x="4754880" y="1463040"/>
-            <a:ext cx="4389120" cy="2918219"/>
-          </a:xfrm>
-          <a:prstGeom prst="rect">
-            <a:avLst/>
-          </a:prstGeom>
-        </p:spPr>
-      </p:pic>
-    </p:spTree>
-  </p:cSld>
-  <p:clrMapOvr>
-    <a:masterClrMapping/>
-  </p:clrMapOvr>
-</p:sld>
-</file>
-
-<file path=ppt/slides/slide11.xml><?xml version="1.0" encoding="utf-8"?>
-<p:sld xmlns:a="http://schemas.openxmlformats.org/drawingml/2006/main" xmlns:p="http://schemas.openxmlformats.org/presentationml/2006/main" xmlns:r="http://schemas.openxmlformats.org/officeDocument/2006/relationships">
-  <p:cSld>
-    <p:bg>
-      <p:bgPr>
-        <a:solidFill>
-          <a:srgbClr val="101C24"/>
-        </a:solidFill>
-        <a:effectLst/>
-      </p:bgPr>
-    </p:bg>
-    <p:spTree>
-      <p:nvGrpSpPr>
-        <p:cNvPr id="1" name=""/>
-        <p:cNvGrpSpPr/>
-        <p:nvPr/>
-      </p:nvGrpSpPr>
-      <p:grpSpPr/>
-      <p:sp>
-        <p:nvSpPr>
-          <p:cNvPr id="2" name="TextBox 1"/>
-          <p:cNvSpPr txBox="1"/>
-          <p:nvPr/>
-        </p:nvSpPr>
-        <p:spPr>
-          <a:xfrm>
-            <a:off x="457200" y="320040"/>
-            <a:ext cx="8229600" cy="914400"/>
-          </a:xfrm>
-          <a:prstGeom prst="rect">
-            <a:avLst/>
-          </a:prstGeom>
-          <a:noFill/>
-        </p:spPr>
-        <p:txBody>
-          <a:bodyPr wrap="square">
-            <a:spAutoFit/>
-          </a:bodyPr>
-          <a:lstStyle/>
-          <a:p>
-            <a:pPr>
-              <a:defRPr sz="4000" b="1">
-                <a:solidFill>
-                  <a:srgbClr val="ECF2F8"/>
-                </a:solidFill>
-              </a:defRPr>
-            </a:pPr>
-            <a:r>
-              <a:t>injection experiments fail because features never recompute and scaling shifts the inputs...</a:t>
-            </a:r>
-          </a:p>
-        </p:txBody>
-      </p:sp>
-      <p:sp>
-        <p:nvSpPr>
-          <p:cNvPr id="3" name="TextBox 2"/>
-          <p:cNvSpPr txBox="1"/>
-          <p:nvPr/>
-        </p:nvSpPr>
-        <p:spPr>
-          <a:xfrm>
-            <a:off x="457200" y="1463040"/>
-            <a:ext cx="4114800" cy="4206240"/>
-          </a:xfrm>
-          <a:prstGeom prst="rect">
-            <a:avLst/>
-          </a:prstGeom>
-          <a:noFill/>
-        </p:spPr>
-        <p:txBody>
-          <a:bodyPr wrap="square">
-            <a:spAutoFit/>
-          </a:bodyPr>
-          <a:lstStyle/>
-          <a:p>
-            <a:pPr>
-              <a:spcAft>
-                <a:spcPts val="400"/>
-              </a:spcAft>
-              <a:defRPr sz="2600">
-                <a:solidFill>
-                  <a:srgbClr val="DCE6EC"/>
-                </a:solidFill>
-              </a:defRPr>
-            </a:pPr>
-            <a:r>
-              <a:t>water gets added after scaling so engineered features like logs and cumulative sums stay frozen</a:t>
-            </a:r>
-          </a:p>
-          <a:p>
-            <a:pPr>
-              <a:spcAft>
-                <a:spcPts val="400"/>
-              </a:spcAft>
-              <a:defRPr sz="2600">
-                <a:solidFill>
-                  <a:srgbClr val="DCE6EC"/>
-                </a:solidFill>
-              </a:defRPr>
-            </a:pPr>
-            <a:r>
-              <a:t>scaled precip irrigation exceeds its buffered range which pushes the network off manifold</a:t>
-            </a:r>
-          </a:p>
-          <a:p>
-            <a:pPr>
-              <a:spcAft>
-                <a:spcPts val="400"/>
-              </a:spcAft>
-              <a:defRPr sz="2600">
-                <a:solidFill>
-                  <a:srgbClr val="DCE6EC"/>
-                </a:solidFill>
-              </a:defRPr>
-            </a:pPr>
-            <a:r>
-              <a:t>with little cross plot diversity the lstm defaults to trend continuation instead of reacting</a:t>
-            </a:r>
-          </a:p>
-        </p:txBody>
-      </p:sp>
-      <p:pic>
-        <p:nvPicPr>
-          <p:cNvPr id="4" name="Picture 3" descr="irrigation_injection_failure.png"/>
-          <p:cNvPicPr>
-            <a:picLocks noChangeAspect="1"/>
-          </p:cNvPicPr>
-          <p:nvPr/>
-        </p:nvPicPr>
-        <p:blipFill>
-          <a:blip r:embed="rId2"/>
-          <a:stretch>
-            <a:fillRect/>
-          </a:stretch>
-        </p:blipFill>
-        <p:spPr>
-          <a:xfrm>
-            <a:off x="4754880" y="1463040"/>
-            <a:ext cx="4389120" cy="4391573"/>
-          </a:xfrm>
-          <a:prstGeom prst="rect">
-            <a:avLst/>
-          </a:prstGeom>
-        </p:spPr>
-      </p:pic>
-    </p:spTree>
-  </p:cSld>
-  <p:clrMapOvr>
-    <a:masterClrMapping/>
-  </p:clrMapOvr>
-</p:sld>
-</file>
-
-<file path=ppt/slides/slide12.xml><?xml version="1.0" encoding="utf-8"?>
-<p:sld xmlns:a="http://schemas.openxmlformats.org/drawingml/2006/main" xmlns:p="http://schemas.openxmlformats.org/presentationml/2006/main" xmlns:r="http://schemas.openxmlformats.org/officeDocument/2006/relationships">
-  <p:cSld>
-    <p:bg>
-      <p:bgPr>
-        <a:solidFill>
-          <a:srgbClr val="101C24"/>
-        </a:solidFill>
-        <a:effectLst/>
-      </p:bgPr>
-    </p:bg>
-    <p:spTree>
-      <p:nvGrpSpPr>
-        <p:cNvPr id="1" name=""/>
-        <p:cNvGrpSpPr/>
-        <p:nvPr/>
-      </p:nvGrpSpPr>
-      <p:grpSpPr/>
-      <p:sp>
-        <p:nvSpPr>
-          <p:cNvPr id="2" name="TextBox 1"/>
-          <p:cNvSpPr txBox="1"/>
-          <p:nvPr/>
-        </p:nvSpPr>
-        <p:spPr>
-          <a:xfrm>
-            <a:off x="457200" y="320040"/>
-            <a:ext cx="8229600" cy="914400"/>
-          </a:xfrm>
-          <a:prstGeom prst="rect">
-            <a:avLst/>
-          </a:prstGeom>
-          <a:noFill/>
-        </p:spPr>
-        <p:txBody>
-          <a:bodyPr wrap="square">
-            <a:spAutoFit/>
-          </a:bodyPr>
-          <a:lstStyle/>
-          <a:p>
-            <a:pPr>
-              <a:defRPr sz="4000" b="1">
-                <a:solidFill>
-                  <a:srgbClr val="ECF2F8"/>
-                </a:solidFill>
-              </a:defRPr>
-            </a:pPr>
-            <a:r>
-              <a:t>lessons fuel next season so data prep stays but the modeling stack evolves...</a:t>
-            </a:r>
-          </a:p>
-        </p:txBody>
-      </p:sp>
-      <p:sp>
-        <p:nvSpPr>
-          <p:cNvPr id="3" name="TextBox 2"/>
-          <p:cNvSpPr txBox="1"/>
-          <p:nvPr/>
-        </p:nvSpPr>
-        <p:spPr>
-          <a:xfrm>
-            <a:off x="731520" y="1463040"/>
-            <a:ext cx="7680960" cy="4389120"/>
-          </a:xfrm>
-          <a:prstGeom prst="rect">
-            <a:avLst/>
-          </a:prstGeom>
-          <a:noFill/>
-        </p:spPr>
-        <p:txBody>
-          <a:bodyPr wrap="square">
-            <a:spAutoFit/>
-          </a:bodyPr>
-          <a:lstStyle/>
-          <a:p>
-            <a:pPr>
-              <a:spcAft>
-                <a:spcPts val="400"/>
-              </a:spcAft>
-              <a:defRPr sz="2600">
-                <a:solidFill>
-                  <a:srgbClr val="DCE6EC"/>
-                </a:solidFill>
-              </a:defRPr>
-            </a:pPr>
-            <a:r>
-              <a:t>current pipeline delivers clean engineered datasets ready for retraining and sharing</a:t>
-            </a:r>
-          </a:p>
-          <a:p>
-            <a:pPr>
-              <a:spcAft>
-                <a:spcPts val="400"/>
-              </a:spcAft>
-              <a:defRPr sz="2600">
-                <a:solidFill>
-                  <a:srgbClr val="DCE6EC"/>
-                </a:solidFill>
-              </a:defRPr>
-            </a:pPr>
-            <a:r>
-              <a:t>next iteration will recompute features before sensitivity tests and repair fold reuse</a:t>
-            </a:r>
-          </a:p>
-          <a:p>
-            <a:pPr>
-              <a:spcAft>
-                <a:spcPts val="400"/>
-              </a:spcAft>
-              <a:defRPr sz="2600">
-                <a:solidFill>
-                  <a:srgbClr val="DCE6EC"/>
-                </a:solidFill>
-              </a:defRPr>
-            </a:pPr>
-            <a:r>
-              <a:t>documented findings become onboarding material for agronomists and the controls team</a:t>
+              <a:t>placeholder: drop pipeline diagram from probes → lorawan → processing → sqlite store</a:t>
             </a:r>
           </a:p>
         </p:txBody>
@@ -3683,7 +3626,7 @@
     <p:bg>
       <p:bgPr>
         <a:solidFill>
-          <a:srgbClr val="101C24"/>
+          <a:srgbClr val="0E1A24"/>
         </a:solidFill>
         <a:effectLst/>
       </p:bgPr>
@@ -3704,7 +3647,7 @@
         <p:spPr>
           <a:xfrm>
             <a:off x="457200" y="320040"/>
-            <a:ext cx="8229600" cy="914400"/>
+            <a:ext cx="8412480" cy="1097280"/>
           </a:xfrm>
           <a:prstGeom prst="rect">
             <a:avLst/>
@@ -3720,12 +3663,12 @@
             <a:pPr>
               <a:defRPr sz="4000" b="1">
                 <a:solidFill>
-                  <a:srgbClr val="ECF2F8"/>
+                  <a:srgbClr val="F5F8FC"/>
                 </a:solidFill>
               </a:defRPr>
             </a:pPr>
             <a:r>
-              <a:t>before modeling we check coverage so you see the telemetry gaps...</a:t>
+              <a:t>lesson one check the raw ingest so you know the season span and anomalies...</a:t>
             </a:r>
           </a:p>
         </p:txBody>
@@ -3738,8 +3681,8 @@
         </p:nvSpPr>
         <p:spPr>
           <a:xfrm>
-            <a:off x="457200" y="1463040"/>
-            <a:ext cx="4114800" cy="4206240"/>
+            <a:off x="640080" y="1463040"/>
+            <a:ext cx="7863840" cy="4389120"/>
           </a:xfrm>
           <a:prstGeom prst="rect">
             <a:avLst/>
@@ -3758,12 +3701,12 @@
               </a:spcAft>
               <a:defRPr sz="2600">
                 <a:solidFill>
-                  <a:srgbClr val="DCE6EC"/>
+                  <a:srgbClr val="E0E8F0"/>
                 </a:solidFill>
               </a:defRPr>
             </a:pPr>
             <a:r>
-              <a:t>core soil moisture and weather channels exceed eighty percent availability for the season</a:t>
+              <a:t>eleven week window per plot covering july nineteenth to october thirteenth twenty twenty three</a:t>
             </a:r>
           </a:p>
           <a:p>
@@ -3773,12 +3716,12 @@
               </a:spcAft>
               <a:defRPr sz="2600">
                 <a:solidFill>
-                  <a:srgbClr val="DCE6EC"/>
+                  <a:srgbClr val="E0E8F0"/>
                 </a:solidFill>
               </a:defRPr>
             </a:pPr>
             <a:r>
-              <a:t>stress indices such as cwsi swsi and daily et stayed too sparse to trust in training</a:t>
+              <a:t>raw extract shows hourly rows with duplicated timestamps and sensor flatlines to flag</a:t>
             </a:r>
           </a:p>
           <a:p>
@@ -3788,40 +3731,16 @@
               </a:spcAft>
               <a:defRPr sz="2600">
                 <a:solidFill>
-                  <a:srgbClr val="DCE6EC"/>
+                  <a:srgbClr val="E0E8F0"/>
                 </a:solidFill>
               </a:defRPr>
             </a:pPr>
             <a:r>
-              <a:t>categorical crop and growth stage notes were largely absent so we excluded them</a:t>
-            </a:r>
-          </a:p>
-        </p:txBody>
-      </p:sp>
-      <p:pic>
-        <p:nvPicPr>
-          <p:cNvPr id="4" name="Picture 3" descr="feature_missingness.png"/>
-          <p:cNvPicPr>
-            <a:picLocks noChangeAspect="1"/>
-          </p:cNvPicPr>
-          <p:nvPr/>
-        </p:nvPicPr>
-        <p:blipFill>
-          <a:blip r:embed="rId2"/>
-          <a:stretch>
-            <a:fillRect/>
-          </a:stretch>
-        </p:blipFill>
-        <p:spPr>
-          <a:xfrm>
-            <a:off x="4754880" y="1463040"/>
-            <a:ext cx="4389120" cy="2926080"/>
-          </a:xfrm>
-          <a:prstGeom prst="rect">
-            <a:avLst/>
-          </a:prstGeom>
-        </p:spPr>
-      </p:pic>
+              <a:t>clean sample snippet reveals sorted indices and engineered time columns ready for modeling</a:t>
+            </a:r>
+          </a:p>
+        </p:txBody>
+      </p:sp>
     </p:spTree>
   </p:cSld>
   <p:clrMapOvr>
@@ -3836,7 +3755,7 @@
     <p:bg>
       <p:bgPr>
         <a:solidFill>
-          <a:srgbClr val="101C24"/>
+          <a:srgbClr val="0E1A24"/>
         </a:solidFill>
         <a:effectLst/>
       </p:bgPr>
@@ -3857,7 +3776,7 @@
         <p:spPr>
           <a:xfrm>
             <a:off x="457200" y="320040"/>
-            <a:ext cx="8229600" cy="914400"/>
+            <a:ext cx="8412480" cy="1097280"/>
           </a:xfrm>
           <a:prstGeom prst="rect">
             <a:avLst/>
@@ -3873,12 +3792,12 @@
             <a:pPr>
               <a:defRPr sz="4000" b="1">
                 <a:solidFill>
-                  <a:srgbClr val="ECF2F8"/>
+                  <a:srgbClr val="F5F8FC"/>
                 </a:solidFill>
               </a:defRPr>
             </a:pPr>
             <a:r>
-              <a:t>raw probes jitter so domain smoothing keeps irrigation pulses intact...</a:t>
+              <a:t>lesson two smooth without losing irrigation pulses so the agronomy signal stays crisp...</a:t>
             </a:r>
           </a:p>
         </p:txBody>
@@ -3892,7 +3811,7 @@
         <p:spPr>
           <a:xfrm>
             <a:off x="457200" y="1463040"/>
-            <a:ext cx="4114800" cy="4206240"/>
+            <a:ext cx="4206240" cy="4206240"/>
           </a:xfrm>
           <a:prstGeom prst="rect">
             <a:avLst/>
@@ -3911,12 +3830,12 @@
               </a:spcAft>
               <a:defRPr sz="2600">
                 <a:solidFill>
-                  <a:srgbClr val="DCE6EC"/>
+                  <a:srgbClr val="E0E8F0"/>
                 </a:solidFill>
               </a:defRPr>
             </a:pPr>
             <a:r>
-              <a:t>hourly volumetric water content is spiky because of sensor noise and extraction cycles</a:t>
+              <a:t>hourly vwc is noisy so we daily average then apply pchip interpolation to respect recharge</a:t>
             </a:r>
           </a:p>
           <a:p>
@@ -3926,12 +3845,12 @@
               </a:spcAft>
               <a:defRPr sz="2600">
                 <a:solidFill>
-                  <a:srgbClr val="DCE6EC"/>
+                  <a:srgbClr val="E0E8F0"/>
                 </a:solidFill>
               </a:defRPr>
             </a:pPr>
             <a:r>
-              <a:t>daily means plus pchip interpolation honour the recharge curve between irrigations</a:t>
+              <a:t>savitzky golay window of twenty one preserves irrigation peaks while suppressing jitter</a:t>
             </a:r>
           </a:p>
           <a:p>
@@ -3941,12 +3860,12 @@
               </a:spcAft>
               <a:defRPr sz="2600">
                 <a:solidFill>
-                  <a:srgbClr val="DCE6EC"/>
+                  <a:srgbClr val="E0E8F0"/>
                 </a:solidFill>
               </a:defRPr>
             </a:pPr>
             <a:r>
-              <a:t>a savitzky golay window of twenty one keeps irrigation peaks while suppressing jitter</a:t>
+              <a:t>resulting curve aligns with field behaviour and feeds the downstream feature engineering</a:t>
             </a:r>
           </a:p>
         </p:txBody>
@@ -3967,8 +3886,8 @@
         </p:blipFill>
         <p:spPr>
           <a:xfrm>
-            <a:off x="4754880" y="1463040"/>
-            <a:ext cx="4389120" cy="2194560"/>
+            <a:off x="4846320" y="1463040"/>
+            <a:ext cx="4297680" cy="2148840"/>
           </a:xfrm>
           <a:prstGeom prst="rect">
             <a:avLst/>
@@ -3989,7 +3908,7 @@
     <p:bg>
       <p:bgPr>
         <a:solidFill>
-          <a:srgbClr val="101C24"/>
+          <a:srgbClr val="0E1A24"/>
         </a:solidFill>
         <a:effectLst/>
       </p:bgPr>
@@ -4010,7 +3929,7 @@
         <p:spPr>
           <a:xfrm>
             <a:off x="457200" y="320040"/>
-            <a:ext cx="8229600" cy="914400"/>
+            <a:ext cx="8412480" cy="1097280"/>
           </a:xfrm>
           <a:prstGeom prst="rect">
             <a:avLst/>
@@ -4026,12 +3945,12 @@
             <a:pPr>
               <a:defRPr sz="4000" b="1">
                 <a:solidFill>
-                  <a:srgbClr val="ECF2F8"/>
+                  <a:srgbClr val="F5F8FC"/>
                 </a:solidFill>
               </a:defRPr>
             </a:pPr>
             <a:r>
-              <a:t>spike flags separate irrigation jumps from drift so alerts stay actionable...</a:t>
+              <a:t>lesson three engineer irrigation features that match how agronomists reason...</a:t>
             </a:r>
           </a:p>
         </p:txBody>
@@ -4044,8 +3963,8 @@
         </p:nvSpPr>
         <p:spPr>
           <a:xfrm>
-            <a:off x="457200" y="1463040"/>
-            <a:ext cx="4114800" cy="4206240"/>
+            <a:off x="640080" y="1463040"/>
+            <a:ext cx="7863840" cy="4389120"/>
           </a:xfrm>
           <a:prstGeom prst="rect">
             <a:avLst/>
@@ -4064,12 +3983,12 @@
               </a:spcAft>
               <a:defRPr sz="2600">
                 <a:solidFill>
-                  <a:srgbClr val="DCE6EC"/>
+                  <a:srgbClr val="E0E8F0"/>
                 </a:solidFill>
               </a:defRPr>
             </a:pPr>
             <a:r>
-              <a:t>we flag plus fifteen percent day over day jumps as irrigation or rainfall response candidates</a:t>
+              <a:t>log precipitation plus one shrinks outliers while binary irrigation flag marks actuator hits</a:t>
             </a:r>
           </a:p>
           <a:p>
@@ -4079,12 +3998,12 @@
               </a:spcAft>
               <a:defRPr sz="2600">
                 <a:solidFill>
-                  <a:srgbClr val="DCE6EC"/>
+                  <a:srgbClr val="E0E8F0"/>
                 </a:solidFill>
               </a:defRPr>
             </a:pPr>
             <a:r>
-              <a:t>minus fifteen percent drops reveal drainage events or sensor faults that need review</a:t>
+              <a:t>seven day cumulative precipitation approximates soil water budget for scheduling decisions</a:t>
             </a:r>
           </a:p>
           <a:p>
@@ -4094,40 +4013,16 @@
               </a:spcAft>
               <a:defRPr sz="2600">
                 <a:solidFill>
-                  <a:srgbClr val="DCE6EC"/>
+                  <a:srgbClr val="E0E8F0"/>
                 </a:solidFill>
               </a:defRPr>
             </a:pPr>
             <a:r>
-              <a:t>these flags feed downstream labelling and dashboard alerts for the irrigation team</a:t>
-            </a:r>
-          </a:p>
-        </p:txBody>
-      </p:sp>
-      <p:pic>
-        <p:nvPicPr>
-          <p:cNvPr id="4" name="Picture 3" descr="vwc_spike_flags.png"/>
-          <p:cNvPicPr>
-            <a:picLocks noChangeAspect="1"/>
-          </p:cNvPicPr>
-          <p:nvPr/>
-        </p:nvPicPr>
-        <p:blipFill>
-          <a:blip r:embed="rId2"/>
-          <a:stretch>
-            <a:fillRect/>
-          </a:stretch>
-        </p:blipFill>
-        <p:spPr>
-          <a:xfrm>
-            <a:off x="4754880" y="1463040"/>
-            <a:ext cx="4389120" cy="2194560"/>
-          </a:xfrm>
-          <a:prstGeom prst="rect">
-            <a:avLst/>
-          </a:prstGeom>
-        </p:spPr>
-      </p:pic>
+              <a:t>time since significant rainfall exposes stress buildup when irrigation is overdue</a:t>
+            </a:r>
+          </a:p>
+        </p:txBody>
+      </p:sp>
     </p:spTree>
   </p:cSld>
   <p:clrMapOvr>
@@ -4142,7 +4037,7 @@
     <p:bg>
       <p:bgPr>
         <a:solidFill>
-          <a:srgbClr val="101C24"/>
+          <a:srgbClr val="0E1A24"/>
         </a:solidFill>
         <a:effectLst/>
       </p:bgPr>
@@ -4163,7 +4058,7 @@
         <p:spPr>
           <a:xfrm>
             <a:off x="457200" y="320040"/>
-            <a:ext cx="8229600" cy="914400"/>
+            <a:ext cx="8412480" cy="1097280"/>
           </a:xfrm>
           <a:prstGeom prst="rect">
             <a:avLst/>
@@ -4179,12 +4074,12 @@
             <a:pPr>
               <a:defRPr sz="4000" b="1">
                 <a:solidFill>
-                  <a:srgbClr val="ECF2F8"/>
+                  <a:srgbClr val="F5F8FC"/>
                 </a:solidFill>
               </a:defRPr>
             </a:pPr>
             <a:r>
-              <a:t>we cut noisy channels and keep agronomy signals so the feature set stays focused...</a:t>
+              <a:t>lesson four document the cuts so teammates trust the feature buffet they inherit...</a:t>
             </a:r>
           </a:p>
         </p:txBody>
@@ -4197,8 +4092,8 @@
         </p:nvSpPr>
         <p:spPr>
           <a:xfrm>
-            <a:off x="457200" y="1463040"/>
-            <a:ext cx="4114800" cy="4206240"/>
+            <a:off x="640080" y="1463040"/>
+            <a:ext cx="7863840" cy="4389120"/>
           </a:xfrm>
           <a:prstGeom prst="rect">
             <a:avLst/>
@@ -4217,12 +4112,12 @@
               </a:spcAft>
               <a:defRPr sz="2600">
                 <a:solidFill>
-                  <a:srgbClr val="DCE6EC"/>
+                  <a:srgbClr val="E0E8F0"/>
                 </a:solidFill>
               </a:defRPr>
             </a:pPr>
             <a:r>
-              <a:t>retained features cover soil moisture layers, time of day encoding, weather load, and irrigation context</a:t>
+              <a:t>kept buckets: soil moisture layers, temporal encodings, weather loads, irrigation context</a:t>
             </a:r>
           </a:p>
           <a:p>
@@ -4232,12 +4127,12 @@
               </a:spcAft>
               <a:defRPr sz="2600">
                 <a:solidFill>
-                  <a:srgbClr val="DCE6EC"/>
+                  <a:srgbClr val="E0E8F0"/>
                 </a:solidFill>
               </a:defRPr>
             </a:pPr>
             <a:r>
-              <a:t>forty two inch probes showed persistent flatlines so we documented and removed them</a:t>
+              <a:t>removed bucket: forty two inch probe flatlines, sparse crop metadata, redundant elevation and stress indices</a:t>
             </a:r>
           </a:p>
           <a:p>
@@ -4247,40 +4142,16 @@
               </a:spcAft>
               <a:defRPr sz="2600">
                 <a:solidFill>
-                  <a:srgbClr val="DCE6EC"/>
+                  <a:srgbClr val="E0E8F0"/>
                 </a:solidFill>
               </a:defRPr>
             </a:pPr>
             <a:r>
-              <a:t>sparse crop metadata and redundant elevation columns were dropped to avoid leakage</a:t>
-            </a:r>
-          </a:p>
-        </p:txBody>
-      </p:sp>
-      <p:pic>
-        <p:nvPicPr>
-          <p:cNvPr id="4" name="Picture 3" descr="feature_selection_matrix.png"/>
-          <p:cNvPicPr>
-            <a:picLocks noChangeAspect="1"/>
-          </p:cNvPicPr>
-          <p:nvPr/>
-        </p:nvPicPr>
-        <p:blipFill>
-          <a:blip r:embed="rId2"/>
-          <a:stretch>
-            <a:fillRect/>
-          </a:stretch>
-        </p:blipFill>
-        <p:spPr>
-          <a:xfrm>
-            <a:off x="4754880" y="1463040"/>
-            <a:ext cx="4389120" cy="4375218"/>
-          </a:xfrm>
-          <a:prstGeom prst="rect">
-            <a:avLst/>
-          </a:prstGeom>
-        </p:spPr>
-      </p:pic>
+              <a:t>every cut is logged in the notebook so future seasons can revisit decisions quickly</a:t>
+            </a:r>
+          </a:p>
+        </p:txBody>
+      </p:sp>
     </p:spTree>
   </p:cSld>
   <p:clrMapOvr>
@@ -4295,7 +4166,7 @@
     <p:bg>
       <p:bgPr>
         <a:solidFill>
-          <a:srgbClr val="101C24"/>
+          <a:srgbClr val="0E1A24"/>
         </a:solidFill>
         <a:effectLst/>
       </p:bgPr>
@@ -4316,7 +4187,7 @@
         <p:spPr>
           <a:xfrm>
             <a:off x="457200" y="320040"/>
-            <a:ext cx="8229600" cy="914400"/>
+            <a:ext cx="8412480" cy="1097280"/>
           </a:xfrm>
           <a:prstGeom prst="rect">
             <a:avLst/>
@@ -4332,12 +4203,12 @@
             <a:pPr>
               <a:defRPr sz="4000" b="1">
                 <a:solidFill>
-                  <a:srgbClr val="ECF2F8"/>
+                  <a:srgbClr val="F5F8FC"/>
                 </a:solidFill>
               </a:defRPr>
             </a:pPr>
             <a:r>
-              <a:t>domain transforms teach the lstm to feel rates and actuator events...</a:t>
+              <a:t>lesson five explain the sequence framing before showing the model output...</a:t>
             </a:r>
           </a:p>
         </p:txBody>
@@ -4350,8 +4221,8 @@
         </p:nvSpPr>
         <p:spPr>
           <a:xfrm>
-            <a:off x="731520" y="1463040"/>
-            <a:ext cx="7680960" cy="4389120"/>
+            <a:off x="640080" y="1463040"/>
+            <a:ext cx="7863840" cy="4389120"/>
           </a:xfrm>
           <a:prstGeom prst="rect">
             <a:avLst/>
@@ -4370,12 +4241,12 @@
               </a:spcAft>
               <a:defRPr sz="2600">
                 <a:solidFill>
-                  <a:srgbClr val="DCE6EC"/>
+                  <a:srgbClr val="E0E8F0"/>
                 </a:solidFill>
               </a:defRPr>
             </a:pPr>
             <a:r>
-              <a:t>center each vwc depth per plot so the network learns deviations instead of static bias</a:t>
+              <a:t>seven day sliding window feeds the lstm with one hundred sixty eight hourly rows</a:t>
             </a:r>
           </a:p>
           <a:p>
@@ -4385,12 +4256,12 @@
               </a:spcAft>
               <a:defRPr sz="2600">
                 <a:solidFill>
-                  <a:srgbClr val="DCE6EC"/>
+                  <a:srgbClr val="E0E8F0"/>
                 </a:solidFill>
               </a:defRPr>
             </a:pPr>
             <a:r>
-              <a:t>compute delta vwc sub d of t equals vwc sub d of t minus vwc sub d of t minus one to encode drying velocity</a:t>
+              <a:t>forecast horizon of ninety six hours covers the next irrigation visit cycle</a:t>
             </a:r>
           </a:p>
           <a:p>
@@ -4400,12 +4271,12 @@
               </a:spcAft>
               <a:defRPr sz="2600">
                 <a:solidFill>
-                  <a:srgbClr val="DCE6EC"/>
+                  <a:srgbClr val="E0E8F0"/>
                 </a:solidFill>
               </a:defRPr>
             </a:pPr>
             <a:r>
-              <a:t>log transform precipitation plus one and add a binary irrigation flag to highlight rare events</a:t>
+              <a:t>diagram makes the input output relation obvious to both data folks and agronomists</a:t>
             </a:r>
           </a:p>
         </p:txBody>
@@ -4424,7 +4295,7 @@
     <p:bg>
       <p:bgPr>
         <a:solidFill>
-          <a:srgbClr val="101C24"/>
+          <a:srgbClr val="0E1A24"/>
         </a:solidFill>
         <a:effectLst/>
       </p:bgPr>
@@ -4445,7 +4316,7 @@
         <p:spPr>
           <a:xfrm>
             <a:off x="457200" y="320040"/>
-            <a:ext cx="8229600" cy="914400"/>
+            <a:ext cx="8412480" cy="1097280"/>
           </a:xfrm>
           <a:prstGeom prst="rect">
             <a:avLst/>
@@ -4461,12 +4332,12 @@
             <a:pPr>
               <a:defRPr sz="4000" b="1">
                 <a:solidFill>
-                  <a:srgbClr val="ECF2F8"/>
+                  <a:srgbClr val="F5F8FC"/>
                 </a:solidFill>
               </a:defRPr>
             </a:pPr>
             <a:r>
-              <a:t>sequence framing and regularized lstm capture a week of history before forecasting four days...</a:t>
+              <a:t>lesson six show case studies so audiences see what the model gets right and wrong...</a:t>
             </a:r>
           </a:p>
         </p:txBody>
@@ -4479,8 +4350,8 @@
         </p:nvSpPr>
         <p:spPr>
           <a:xfrm>
-            <a:off x="731520" y="1463040"/>
-            <a:ext cx="7680960" cy="4389120"/>
+            <a:off x="457200" y="1463040"/>
+            <a:ext cx="8229600" cy="1463040"/>
           </a:xfrm>
           <a:prstGeom prst="rect">
             <a:avLst/>
@@ -4499,12 +4370,12 @@
               </a:spcAft>
               <a:defRPr sz="2600">
                 <a:solidFill>
-                  <a:srgbClr val="DCE6EC"/>
+                  <a:srgbClr val="E0E8F0"/>
                 </a:solidFill>
               </a:defRPr>
             </a:pPr>
             <a:r>
-              <a:t>one hundred sixty eight hour input window aligns with irrigation planning cadence</a:t>
+              <a:t>plot two zero zero three surface layer tracks well yet deeper layers lag after irrigation</a:t>
             </a:r>
           </a:p>
           <a:p>
@@ -4514,12 +4385,12 @@
               </a:spcAft>
               <a:defRPr sz="2600">
                 <a:solidFill>
-                  <a:srgbClr val="DCE6EC"/>
+                  <a:srgbClr val="E0E8F0"/>
                 </a:solidFill>
               </a:defRPr>
             </a:pPr>
             <a:r>
-              <a:t>ninety six hour horizon meets the farm requirement for scheduling and monitoring</a:t>
+              <a:t>plot two zero one four bias high because dry down exemplars were missing in training</a:t>
             </a:r>
           </a:p>
           <a:p>
@@ -4529,156 +4400,12 @@
               </a:spcAft>
               <a:defRPr sz="2600">
                 <a:solidFill>
-                  <a:srgbClr val="DCE6EC"/>
+                  <a:srgbClr val="E0E8F0"/>
                 </a:solidFill>
               </a:defRPr>
             </a:pPr>
             <a:r>
-              <a:t>stacked five layer lstm 512 to 64 uses dropout and l2 regularisation to curb overfit</a:t>
-            </a:r>
-          </a:p>
-          <a:p>
-            <a:pPr>
-              <a:spcAft>
-                <a:spcPts val="400"/>
-              </a:spcAft>
-              <a:defRPr sz="2600">
-                <a:solidFill>
-                  <a:srgbClr val="DCE6EC"/>
-                </a:solidFill>
-              </a:defRPr>
-            </a:pPr>
-            <a:r>
-              <a:t>timeseriessplit was meant for leave one plot out yet the bug reused the first plot folds</a:t>
-            </a:r>
-          </a:p>
-        </p:txBody>
-      </p:sp>
-    </p:spTree>
-  </p:cSld>
-  <p:clrMapOvr>
-    <a:masterClrMapping/>
-  </p:clrMapOvr>
-</p:sld>
-</file>
-
-<file path=ppt/slides/slide8.xml><?xml version="1.0" encoding="utf-8"?>
-<p:sld xmlns:a="http://schemas.openxmlformats.org/drawingml/2006/main" xmlns:p="http://schemas.openxmlformats.org/presentationml/2006/main" xmlns:r="http://schemas.openxmlformats.org/officeDocument/2006/relationships">
-  <p:cSld>
-    <p:bg>
-      <p:bgPr>
-        <a:solidFill>
-          <a:srgbClr val="101C24"/>
-        </a:solidFill>
-        <a:effectLst/>
-      </p:bgPr>
-    </p:bg>
-    <p:spTree>
-      <p:nvGrpSpPr>
-        <p:cNvPr id="1" name=""/>
-        <p:cNvGrpSpPr/>
-        <p:nvPr/>
-      </p:nvGrpSpPr>
-      <p:grpSpPr/>
-      <p:sp>
-        <p:nvSpPr>
-          <p:cNvPr id="2" name="TextBox 1"/>
-          <p:cNvSpPr txBox="1"/>
-          <p:nvPr/>
-        </p:nvSpPr>
-        <p:spPr>
-          <a:xfrm>
-            <a:off x="457200" y="320040"/>
-            <a:ext cx="8229600" cy="914400"/>
-          </a:xfrm>
-          <a:prstGeom prst="rect">
-            <a:avLst/>
-          </a:prstGeom>
-          <a:noFill/>
-        </p:spPr>
-        <p:txBody>
-          <a:bodyPr wrap="square">
-            <a:spAutoFit/>
-          </a:bodyPr>
-          <a:lstStyle/>
-          <a:p>
-            <a:pPr>
-              <a:defRPr sz="4000" b="1">
-                <a:solidFill>
-                  <a:srgbClr val="ECF2F8"/>
-                </a:solidFill>
-              </a:defRPr>
-            </a:pPr>
-            <a:r>
-              <a:t>plot 2003 shows surface tracking while deeper layers lag revealing irrigation sensitivity gaps...</a:t>
-            </a:r>
-          </a:p>
-        </p:txBody>
-      </p:sp>
-      <p:sp>
-        <p:nvSpPr>
-          <p:cNvPr id="3" name="TextBox 2"/>
-          <p:cNvSpPr txBox="1"/>
-          <p:nvPr/>
-        </p:nvSpPr>
-        <p:spPr>
-          <a:xfrm>
-            <a:off x="457200" y="1463040"/>
-            <a:ext cx="4114800" cy="4206240"/>
-          </a:xfrm>
-          <a:prstGeom prst="rect">
-            <a:avLst/>
-          </a:prstGeom>
-          <a:noFill/>
-        </p:spPr>
-        <p:txBody>
-          <a:bodyPr wrap="square">
-            <a:spAutoFit/>
-          </a:bodyPr>
-          <a:lstStyle/>
-          <a:p>
-            <a:pPr>
-              <a:spcAft>
-                <a:spcPts val="400"/>
-              </a:spcAft>
-              <a:defRPr sz="2600">
-                <a:solidFill>
-                  <a:srgbClr val="DCE6EC"/>
-                </a:solidFill>
-              </a:defRPr>
-            </a:pPr>
-            <a:r>
-              <a:t>six inch predictions follow the smoothed trend but under react immediately after irrigation</a:t>
-            </a:r>
-          </a:p>
-          <a:p>
-            <a:pPr>
-              <a:spcAft>
-                <a:spcPts val="400"/>
-              </a:spcAft>
-              <a:defRPr sz="2600">
-                <a:solidFill>
-                  <a:srgbClr val="DCE6EC"/>
-                </a:solidFill>
-              </a:defRPr>
-            </a:pPr>
-            <a:r>
-              <a:t>eighteen and thirty inch layers respond too softly versus the ground truth rebounds</a:t>
-            </a:r>
-          </a:p>
-          <a:p>
-            <a:pPr>
-              <a:spcAft>
-                <a:spcPts val="400"/>
-              </a:spcAft>
-              <a:defRPr sz="2600">
-                <a:solidFill>
-                  <a:srgbClr val="DCE6EC"/>
-                </a:solidFill>
-              </a:defRPr>
-            </a:pPr>
-            <a:r>
-              <a:t>the model captured seasonal decline yet missed amplitude which is key for scheduling</a:t>
+              <a:t>plot two zero one five lags forty eight hours proving the fold reuse bug and irrigation imbalance</a:t>
             </a:r>
           </a:p>
         </p:txBody>
@@ -4699,8 +4426,209 @@
         </p:blipFill>
         <p:spPr>
           <a:xfrm>
-            <a:off x="4754880" y="1463040"/>
-            <a:ext cx="4389120" cy="2918219"/>
+            <a:off x="457200" y="2743200"/>
+            <a:ext cx="2651760" cy="1763091"/>
+          </a:xfrm>
+          <a:prstGeom prst="rect">
+            <a:avLst/>
+          </a:prstGeom>
+        </p:spPr>
+      </p:pic>
+      <p:pic>
+        <p:nvPicPr>
+          <p:cNvPr id="5" name="Picture 4" descr="pred_vs_actual_plot2014.png"/>
+          <p:cNvPicPr>
+            <a:picLocks noChangeAspect="1"/>
+          </p:cNvPicPr>
+          <p:nvPr/>
+        </p:nvPicPr>
+        <p:blipFill>
+          <a:blip r:embed="rId3"/>
+          <a:stretch>
+            <a:fillRect/>
+          </a:stretch>
+        </p:blipFill>
+        <p:spPr>
+          <a:xfrm>
+            <a:off x="3337560" y="2743200"/>
+            <a:ext cx="2651760" cy="1763091"/>
+          </a:xfrm>
+          <a:prstGeom prst="rect">
+            <a:avLst/>
+          </a:prstGeom>
+        </p:spPr>
+      </p:pic>
+      <p:pic>
+        <p:nvPicPr>
+          <p:cNvPr id="6" name="Picture 5" descr="pred_vs_actual_plot2015.png"/>
+          <p:cNvPicPr>
+            <a:picLocks noChangeAspect="1"/>
+          </p:cNvPicPr>
+          <p:nvPr/>
+        </p:nvPicPr>
+        <p:blipFill>
+          <a:blip r:embed="rId4"/>
+          <a:stretch>
+            <a:fillRect/>
+          </a:stretch>
+        </p:blipFill>
+        <p:spPr>
+          <a:xfrm>
+            <a:off x="6217920" y="2743200"/>
+            <a:ext cx="2651760" cy="1763091"/>
+          </a:xfrm>
+          <a:prstGeom prst="rect">
+            <a:avLst/>
+          </a:prstGeom>
+        </p:spPr>
+      </p:pic>
+    </p:spTree>
+  </p:cSld>
+  <p:clrMapOvr>
+    <a:masterClrMapping/>
+  </p:clrMapOvr>
+</p:sld>
+</file>
+
+<file path=ppt/slides/slide8.xml><?xml version="1.0" encoding="utf-8"?>
+<p:sld xmlns:a="http://schemas.openxmlformats.org/drawingml/2006/main" xmlns:p="http://schemas.openxmlformats.org/presentationml/2006/main" xmlns:r="http://schemas.openxmlformats.org/officeDocument/2006/relationships">
+  <p:cSld>
+    <p:bg>
+      <p:bgPr>
+        <a:solidFill>
+          <a:srgbClr val="0E1A24"/>
+        </a:solidFill>
+        <a:effectLst/>
+      </p:bgPr>
+    </p:bg>
+    <p:spTree>
+      <p:nvGrpSpPr>
+        <p:cNvPr id="1" name=""/>
+        <p:cNvGrpSpPr/>
+        <p:nvPr/>
+      </p:nvGrpSpPr>
+      <p:grpSpPr/>
+      <p:sp>
+        <p:nvSpPr>
+          <p:cNvPr id="2" name="TextBox 1"/>
+          <p:cNvSpPr txBox="1"/>
+          <p:nvPr/>
+        </p:nvSpPr>
+        <p:spPr>
+          <a:xfrm>
+            <a:off x="457200" y="320040"/>
+            <a:ext cx="8412480" cy="1097280"/>
+          </a:xfrm>
+          <a:prstGeom prst="rect">
+            <a:avLst/>
+          </a:prstGeom>
+          <a:noFill/>
+        </p:spPr>
+        <p:txBody>
+          <a:bodyPr wrap="square">
+            <a:spAutoFit/>
+          </a:bodyPr>
+          <a:lstStyle/>
+          <a:p>
+            <a:pPr>
+              <a:defRPr sz="4000" b="1">
+                <a:solidFill>
+                  <a:srgbClr val="F5F8FC"/>
+                </a:solidFill>
+              </a:defRPr>
+            </a:pPr>
+            <a:r>
+              <a:t>lesson seven dissect the failure so everyone learns how to avoid it next season...</a:t>
+            </a:r>
+          </a:p>
+        </p:txBody>
+      </p:sp>
+      <p:sp>
+        <p:nvSpPr>
+          <p:cNvPr id="3" name="TextBox 2"/>
+          <p:cNvSpPr txBox="1"/>
+          <p:nvPr/>
+        </p:nvSpPr>
+        <p:spPr>
+          <a:xfrm>
+            <a:off x="457200" y="1463040"/>
+            <a:ext cx="4206240" cy="4206240"/>
+          </a:xfrm>
+          <a:prstGeom prst="rect">
+            <a:avLst/>
+          </a:prstGeom>
+          <a:noFill/>
+        </p:spPr>
+        <p:txBody>
+          <a:bodyPr wrap="square">
+            <a:spAutoFit/>
+          </a:bodyPr>
+          <a:lstStyle/>
+          <a:p>
+            <a:pPr>
+              <a:spcAft>
+                <a:spcPts val="400"/>
+              </a:spcAft>
+              <a:defRPr sz="2600">
+                <a:solidFill>
+                  <a:srgbClr val="E0E8F0"/>
+                </a:solidFill>
+              </a:defRPr>
+            </a:pPr>
+            <a:r>
+              <a:t>injection happened after scaling so engineered features stayed frozen and the model saw no change</a:t>
+            </a:r>
+          </a:p>
+          <a:p>
+            <a:pPr>
+              <a:spcAft>
+                <a:spcPts val="400"/>
+              </a:spcAft>
+              <a:defRPr sz="2600">
+                <a:solidFill>
+                  <a:srgbClr val="E0E8F0"/>
+                </a:solidFill>
+              </a:defRPr>
+            </a:pPr>
+            <a:r>
+              <a:t>scaled precip irrigation exceeded buffered range which pushed the lstm off its training manifold</a:t>
+            </a:r>
+          </a:p>
+          <a:p>
+            <a:pPr>
+              <a:spcAft>
+                <a:spcPts val="400"/>
+              </a:spcAft>
+              <a:defRPr sz="2600">
+                <a:solidFill>
+                  <a:srgbClr val="E0E8F0"/>
+                </a:solidFill>
+              </a:defRPr>
+            </a:pPr>
+            <a:r>
+              <a:t>lack of cross plot diversity meant the network defaulted to trend continuation instead of reacting</a:t>
+            </a:r>
+          </a:p>
+        </p:txBody>
+      </p:sp>
+      <p:pic>
+        <p:nvPicPr>
+          <p:cNvPr id="4" name="Picture 3" descr="irrigation_injection_failure.png"/>
+          <p:cNvPicPr>
+            <a:picLocks noChangeAspect="1"/>
+          </p:cNvPicPr>
+          <p:nvPr/>
+        </p:nvPicPr>
+        <p:blipFill>
+          <a:blip r:embed="rId2"/>
+          <a:stretch>
+            <a:fillRect/>
+          </a:stretch>
+        </p:blipFill>
+        <p:spPr>
+          <a:xfrm>
+            <a:off x="4846320" y="1463040"/>
+            <a:ext cx="4297680" cy="4300082"/>
           </a:xfrm>
           <a:prstGeom prst="rect">
             <a:avLst/>
@@ -4721,7 +4649,7 @@
     <p:bg>
       <p:bgPr>
         <a:solidFill>
-          <a:srgbClr val="101C24"/>
+          <a:srgbClr val="0E1A24"/>
         </a:solidFill>
         <a:effectLst/>
       </p:bgPr>
@@ -4742,7 +4670,7 @@
         <p:spPr>
           <a:xfrm>
             <a:off x="457200" y="320040"/>
-            <a:ext cx="8229600" cy="914400"/>
+            <a:ext cx="8412480" cy="1097280"/>
           </a:xfrm>
           <a:prstGeom prst="rect">
             <a:avLst/>
@@ -4758,12 +4686,12 @@
             <a:pPr>
               <a:defRPr sz="4000" b="1">
                 <a:solidFill>
-                  <a:srgbClr val="ECF2F8"/>
+                  <a:srgbClr val="F5F8FC"/>
                 </a:solidFill>
               </a:defRPr>
             </a:pPr>
             <a:r>
-              <a:t>plot 2014 exposes positive bias because dry down exemplars were scarce in training...</a:t>
+              <a:t>lesson eight close with the reusable kit and the two fixes queued for next season...</a:t>
             </a:r>
           </a:p>
         </p:txBody>
@@ -4776,8 +4704,8 @@
         </p:nvSpPr>
         <p:spPr>
           <a:xfrm>
-            <a:off x="457200" y="1463040"/>
-            <a:ext cx="4114800" cy="4206240"/>
+            <a:off x="640080" y="1463040"/>
+            <a:ext cx="7863840" cy="4389120"/>
           </a:xfrm>
           <a:prstGeom prst="rect">
             <a:avLst/>
@@ -4796,12 +4724,12 @@
               </a:spcAft>
               <a:defRPr sz="2600">
                 <a:solidFill>
-                  <a:srgbClr val="DCE6EC"/>
+                  <a:srgbClr val="E0E8F0"/>
                 </a:solidFill>
               </a:defRPr>
             </a:pPr>
             <a:r>
-              <a:t>surface depth stays elevated even as actual moisture declines after events</a:t>
+              <a:t>data cleaning and irrigation feature stack are production ready and already documented</a:t>
             </a:r>
           </a:p>
           <a:p>
@@ -4811,12 +4739,12 @@
               </a:spcAft>
               <a:defRPr sz="2600">
                 <a:solidFill>
-                  <a:srgbClr val="DCE6EC"/>
+                  <a:srgbClr val="E0E8F0"/>
                 </a:solidFill>
               </a:defRPr>
             </a:pPr>
             <a:r>
-              <a:t>deeper probes fail to catch the sharp post irrigation spike that agronomists expect</a:t>
+              <a:t>next tasks: recompute features before sensitivity tests and repair the timeseries split logic</a:t>
             </a:r>
           </a:p>
           <a:p>
@@ -4826,40 +4754,16 @@
               </a:spcAft>
               <a:defRPr sz="2600">
                 <a:solidFill>
-                  <a:srgbClr val="DCE6EC"/>
+                  <a:srgbClr val="E0E8F0"/>
                 </a:solidFill>
               </a:defRPr>
             </a:pPr>
             <a:r>
-              <a:t>highlights need for balanced dry and wet sequences from every plot in training</a:t>
-            </a:r>
-          </a:p>
-        </p:txBody>
-      </p:sp>
-      <p:pic>
-        <p:nvPicPr>
-          <p:cNvPr id="4" name="Picture 3" descr="pred_vs_actual_plot2014.png"/>
-          <p:cNvPicPr>
-            <a:picLocks noChangeAspect="1"/>
-          </p:cNvPicPr>
-          <p:nvPr/>
-        </p:nvPicPr>
-        <p:blipFill>
-          <a:blip r:embed="rId2"/>
-          <a:stretch>
-            <a:fillRect/>
-          </a:stretch>
-        </p:blipFill>
-        <p:spPr>
-          <a:xfrm>
-            <a:off x="4754880" y="1463040"/>
-            <a:ext cx="4389120" cy="2918219"/>
-          </a:xfrm>
-          <a:prstGeom prst="rect">
-            <a:avLst/>
-          </a:prstGeom>
-        </p:spPr>
-      </p:pic>
+              <a:t>share the notebook and slides as onboarding material for agronomists and controls teammates</a:t>
+            </a:r>
+          </a:p>
+        </p:txBody>
+      </p:sp>
     </p:spTree>
   </p:cSld>
   <p:clrMapOvr>
@@ -5186,4 +5090,324 @@
   </a:objectDefaults>
   <a:extraClrSchemeLst/>
 </a:theme>
+</file>
+
+<file path=ppt/theme/theme2.xml><?xml version="1.0" encoding="utf-8"?>
+<a:theme xmlns:a="http://schemas.openxmlformats.org/drawingml/2006/main" name="Office Theme">
+  <a:themeElements>
+    <a:clrScheme name="Office">
+      <a:dk1>
+        <a:sysClr val="windowText" lastClr="000000"/>
+      </a:dk1>
+      <a:lt1>
+        <a:sysClr val="window" lastClr="FFFFFF"/>
+      </a:lt1>
+      <a:dk2>
+        <a:srgbClr val="1F497D"/>
+      </a:dk2>
+      <a:lt2>
+        <a:srgbClr val="EEECE1"/>
+      </a:lt2>
+      <a:accent1>
+        <a:srgbClr val="4F81BD"/>
+      </a:accent1>
+      <a:accent2>
+        <a:srgbClr val="C0504D"/>
+      </a:accent2>
+      <a:accent3>
+        <a:srgbClr val="9BBB59"/>
+      </a:accent3>
+      <a:accent4>
+        <a:srgbClr val="8064A2"/>
+      </a:accent4>
+      <a:accent5>
+        <a:srgbClr val="4BACC6"/>
+      </a:accent5>
+      <a:accent6>
+        <a:srgbClr val="F79646"/>
+      </a:accent6>
+      <a:hlink>
+        <a:srgbClr val="0000FF"/>
+      </a:hlink>
+      <a:folHlink>
+        <a:srgbClr val="800080"/>
+      </a:folHlink>
+    </a:clrScheme>
+    <a:fontScheme name="Office">
+      <a:majorFont>
+        <a:latin typeface="Calibri"/>
+        <a:ea typeface=""/>
+        <a:cs typeface=""/>
+        <a:font script="Jpan" typeface="ＭＳ Ｐゴシック"/>
+        <a:font script="Hang" typeface="맑은 고딕"/>
+        <a:font script="Hans" typeface="宋体"/>
+        <a:font script="Hant" typeface="新細明體"/>
+        <a:font script="Arab" typeface="Times New Roman"/>
+        <a:font script="Hebr" typeface="Times New Roman"/>
+        <a:font script="Thai" typeface="Angsana New"/>
+        <a:font script="Ethi" typeface="Nyala"/>
+        <a:font script="Beng" typeface="Vrinda"/>
+        <a:font script="Gujr" typeface="Shruti"/>
+        <a:font script="Khmr" typeface="MoolBoran"/>
+        <a:font script="Knda" typeface="Tunga"/>
+        <a:font script="Guru" typeface="Raavi"/>
+        <a:font script="Cans" typeface="Euphemia"/>
+        <a:font script="Cher" typeface="Plantagenet Cherokee"/>
+        <a:font script="Yiii" typeface="Microsoft Yi Baiti"/>
+        <a:font script="Tibt" typeface="Microsoft Himalaya"/>
+        <a:font script="Thaa" typeface="MV Boli"/>
+        <a:font script="Deva" typeface="Mangal"/>
+        <a:font script="Telu" typeface="Gautami"/>
+        <a:font script="Taml" typeface="Latha"/>
+        <a:font script="Syrc" typeface="Estrangelo Edessa"/>
+        <a:font script="Orya" typeface="Kalinga"/>
+        <a:font script="Mlym" typeface="Kartika"/>
+        <a:font script="Laoo" typeface="DokChampa"/>
+        <a:font script="Sinh" typeface="Iskoola Pota"/>
+        <a:font script="Mong" typeface="Mongolian Baiti"/>
+        <a:font script="Viet" typeface="Times New Roman"/>
+        <a:font script="Uigh" typeface="Microsoft Uighur"/>
+        <a:font script="Geor" typeface="Sylfaen"/>
+      </a:majorFont>
+      <a:minorFont>
+        <a:latin typeface="Calibri"/>
+        <a:ea typeface=""/>
+        <a:cs typeface=""/>
+        <a:font script="Jpan" typeface="ＭＳ Ｐゴシック"/>
+        <a:font script="Hang" typeface="맑은 고딕"/>
+        <a:font script="Hans" typeface="宋体"/>
+        <a:font script="Hant" typeface="新細明體"/>
+        <a:font script="Arab" typeface="Arial"/>
+        <a:font script="Hebr" typeface="Arial"/>
+        <a:font script="Thai" typeface="Cordia New"/>
+        <a:font script="Ethi" typeface="Nyala"/>
+        <a:font script="Beng" typeface="Vrinda"/>
+        <a:font script="Gujr" typeface="Shruti"/>
+        <a:font script="Khmr" typeface="DaunPenh"/>
+        <a:font script="Knda" typeface="Tunga"/>
+        <a:font script="Guru" typeface="Raavi"/>
+        <a:font script="Cans" typeface="Euphemia"/>
+        <a:font script="Cher" typeface="Plantagenet Cherokee"/>
+        <a:font script="Yiii" typeface="Microsoft Yi Baiti"/>
+        <a:font script="Tibt" typeface="Microsoft Himalaya"/>
+        <a:font script="Thaa" typeface="MV Boli"/>
+        <a:font script="Deva" typeface="Mangal"/>
+        <a:font script="Telu" typeface="Gautami"/>
+        <a:font script="Taml" typeface="Latha"/>
+        <a:font script="Syrc" typeface="Estrangelo Edessa"/>
+        <a:font script="Orya" typeface="Kalinga"/>
+        <a:font script="Mlym" typeface="Kartika"/>
+        <a:font script="Laoo" typeface="DokChampa"/>
+        <a:font script="Sinh" typeface="Iskoola Pota"/>
+        <a:font script="Mong" typeface="Mongolian Baiti"/>
+        <a:font script="Viet" typeface="Arial"/>
+        <a:font script="Uigh" typeface="Microsoft Uighur"/>
+        <a:font script="Geor" typeface="Sylfaen"/>
+      </a:minorFont>
+    </a:fontScheme>
+    <a:fmtScheme name="Office">
+      <a:fillStyleLst>
+        <a:solidFill>
+          <a:schemeClr val="phClr"/>
+        </a:solidFill>
+        <a:gradFill rotWithShape="1">
+          <a:gsLst>
+            <a:gs pos="0">
+              <a:schemeClr val="phClr">
+                <a:tint val="50000"/>
+                <a:satMod val="300000"/>
+              </a:schemeClr>
+            </a:gs>
+            <a:gs pos="35000">
+              <a:schemeClr val="phClr">
+                <a:tint val="37000"/>
+                <a:satMod val="300000"/>
+              </a:schemeClr>
+            </a:gs>
+            <a:gs pos="100000">
+              <a:schemeClr val="phClr">
+                <a:tint val="15000"/>
+                <a:satMod val="350000"/>
+              </a:schemeClr>
+            </a:gs>
+          </a:gsLst>
+          <a:lin ang="16200000" scaled="1"/>
+        </a:gradFill>
+        <a:gradFill rotWithShape="1">
+          <a:gsLst>
+            <a:gs pos="0">
+              <a:schemeClr val="phClr">
+                <a:tint val="100000"/>
+                <a:shade val="100000"/>
+                <a:satMod val="130000"/>
+              </a:schemeClr>
+            </a:gs>
+            <a:gs pos="100000">
+              <a:schemeClr val="phClr">
+                <a:tint val="50000"/>
+                <a:shade val="100000"/>
+                <a:satMod val="350000"/>
+              </a:schemeClr>
+            </a:gs>
+          </a:gsLst>
+          <a:lin ang="16200000" scaled="0"/>
+        </a:gradFill>
+      </a:fillStyleLst>
+      <a:lnStyleLst>
+        <a:ln w="9525" cap="flat" cmpd="sng" algn="ctr">
+          <a:solidFill>
+            <a:schemeClr val="phClr">
+              <a:shade val="95000"/>
+              <a:satMod val="105000"/>
+            </a:schemeClr>
+          </a:solidFill>
+          <a:prstDash val="solid"/>
+        </a:ln>
+        <a:ln w="25400" cap="flat" cmpd="sng" algn="ctr">
+          <a:solidFill>
+            <a:schemeClr val="phClr"/>
+          </a:solidFill>
+          <a:prstDash val="solid"/>
+        </a:ln>
+        <a:ln w="38100" cap="flat" cmpd="sng" algn="ctr">
+          <a:solidFill>
+            <a:schemeClr val="phClr"/>
+          </a:solidFill>
+          <a:prstDash val="solid"/>
+        </a:ln>
+      </a:lnStyleLst>
+      <a:effectStyleLst>
+        <a:effectStyle>
+          <a:effectLst>
+            <a:outerShdw blurRad="40000" dist="20000" dir="5400000" rotWithShape="0">
+              <a:srgbClr val="000000">
+                <a:alpha val="38000"/>
+              </a:srgbClr>
+            </a:outerShdw>
+          </a:effectLst>
+        </a:effectStyle>
+        <a:effectStyle>
+          <a:effectLst>
+            <a:outerShdw blurRad="40000" dist="23000" dir="5400000" rotWithShape="0">
+              <a:srgbClr val="000000">
+                <a:alpha val="35000"/>
+              </a:srgbClr>
+            </a:outerShdw>
+          </a:effectLst>
+        </a:effectStyle>
+        <a:effectStyle>
+          <a:effectLst>
+            <a:outerShdw blurRad="40000" dist="23000" dir="5400000" rotWithShape="0">
+              <a:srgbClr val="000000">
+                <a:alpha val="35000"/>
+              </a:srgbClr>
+            </a:outerShdw>
+          </a:effectLst>
+          <a:scene3d>
+            <a:camera prst="orthographicFront">
+              <a:rot lat="0" lon="0" rev="0"/>
+            </a:camera>
+            <a:lightRig rig="threePt" dir="t">
+              <a:rot lat="0" lon="0" rev="1200000"/>
+            </a:lightRig>
+          </a:scene3d>
+          <a:sp3d>
+            <a:bevelT w="63500" h="25400"/>
+          </a:sp3d>
+        </a:effectStyle>
+      </a:effectStyleLst>
+      <a:bgFillStyleLst>
+        <a:solidFill>
+          <a:schemeClr val="phClr"/>
+        </a:solidFill>
+        <a:gradFill rotWithShape="1">
+          <a:gsLst>
+            <a:gs pos="0">
+              <a:schemeClr val="phClr">
+                <a:tint val="40000"/>
+                <a:satMod val="350000"/>
+              </a:schemeClr>
+            </a:gs>
+            <a:gs pos="40000">
+              <a:schemeClr val="phClr">
+                <a:tint val="45000"/>
+                <a:shade val="99000"/>
+                <a:satMod val="350000"/>
+              </a:schemeClr>
+            </a:gs>
+            <a:gs pos="100000">
+              <a:schemeClr val="phClr">
+                <a:shade val="20000"/>
+                <a:satMod val="255000"/>
+              </a:schemeClr>
+            </a:gs>
+          </a:gsLst>
+          <a:path path="circle">
+            <a:fillToRect l="50000" t="-80000" r="50000" b="180000"/>
+          </a:path>
+        </a:gradFill>
+        <a:gradFill rotWithShape="1">
+          <a:gsLst>
+            <a:gs pos="0">
+              <a:schemeClr val="phClr">
+                <a:tint val="80000"/>
+                <a:satMod val="300000"/>
+              </a:schemeClr>
+            </a:gs>
+            <a:gs pos="100000">
+              <a:schemeClr val="phClr">
+                <a:shade val="30000"/>
+                <a:satMod val="200000"/>
+              </a:schemeClr>
+            </a:gs>
+          </a:gsLst>
+          <a:path path="circle">
+            <a:fillToRect l="50000" t="50000" r="50000" b="50000"/>
+          </a:path>
+        </a:gradFill>
+      </a:bgFillStyleLst>
+    </a:fmtScheme>
+  </a:themeElements>
+  <a:objectDefaults>
+    <a:spDef>
+      <a:spPr/>
+      <a:bodyPr/>
+      <a:lstStyle/>
+      <a:style>
+        <a:lnRef idx="1">
+          <a:schemeClr val="accent1"/>
+        </a:lnRef>
+        <a:fillRef idx="3">
+          <a:schemeClr val="accent1"/>
+        </a:fillRef>
+        <a:effectRef idx="2">
+          <a:schemeClr val="accent1"/>
+        </a:effectRef>
+        <a:fontRef idx="minor">
+          <a:schemeClr val="lt1"/>
+        </a:fontRef>
+      </a:style>
+    </a:spDef>
+    <a:lnDef>
+      <a:spPr/>
+      <a:bodyPr/>
+      <a:lstStyle/>
+      <a:style>
+        <a:lnRef idx="2">
+          <a:schemeClr val="accent1"/>
+        </a:lnRef>
+        <a:fillRef idx="0">
+          <a:schemeClr val="accent1"/>
+        </a:fillRef>
+        <a:effectRef idx="1">
+          <a:schemeClr val="accent1"/>
+        </a:effectRef>
+        <a:fontRef idx="minor">
+          <a:schemeClr val="tx1"/>
+        </a:fontRef>
+      </a:style>
+    </a:lnDef>
+  </a:objectDefaults>
+  <a:extraClrSchemeLst/>
+</a:theme>
 </file>
</xml_diff>

<commit_message>
Rebuild EDA presentation PPTX with updated storyline
</commit_message>
<xml_diff>
--- a/presentation/eda_story/eda_story.pptx
+++ b/presentation/eda_story/eda_story.pptx
@@ -4,17 +4,6 @@
   <p:sldMasterIdLst>
     <p:sldMasterId id="2147483648" r:id="rId1"/>
   </p:sldMasterIdLst>
-  <p:sldIdLst>
-    <p:sldId id="256" r:id="rId7"/>
-    <p:sldId id="257" r:id="rId9"/>
-    <p:sldId id="258" r:id="rId10"/>
-    <p:sldId id="259" r:id="rId11"/>
-    <p:sldId id="260" r:id="rId12"/>
-    <p:sldId id="261" r:id="rId13"/>
-    <p:sldId id="262" r:id="rId14"/>
-    <p:sldId id="263" r:id="rId15"/>
-    <p:sldId id="264" r:id="rId16"/>
-  </p:sldIdLst>
   <p:sldSz cx="9144000" cy="6858000" type="screen4x3"/>
   <p:notesSz cx="6858000" cy="9144000"/>
   <p:defaultTextStyle>
@@ -113,426 +102,6 @@
     </a:lvl9pPr>
   </p:defaultTextStyle>
 </p:presentation>
-</file>
-
-<file path=ppt/notesMasters/notesMaster1.xml><?xml version="1.0" encoding="utf-8"?>
-<p:notesMaster xmlns:a="http://schemas.openxmlformats.org/drawingml/2006/main" xmlns:p="http://schemas.openxmlformats.org/presentationml/2006/main" xmlns:r="http://schemas.openxmlformats.org/officeDocument/2006/relationships">
-  <p:cSld>
-    <p:bg>
-      <p:bgRef idx="1001">
-        <a:schemeClr val="bg1"/>
-      </p:bgRef>
-    </p:bg>
-    <p:spTree>
-      <p:nvGrpSpPr>
-        <p:cNvPr id="1" name=""/>
-        <p:cNvGrpSpPr/>
-        <p:nvPr/>
-      </p:nvGrpSpPr>
-      <p:grpSpPr>
-        <a:xfrm>
-          <a:off x="0" y="0"/>
-          <a:ext cx="0" cy="0"/>
-          <a:chOff x="0" y="0"/>
-          <a:chExt cx="0" cy="0"/>
-        </a:xfrm>
-      </p:grpSpPr>
-      <p:sp>
-        <p:nvSpPr>
-          <p:cNvPr id="2" name="Header Placeholder 1"/>
-          <p:cNvSpPr>
-            <a:spLocks noGrp="1"/>
-          </p:cNvSpPr>
-          <p:nvPr>
-            <p:ph type="hdr" sz="quarter"/>
-          </p:nvPr>
-        </p:nvSpPr>
-        <p:spPr>
-          <a:xfrm>
-            <a:off x="0" y="0"/>
-            <a:ext cx="2971800" cy="457200"/>
-          </a:xfrm>
-          <a:prstGeom prst="rect">
-            <a:avLst/>
-          </a:prstGeom>
-        </p:spPr>
-        <p:txBody>
-          <a:bodyPr vert="horz" lIns="91440" tIns="45720" rIns="91440" bIns="45720" rtlCol="0"/>
-          <a:lstStyle>
-            <a:lvl1pPr algn="l">
-              <a:defRPr sz="1200"/>
-            </a:lvl1pPr>
-          </a:lstStyle>
-          <a:p>
-            <a:endParaRPr lang="en-US"/>
-          </a:p>
-        </p:txBody>
-      </p:sp>
-      <p:sp>
-        <p:nvSpPr>
-          <p:cNvPr id="3" name="Date Placeholder 2"/>
-          <p:cNvSpPr>
-            <a:spLocks noGrp="1"/>
-          </p:cNvSpPr>
-          <p:nvPr>
-            <p:ph type="dt" idx="1"/>
-          </p:nvPr>
-        </p:nvSpPr>
-        <p:spPr>
-          <a:xfrm>
-            <a:off x="3884613" y="0"/>
-            <a:ext cx="2971800" cy="457200"/>
-          </a:xfrm>
-          <a:prstGeom prst="rect">
-            <a:avLst/>
-          </a:prstGeom>
-        </p:spPr>
-        <p:txBody>
-          <a:bodyPr vert="horz" lIns="91440" tIns="45720" rIns="91440" bIns="45720" rtlCol="0"/>
-          <a:lstStyle>
-            <a:lvl1pPr algn="r">
-              <a:defRPr sz="1200"/>
-            </a:lvl1pPr>
-          </a:lstStyle>
-          <a:p>
-            <a:fld id="{0F89C1C7-3DCD-1040-A9CF-14679D8B5DDD}" type="datetimeFigureOut">
-              <a:rPr lang="en-US" smtClean="0"/>
-              <a:t>10/17/16</a:t>
-            </a:fld>
-            <a:endParaRPr lang="en-US"/>
-          </a:p>
-        </p:txBody>
-      </p:sp>
-      <p:sp>
-        <p:nvSpPr>
-          <p:cNvPr id="4" name="Slide Image Placeholder 3"/>
-          <p:cNvSpPr>
-            <a:spLocks noGrp="1" noRot="1" noChangeAspect="1"/>
-          </p:cNvSpPr>
-          <p:nvPr>
-            <p:ph type="sldImg" idx="2"/>
-          </p:nvPr>
-        </p:nvSpPr>
-        <p:spPr>
-          <a:xfrm>
-            <a:off x="1143000" y="685800"/>
-            <a:ext cx="4572000" cy="3429000"/>
-          </a:xfrm>
-          <a:prstGeom prst="rect">
-            <a:avLst/>
-          </a:prstGeom>
-          <a:noFill/>
-          <a:ln w="12700">
-            <a:solidFill>
-              <a:prstClr val="black"/>
-            </a:solidFill>
-          </a:ln>
-        </p:spPr>
-        <p:txBody>
-          <a:bodyPr vert="horz" lIns="91440" tIns="45720" rIns="91440" bIns="45720" rtlCol="0" anchor="ctr"/>
-          <a:lstStyle/>
-          <a:p>
-            <a:endParaRPr lang="en-US"/>
-          </a:p>
-        </p:txBody>
-      </p:sp>
-      <p:sp>
-        <p:nvSpPr>
-          <p:cNvPr id="5" name="Notes Placeholder 4"/>
-          <p:cNvSpPr>
-            <a:spLocks noGrp="1"/>
-          </p:cNvSpPr>
-          <p:nvPr>
-            <p:ph type="body" sz="quarter" idx="3"/>
-          </p:nvPr>
-        </p:nvSpPr>
-        <p:spPr>
-          <a:xfrm>
-            <a:off x="685800" y="4343400"/>
-            <a:ext cx="5486400" cy="4114800"/>
-          </a:xfrm>
-          <a:prstGeom prst="rect">
-            <a:avLst/>
-          </a:prstGeom>
-        </p:spPr>
-        <p:txBody>
-          <a:bodyPr vert="horz" lIns="91440" tIns="45720" rIns="91440" bIns="45720" rtlCol="0"/>
-          <a:lstStyle/>
-          <a:p>
-            <a:pPr lvl="0"/>
-            <a:r>
-              <a:rPr lang="en-US" smtClean="0"/>
-              <a:t>Click to edit Master text styles</a:t>
-            </a:r>
-          </a:p>
-          <a:p>
-            <a:pPr lvl="1"/>
-            <a:r>
-              <a:rPr lang="en-US" smtClean="0"/>
-              <a:t>Second level</a:t>
-            </a:r>
-          </a:p>
-          <a:p>
-            <a:pPr lvl="2"/>
-            <a:r>
-              <a:rPr lang="en-US" smtClean="0"/>
-              <a:t>Third level</a:t>
-            </a:r>
-          </a:p>
-          <a:p>
-            <a:pPr lvl="3"/>
-            <a:r>
-              <a:rPr lang="en-US" smtClean="0"/>
-              <a:t>Fourth level</a:t>
-            </a:r>
-          </a:p>
-          <a:p>
-            <a:pPr lvl="4"/>
-            <a:r>
-              <a:rPr lang="en-US" smtClean="0"/>
-              <a:t>Fifth level</a:t>
-            </a:r>
-            <a:endParaRPr lang="en-US"/>
-          </a:p>
-        </p:txBody>
-      </p:sp>
-      <p:sp>
-        <p:nvSpPr>
-          <p:cNvPr id="6" name="Footer Placeholder 5"/>
-          <p:cNvSpPr>
-            <a:spLocks noGrp="1"/>
-          </p:cNvSpPr>
-          <p:nvPr>
-            <p:ph type="ftr" sz="quarter" idx="4"/>
-          </p:nvPr>
-        </p:nvSpPr>
-        <p:spPr>
-          <a:xfrm>
-            <a:off x="0" y="8685213"/>
-            <a:ext cx="2971800" cy="457200"/>
-          </a:xfrm>
-          <a:prstGeom prst="rect">
-            <a:avLst/>
-          </a:prstGeom>
-        </p:spPr>
-        <p:txBody>
-          <a:bodyPr vert="horz" lIns="91440" tIns="45720" rIns="91440" bIns="45720" rtlCol="0" anchor="b"/>
-          <a:lstStyle>
-            <a:lvl1pPr algn="l">
-              <a:defRPr sz="1200"/>
-            </a:lvl1pPr>
-          </a:lstStyle>
-          <a:p>
-            <a:endParaRPr lang="en-US"/>
-          </a:p>
-        </p:txBody>
-      </p:sp>
-      <p:sp>
-        <p:nvSpPr>
-          <p:cNvPr id="7" name="Slide Number Placeholder 6"/>
-          <p:cNvSpPr>
-            <a:spLocks noGrp="1"/>
-          </p:cNvSpPr>
-          <p:nvPr>
-            <p:ph type="sldNum" sz="quarter" idx="5"/>
-          </p:nvPr>
-        </p:nvSpPr>
-        <p:spPr>
-          <a:xfrm>
-            <a:off x="3884613" y="8685213"/>
-            <a:ext cx="2971800" cy="457200"/>
-          </a:xfrm>
-          <a:prstGeom prst="rect">
-            <a:avLst/>
-          </a:prstGeom>
-        </p:spPr>
-        <p:txBody>
-          <a:bodyPr vert="horz" lIns="91440" tIns="45720" rIns="91440" bIns="45720" rtlCol="0" anchor="b"/>
-          <a:lstStyle>
-            <a:lvl1pPr algn="r">
-              <a:defRPr sz="1200"/>
-            </a:lvl1pPr>
-          </a:lstStyle>
-          <a:p>
-            <a:fld id="{BB5E49A5-4136-284D-997B-48E1D791AD67}" type="slidenum">
-              <a:rPr lang="en-US" smtClean="0"/>
-              <a:t>‹#›</a:t>
-            </a:fld>
-            <a:endParaRPr lang="en-US"/>
-          </a:p>
-        </p:txBody>
-      </p:sp>
-    </p:spTree>
-    <p:extLst>
-      <p:ext uri="{BB962C8B-B14F-4D97-AF65-F5344CB8AC3E}">
-        <p14:creationId xmlns:p14="http://schemas.microsoft.com/office/powerpoint/2010/main" val="2623252185"/>
-      </p:ext>
-    </p:extLst>
-  </p:cSld>
-  <p:clrMap bg1="lt1" tx1="dk1" bg2="lt2" tx2="dk2" accent1="accent1" accent2="accent2" accent3="accent3" accent4="accent4" accent5="accent5" accent6="accent6" hlink="hlink" folHlink="folHlink"/>
-  <p:notesStyle>
-    <a:lvl1pPr marL="0" algn="l" defTabSz="457200" rtl="0" eaLnBrk="1" latinLnBrk="0" hangingPunct="1">
-      <a:defRPr sz="1200" kern="1200">
-        <a:solidFill>
-          <a:schemeClr val="tx1"/>
-        </a:solidFill>
-        <a:latin typeface="+mn-lt"/>
-        <a:ea typeface="+mn-ea"/>
-        <a:cs typeface="+mn-cs"/>
-      </a:defRPr>
-    </a:lvl1pPr>
-    <a:lvl2pPr marL="457200" algn="l" defTabSz="457200" rtl="0" eaLnBrk="1" latinLnBrk="0" hangingPunct="1">
-      <a:defRPr sz="1200" kern="1200">
-        <a:solidFill>
-          <a:schemeClr val="tx1"/>
-        </a:solidFill>
-        <a:latin typeface="+mn-lt"/>
-        <a:ea typeface="+mn-ea"/>
-        <a:cs typeface="+mn-cs"/>
-      </a:defRPr>
-    </a:lvl2pPr>
-    <a:lvl3pPr marL="914400" algn="l" defTabSz="457200" rtl="0" eaLnBrk="1" latinLnBrk="0" hangingPunct="1">
-      <a:defRPr sz="1200" kern="1200">
-        <a:solidFill>
-          <a:schemeClr val="tx1"/>
-        </a:solidFill>
-        <a:latin typeface="+mn-lt"/>
-        <a:ea typeface="+mn-ea"/>
-        <a:cs typeface="+mn-cs"/>
-      </a:defRPr>
-    </a:lvl3pPr>
-    <a:lvl4pPr marL="1371600" algn="l" defTabSz="457200" rtl="0" eaLnBrk="1" latinLnBrk="0" hangingPunct="1">
-      <a:defRPr sz="1200" kern="1200">
-        <a:solidFill>
-          <a:schemeClr val="tx1"/>
-        </a:solidFill>
-        <a:latin typeface="+mn-lt"/>
-        <a:ea typeface="+mn-ea"/>
-        <a:cs typeface="+mn-cs"/>
-      </a:defRPr>
-    </a:lvl4pPr>
-    <a:lvl5pPr marL="1828800" algn="l" defTabSz="457200" rtl="0" eaLnBrk="1" latinLnBrk="0" hangingPunct="1">
-      <a:defRPr sz="1200" kern="1200">
-        <a:solidFill>
-          <a:schemeClr val="tx1"/>
-        </a:solidFill>
-        <a:latin typeface="+mn-lt"/>
-        <a:ea typeface="+mn-ea"/>
-        <a:cs typeface="+mn-cs"/>
-      </a:defRPr>
-    </a:lvl5pPr>
-    <a:lvl6pPr marL="2286000" algn="l" defTabSz="457200" rtl="0" eaLnBrk="1" latinLnBrk="0" hangingPunct="1">
-      <a:defRPr sz="1200" kern="1200">
-        <a:solidFill>
-          <a:schemeClr val="tx1"/>
-        </a:solidFill>
-        <a:latin typeface="+mn-lt"/>
-        <a:ea typeface="+mn-ea"/>
-        <a:cs typeface="+mn-cs"/>
-      </a:defRPr>
-    </a:lvl6pPr>
-    <a:lvl7pPr marL="2743200" algn="l" defTabSz="457200" rtl="0" eaLnBrk="1" latinLnBrk="0" hangingPunct="1">
-      <a:defRPr sz="1200" kern="1200">
-        <a:solidFill>
-          <a:schemeClr val="tx1"/>
-        </a:solidFill>
-        <a:latin typeface="+mn-lt"/>
-        <a:ea typeface="+mn-ea"/>
-        <a:cs typeface="+mn-cs"/>
-      </a:defRPr>
-    </a:lvl7pPr>
-    <a:lvl8pPr marL="3200400" algn="l" defTabSz="457200" rtl="0" eaLnBrk="1" latinLnBrk="0" hangingPunct="1">
-      <a:defRPr sz="1200" kern="1200">
-        <a:solidFill>
-          <a:schemeClr val="tx1"/>
-        </a:solidFill>
-        <a:latin typeface="+mn-lt"/>
-        <a:ea typeface="+mn-ea"/>
-        <a:cs typeface="+mn-cs"/>
-      </a:defRPr>
-    </a:lvl8pPr>
-    <a:lvl9pPr marL="3657600" algn="l" defTabSz="457200" rtl="0" eaLnBrk="1" latinLnBrk="0" hangingPunct="1">
-      <a:defRPr sz="1200" kern="1200">
-        <a:solidFill>
-          <a:schemeClr val="tx1"/>
-        </a:solidFill>
-        <a:latin typeface="+mn-lt"/>
-        <a:ea typeface="+mn-ea"/>
-        <a:cs typeface="+mn-cs"/>
-      </a:defRPr>
-    </a:lvl9pPr>
-  </p:notesStyle>
-</p:notesMaster>
-</file>
-
-<file path=ppt/notesSlides/notesSlide1.xml><?xml version="1.0" encoding="utf-8"?>
-<p:notes xmlns:a="http://schemas.openxmlformats.org/drawingml/2006/main" xmlns:p="http://schemas.openxmlformats.org/presentationml/2006/main" xmlns:r="http://schemas.openxmlformats.org/officeDocument/2006/relationships">
-  <p:cSld>
-    <p:spTree>
-      <p:nvGrpSpPr>
-        <p:cNvPr id="1" name=""/>
-        <p:cNvGrpSpPr/>
-        <p:nvPr/>
-      </p:nvGrpSpPr>
-      <p:grpSpPr>
-        <a:xfrm>
-          <a:off x="0" y="0"/>
-          <a:ext cx="0" cy="0"/>
-          <a:chOff x="0" y="0"/>
-          <a:chExt cx="0" cy="0"/>
-        </a:xfrm>
-      </p:grpSpPr>
-      <p:sp>
-        <p:nvSpPr>
-          <p:cNvPr id="2" name="Slide Image Placeholder 1"/>
-          <p:cNvSpPr>
-            <a:spLocks noGrp="1"/>
-          </p:cNvSpPr>
-          <p:nvPr>
-            <p:ph type="sldImg" idx="2"/>
-          </p:nvPr>
-        </p:nvSpPr>
-        <p:spPr/>
-      </p:sp>
-      <p:sp>
-        <p:nvSpPr>
-          <p:cNvPr id="3" name="Notes Placeholder 2"/>
-          <p:cNvSpPr>
-            <a:spLocks noGrp="1"/>
-          </p:cNvSpPr>
-          <p:nvPr>
-            <p:ph type="body" idx="3" sz="quarter"/>
-          </p:nvPr>
-        </p:nvSpPr>
-        <p:spPr/>
-        <p:txBody>
-          <a:bodyPr/>
-          <a:lstStyle/>
-          <a:p>
-            <a:r>
-              <a:t>Use this slide to insert real photos of the hardware and pipeline schematic.</a:t>
-            </a:r>
-          </a:p>
-        </p:txBody>
-      </p:sp>
-      <p:sp>
-        <p:nvSpPr>
-          <p:cNvPr id="4" name="Slide Number Placeholder 3"/>
-          <p:cNvSpPr>
-            <a:spLocks noGrp="1"/>
-          </p:cNvSpPr>
-          <p:nvPr>
-            <p:ph type="sldNum" idx="5" sz="quarter"/>
-          </p:nvPr>
-        </p:nvSpPr>
-        <p:spPr/>
-      </p:sp>
-    </p:spTree>
-  </p:cSld>
-  <p:clrMapOvr>
-    <a:masterClrMapping/>
-  </p:clrMapOvr>
-</p:notes>
 </file>
 
 <file path=ppt/slideLayouts/slideLayout1.xml><?xml version="1.0" encoding="utf-8"?>
@@ -3504,1272 +3073,6 @@
     </p:otherStyle>
   </p:txStyles>
 </p:sldMaster>
-</file>
-
-<file path=ppt/slides/slide1.xml><?xml version="1.0" encoding="utf-8"?>
-<p:sld xmlns:a="http://schemas.openxmlformats.org/drawingml/2006/main" xmlns:p="http://schemas.openxmlformats.org/presentationml/2006/main" xmlns:r="http://schemas.openxmlformats.org/officeDocument/2006/relationships">
-  <p:cSld>
-    <p:bg>
-      <p:bgPr>
-        <a:solidFill>
-          <a:srgbClr val="0E1A24"/>
-        </a:solidFill>
-        <a:effectLst/>
-      </p:bgPr>
-    </p:bg>
-    <p:spTree>
-      <p:nvGrpSpPr>
-        <p:cNvPr id="1" name=""/>
-        <p:cNvGrpSpPr/>
-        <p:nvPr/>
-      </p:nvGrpSpPr>
-      <p:grpSpPr/>
-      <p:sp>
-        <p:nvSpPr>
-          <p:cNvPr id="2" name="TextBox 1"/>
-          <p:cNvSpPr txBox="1"/>
-          <p:nvPr/>
-        </p:nvSpPr>
-        <p:spPr>
-          <a:xfrm>
-            <a:off x="457200" y="320040"/>
-            <a:ext cx="8412480" cy="1097280"/>
-          </a:xfrm>
-          <a:prstGeom prst="rect">
-            <a:avLst/>
-          </a:prstGeom>
-          <a:noFill/>
-        </p:spPr>
-        <p:txBody>
-          <a:bodyPr wrap="square">
-            <a:spAutoFit/>
-          </a:bodyPr>
-          <a:lstStyle/>
-          <a:p>
-            <a:pPr>
-              <a:defRPr sz="4000" b="1">
-                <a:solidFill>
-                  <a:srgbClr val="F5F8FC"/>
-                </a:solidFill>
-              </a:defRPr>
-            </a:pPr>
-            <a:r>
-              <a:t>soil moisture automation starts with sensors to lorawan to your database...</a:t>
-            </a:r>
-          </a:p>
-        </p:txBody>
-      </p:sp>
-      <p:sp>
-        <p:nvSpPr>
-          <p:cNvPr id="3" name="TextBox 2"/>
-          <p:cNvSpPr txBox="1"/>
-          <p:nvPr/>
-        </p:nvSpPr>
-        <p:spPr>
-          <a:xfrm>
-            <a:off x="640080" y="1463040"/>
-            <a:ext cx="7863840" cy="4389120"/>
-          </a:xfrm>
-          <a:prstGeom prst="rect">
-            <a:avLst/>
-          </a:prstGeom>
-          <a:noFill/>
-        </p:spPr>
-        <p:txBody>
-          <a:bodyPr wrap="square">
-            <a:spAutoFit/>
-          </a:bodyPr>
-          <a:lstStyle/>
-          <a:p>
-            <a:pPr>
-              <a:spcAft>
-                <a:spcPts val="400"/>
-              </a:spcAft>
-              <a:defRPr sz="2600">
-                <a:solidFill>
-                  <a:srgbClr val="E0E8F0"/>
-                </a:solidFill>
-              </a:defRPr>
-            </a:pPr>
-            <a:r>
-              <a:t>placeholder: swap in your sensor and gateway montage showing how probes stream data</a:t>
-            </a:r>
-          </a:p>
-          <a:p>
-            <a:pPr>
-              <a:spcAft>
-                <a:spcPts val="400"/>
-              </a:spcAft>
-              <a:defRPr sz="2600">
-                <a:solidFill>
-                  <a:srgbClr val="E0E8F0"/>
-                </a:solidFill>
-              </a:defRPr>
-            </a:pPr>
-            <a:r>
-              <a:t>placeholder: drop pipeline diagram from probes → lorawan → processing → sqlite store</a:t>
-            </a:r>
-          </a:p>
-        </p:txBody>
-      </p:sp>
-    </p:spTree>
-  </p:cSld>
-  <p:clrMapOvr>
-    <a:masterClrMapping/>
-  </p:clrMapOvr>
-</p:sld>
-</file>
-
-<file path=ppt/slides/slide2.xml><?xml version="1.0" encoding="utf-8"?>
-<p:sld xmlns:a="http://schemas.openxmlformats.org/drawingml/2006/main" xmlns:p="http://schemas.openxmlformats.org/presentationml/2006/main" xmlns:r="http://schemas.openxmlformats.org/officeDocument/2006/relationships">
-  <p:cSld>
-    <p:bg>
-      <p:bgPr>
-        <a:solidFill>
-          <a:srgbClr val="0E1A24"/>
-        </a:solidFill>
-        <a:effectLst/>
-      </p:bgPr>
-    </p:bg>
-    <p:spTree>
-      <p:nvGrpSpPr>
-        <p:cNvPr id="1" name=""/>
-        <p:cNvGrpSpPr/>
-        <p:nvPr/>
-      </p:nvGrpSpPr>
-      <p:grpSpPr/>
-      <p:sp>
-        <p:nvSpPr>
-          <p:cNvPr id="2" name="TextBox 1"/>
-          <p:cNvSpPr txBox="1"/>
-          <p:nvPr/>
-        </p:nvSpPr>
-        <p:spPr>
-          <a:xfrm>
-            <a:off x="457200" y="320040"/>
-            <a:ext cx="8412480" cy="1097280"/>
-          </a:xfrm>
-          <a:prstGeom prst="rect">
-            <a:avLst/>
-          </a:prstGeom>
-          <a:noFill/>
-        </p:spPr>
-        <p:txBody>
-          <a:bodyPr wrap="square">
-            <a:spAutoFit/>
-          </a:bodyPr>
-          <a:lstStyle/>
-          <a:p>
-            <a:pPr>
-              <a:defRPr sz="4000" b="1">
-                <a:solidFill>
-                  <a:srgbClr val="F5F8FC"/>
-                </a:solidFill>
-              </a:defRPr>
-            </a:pPr>
-            <a:r>
-              <a:t>lesson one check the raw ingest so you know the season span and anomalies...</a:t>
-            </a:r>
-          </a:p>
-        </p:txBody>
-      </p:sp>
-      <p:sp>
-        <p:nvSpPr>
-          <p:cNvPr id="3" name="TextBox 2"/>
-          <p:cNvSpPr txBox="1"/>
-          <p:nvPr/>
-        </p:nvSpPr>
-        <p:spPr>
-          <a:xfrm>
-            <a:off x="640080" y="1463040"/>
-            <a:ext cx="7863840" cy="4389120"/>
-          </a:xfrm>
-          <a:prstGeom prst="rect">
-            <a:avLst/>
-          </a:prstGeom>
-          <a:noFill/>
-        </p:spPr>
-        <p:txBody>
-          <a:bodyPr wrap="square">
-            <a:spAutoFit/>
-          </a:bodyPr>
-          <a:lstStyle/>
-          <a:p>
-            <a:pPr>
-              <a:spcAft>
-                <a:spcPts val="400"/>
-              </a:spcAft>
-              <a:defRPr sz="2600">
-                <a:solidFill>
-                  <a:srgbClr val="E0E8F0"/>
-                </a:solidFill>
-              </a:defRPr>
-            </a:pPr>
-            <a:r>
-              <a:t>eleven week window per plot covering july nineteenth to october thirteenth twenty twenty three</a:t>
-            </a:r>
-          </a:p>
-          <a:p>
-            <a:pPr>
-              <a:spcAft>
-                <a:spcPts val="400"/>
-              </a:spcAft>
-              <a:defRPr sz="2600">
-                <a:solidFill>
-                  <a:srgbClr val="E0E8F0"/>
-                </a:solidFill>
-              </a:defRPr>
-            </a:pPr>
-            <a:r>
-              <a:t>raw extract shows hourly rows with duplicated timestamps and sensor flatlines to flag</a:t>
-            </a:r>
-          </a:p>
-          <a:p>
-            <a:pPr>
-              <a:spcAft>
-                <a:spcPts val="400"/>
-              </a:spcAft>
-              <a:defRPr sz="2600">
-                <a:solidFill>
-                  <a:srgbClr val="E0E8F0"/>
-                </a:solidFill>
-              </a:defRPr>
-            </a:pPr>
-            <a:r>
-              <a:t>clean sample snippet reveals sorted indices and engineered time columns ready for modeling</a:t>
-            </a:r>
-          </a:p>
-        </p:txBody>
-      </p:sp>
-    </p:spTree>
-  </p:cSld>
-  <p:clrMapOvr>
-    <a:masterClrMapping/>
-  </p:clrMapOvr>
-</p:sld>
-</file>
-
-<file path=ppt/slides/slide3.xml><?xml version="1.0" encoding="utf-8"?>
-<p:sld xmlns:a="http://schemas.openxmlformats.org/drawingml/2006/main" xmlns:p="http://schemas.openxmlformats.org/presentationml/2006/main" xmlns:r="http://schemas.openxmlformats.org/officeDocument/2006/relationships">
-  <p:cSld>
-    <p:bg>
-      <p:bgPr>
-        <a:solidFill>
-          <a:srgbClr val="0E1A24"/>
-        </a:solidFill>
-        <a:effectLst/>
-      </p:bgPr>
-    </p:bg>
-    <p:spTree>
-      <p:nvGrpSpPr>
-        <p:cNvPr id="1" name=""/>
-        <p:cNvGrpSpPr/>
-        <p:nvPr/>
-      </p:nvGrpSpPr>
-      <p:grpSpPr/>
-      <p:sp>
-        <p:nvSpPr>
-          <p:cNvPr id="2" name="TextBox 1"/>
-          <p:cNvSpPr txBox="1"/>
-          <p:nvPr/>
-        </p:nvSpPr>
-        <p:spPr>
-          <a:xfrm>
-            <a:off x="457200" y="320040"/>
-            <a:ext cx="8412480" cy="1097280"/>
-          </a:xfrm>
-          <a:prstGeom prst="rect">
-            <a:avLst/>
-          </a:prstGeom>
-          <a:noFill/>
-        </p:spPr>
-        <p:txBody>
-          <a:bodyPr wrap="square">
-            <a:spAutoFit/>
-          </a:bodyPr>
-          <a:lstStyle/>
-          <a:p>
-            <a:pPr>
-              <a:defRPr sz="4000" b="1">
-                <a:solidFill>
-                  <a:srgbClr val="F5F8FC"/>
-                </a:solidFill>
-              </a:defRPr>
-            </a:pPr>
-            <a:r>
-              <a:t>lesson two smooth without losing irrigation pulses so the agronomy signal stays crisp...</a:t>
-            </a:r>
-          </a:p>
-        </p:txBody>
-      </p:sp>
-      <p:sp>
-        <p:nvSpPr>
-          <p:cNvPr id="3" name="TextBox 2"/>
-          <p:cNvSpPr txBox="1"/>
-          <p:nvPr/>
-        </p:nvSpPr>
-        <p:spPr>
-          <a:xfrm>
-            <a:off x="457200" y="1463040"/>
-            <a:ext cx="4206240" cy="4206240"/>
-          </a:xfrm>
-          <a:prstGeom prst="rect">
-            <a:avLst/>
-          </a:prstGeom>
-          <a:noFill/>
-        </p:spPr>
-        <p:txBody>
-          <a:bodyPr wrap="square">
-            <a:spAutoFit/>
-          </a:bodyPr>
-          <a:lstStyle/>
-          <a:p>
-            <a:pPr>
-              <a:spcAft>
-                <a:spcPts val="400"/>
-              </a:spcAft>
-              <a:defRPr sz="2600">
-                <a:solidFill>
-                  <a:srgbClr val="E0E8F0"/>
-                </a:solidFill>
-              </a:defRPr>
-            </a:pPr>
-            <a:r>
-              <a:t>hourly vwc is noisy so we daily average then apply pchip interpolation to respect recharge</a:t>
-            </a:r>
-          </a:p>
-          <a:p>
-            <a:pPr>
-              <a:spcAft>
-                <a:spcPts val="400"/>
-              </a:spcAft>
-              <a:defRPr sz="2600">
-                <a:solidFill>
-                  <a:srgbClr val="E0E8F0"/>
-                </a:solidFill>
-              </a:defRPr>
-            </a:pPr>
-            <a:r>
-              <a:t>savitzky golay window of twenty one preserves irrigation peaks while suppressing jitter</a:t>
-            </a:r>
-          </a:p>
-          <a:p>
-            <a:pPr>
-              <a:spcAft>
-                <a:spcPts val="400"/>
-              </a:spcAft>
-              <a:defRPr sz="2600">
-                <a:solidFill>
-                  <a:srgbClr val="E0E8F0"/>
-                </a:solidFill>
-              </a:defRPr>
-            </a:pPr>
-            <a:r>
-              <a:t>resulting curve aligns with field behaviour and feeds the downstream feature engineering</a:t>
-            </a:r>
-          </a:p>
-        </p:txBody>
-      </p:sp>
-      <p:pic>
-        <p:nvPicPr>
-          <p:cNvPr id="4" name="Picture 3" descr="vwc_cleaning_highlight.png"/>
-          <p:cNvPicPr>
-            <a:picLocks noChangeAspect="1"/>
-          </p:cNvPicPr>
-          <p:nvPr/>
-        </p:nvPicPr>
-        <p:blipFill>
-          <a:blip r:embed="rId2"/>
-          <a:stretch>
-            <a:fillRect/>
-          </a:stretch>
-        </p:blipFill>
-        <p:spPr>
-          <a:xfrm>
-            <a:off x="4846320" y="1463040"/>
-            <a:ext cx="4297680" cy="2148840"/>
-          </a:xfrm>
-          <a:prstGeom prst="rect">
-            <a:avLst/>
-          </a:prstGeom>
-        </p:spPr>
-      </p:pic>
-    </p:spTree>
-  </p:cSld>
-  <p:clrMapOvr>
-    <a:masterClrMapping/>
-  </p:clrMapOvr>
-</p:sld>
-</file>
-
-<file path=ppt/slides/slide4.xml><?xml version="1.0" encoding="utf-8"?>
-<p:sld xmlns:a="http://schemas.openxmlformats.org/drawingml/2006/main" xmlns:p="http://schemas.openxmlformats.org/presentationml/2006/main" xmlns:r="http://schemas.openxmlformats.org/officeDocument/2006/relationships">
-  <p:cSld>
-    <p:bg>
-      <p:bgPr>
-        <a:solidFill>
-          <a:srgbClr val="0E1A24"/>
-        </a:solidFill>
-        <a:effectLst/>
-      </p:bgPr>
-    </p:bg>
-    <p:spTree>
-      <p:nvGrpSpPr>
-        <p:cNvPr id="1" name=""/>
-        <p:cNvGrpSpPr/>
-        <p:nvPr/>
-      </p:nvGrpSpPr>
-      <p:grpSpPr/>
-      <p:sp>
-        <p:nvSpPr>
-          <p:cNvPr id="2" name="TextBox 1"/>
-          <p:cNvSpPr txBox="1"/>
-          <p:nvPr/>
-        </p:nvSpPr>
-        <p:spPr>
-          <a:xfrm>
-            <a:off x="457200" y="320040"/>
-            <a:ext cx="8412480" cy="1097280"/>
-          </a:xfrm>
-          <a:prstGeom prst="rect">
-            <a:avLst/>
-          </a:prstGeom>
-          <a:noFill/>
-        </p:spPr>
-        <p:txBody>
-          <a:bodyPr wrap="square">
-            <a:spAutoFit/>
-          </a:bodyPr>
-          <a:lstStyle/>
-          <a:p>
-            <a:pPr>
-              <a:defRPr sz="4000" b="1">
-                <a:solidFill>
-                  <a:srgbClr val="F5F8FC"/>
-                </a:solidFill>
-              </a:defRPr>
-            </a:pPr>
-            <a:r>
-              <a:t>lesson three engineer irrigation features that match how agronomists reason...</a:t>
-            </a:r>
-          </a:p>
-        </p:txBody>
-      </p:sp>
-      <p:sp>
-        <p:nvSpPr>
-          <p:cNvPr id="3" name="TextBox 2"/>
-          <p:cNvSpPr txBox="1"/>
-          <p:nvPr/>
-        </p:nvSpPr>
-        <p:spPr>
-          <a:xfrm>
-            <a:off x="640080" y="1463040"/>
-            <a:ext cx="7863840" cy="4389120"/>
-          </a:xfrm>
-          <a:prstGeom prst="rect">
-            <a:avLst/>
-          </a:prstGeom>
-          <a:noFill/>
-        </p:spPr>
-        <p:txBody>
-          <a:bodyPr wrap="square">
-            <a:spAutoFit/>
-          </a:bodyPr>
-          <a:lstStyle/>
-          <a:p>
-            <a:pPr>
-              <a:spcAft>
-                <a:spcPts val="400"/>
-              </a:spcAft>
-              <a:defRPr sz="2600">
-                <a:solidFill>
-                  <a:srgbClr val="E0E8F0"/>
-                </a:solidFill>
-              </a:defRPr>
-            </a:pPr>
-            <a:r>
-              <a:t>log precipitation plus one shrinks outliers while binary irrigation flag marks actuator hits</a:t>
-            </a:r>
-          </a:p>
-          <a:p>
-            <a:pPr>
-              <a:spcAft>
-                <a:spcPts val="400"/>
-              </a:spcAft>
-              <a:defRPr sz="2600">
-                <a:solidFill>
-                  <a:srgbClr val="E0E8F0"/>
-                </a:solidFill>
-              </a:defRPr>
-            </a:pPr>
-            <a:r>
-              <a:t>seven day cumulative precipitation approximates soil water budget for scheduling decisions</a:t>
-            </a:r>
-          </a:p>
-          <a:p>
-            <a:pPr>
-              <a:spcAft>
-                <a:spcPts val="400"/>
-              </a:spcAft>
-              <a:defRPr sz="2600">
-                <a:solidFill>
-                  <a:srgbClr val="E0E8F0"/>
-                </a:solidFill>
-              </a:defRPr>
-            </a:pPr>
-            <a:r>
-              <a:t>time since significant rainfall exposes stress buildup when irrigation is overdue</a:t>
-            </a:r>
-          </a:p>
-        </p:txBody>
-      </p:sp>
-    </p:spTree>
-  </p:cSld>
-  <p:clrMapOvr>
-    <a:masterClrMapping/>
-  </p:clrMapOvr>
-</p:sld>
-</file>
-
-<file path=ppt/slides/slide5.xml><?xml version="1.0" encoding="utf-8"?>
-<p:sld xmlns:a="http://schemas.openxmlformats.org/drawingml/2006/main" xmlns:p="http://schemas.openxmlformats.org/presentationml/2006/main" xmlns:r="http://schemas.openxmlformats.org/officeDocument/2006/relationships">
-  <p:cSld>
-    <p:bg>
-      <p:bgPr>
-        <a:solidFill>
-          <a:srgbClr val="0E1A24"/>
-        </a:solidFill>
-        <a:effectLst/>
-      </p:bgPr>
-    </p:bg>
-    <p:spTree>
-      <p:nvGrpSpPr>
-        <p:cNvPr id="1" name=""/>
-        <p:cNvGrpSpPr/>
-        <p:nvPr/>
-      </p:nvGrpSpPr>
-      <p:grpSpPr/>
-      <p:sp>
-        <p:nvSpPr>
-          <p:cNvPr id="2" name="TextBox 1"/>
-          <p:cNvSpPr txBox="1"/>
-          <p:nvPr/>
-        </p:nvSpPr>
-        <p:spPr>
-          <a:xfrm>
-            <a:off x="457200" y="320040"/>
-            <a:ext cx="8412480" cy="1097280"/>
-          </a:xfrm>
-          <a:prstGeom prst="rect">
-            <a:avLst/>
-          </a:prstGeom>
-          <a:noFill/>
-        </p:spPr>
-        <p:txBody>
-          <a:bodyPr wrap="square">
-            <a:spAutoFit/>
-          </a:bodyPr>
-          <a:lstStyle/>
-          <a:p>
-            <a:pPr>
-              <a:defRPr sz="4000" b="1">
-                <a:solidFill>
-                  <a:srgbClr val="F5F8FC"/>
-                </a:solidFill>
-              </a:defRPr>
-            </a:pPr>
-            <a:r>
-              <a:t>lesson four document the cuts so teammates trust the feature buffet they inherit...</a:t>
-            </a:r>
-          </a:p>
-        </p:txBody>
-      </p:sp>
-      <p:sp>
-        <p:nvSpPr>
-          <p:cNvPr id="3" name="TextBox 2"/>
-          <p:cNvSpPr txBox="1"/>
-          <p:nvPr/>
-        </p:nvSpPr>
-        <p:spPr>
-          <a:xfrm>
-            <a:off x="640080" y="1463040"/>
-            <a:ext cx="7863840" cy="4389120"/>
-          </a:xfrm>
-          <a:prstGeom prst="rect">
-            <a:avLst/>
-          </a:prstGeom>
-          <a:noFill/>
-        </p:spPr>
-        <p:txBody>
-          <a:bodyPr wrap="square">
-            <a:spAutoFit/>
-          </a:bodyPr>
-          <a:lstStyle/>
-          <a:p>
-            <a:pPr>
-              <a:spcAft>
-                <a:spcPts val="400"/>
-              </a:spcAft>
-              <a:defRPr sz="2600">
-                <a:solidFill>
-                  <a:srgbClr val="E0E8F0"/>
-                </a:solidFill>
-              </a:defRPr>
-            </a:pPr>
-            <a:r>
-              <a:t>kept buckets: soil moisture layers, temporal encodings, weather loads, irrigation context</a:t>
-            </a:r>
-          </a:p>
-          <a:p>
-            <a:pPr>
-              <a:spcAft>
-                <a:spcPts val="400"/>
-              </a:spcAft>
-              <a:defRPr sz="2600">
-                <a:solidFill>
-                  <a:srgbClr val="E0E8F0"/>
-                </a:solidFill>
-              </a:defRPr>
-            </a:pPr>
-            <a:r>
-              <a:t>removed bucket: forty two inch probe flatlines, sparse crop metadata, redundant elevation and stress indices</a:t>
-            </a:r>
-          </a:p>
-          <a:p>
-            <a:pPr>
-              <a:spcAft>
-                <a:spcPts val="400"/>
-              </a:spcAft>
-              <a:defRPr sz="2600">
-                <a:solidFill>
-                  <a:srgbClr val="E0E8F0"/>
-                </a:solidFill>
-              </a:defRPr>
-            </a:pPr>
-            <a:r>
-              <a:t>every cut is logged in the notebook so future seasons can revisit decisions quickly</a:t>
-            </a:r>
-          </a:p>
-        </p:txBody>
-      </p:sp>
-    </p:spTree>
-  </p:cSld>
-  <p:clrMapOvr>
-    <a:masterClrMapping/>
-  </p:clrMapOvr>
-</p:sld>
-</file>
-
-<file path=ppt/slides/slide6.xml><?xml version="1.0" encoding="utf-8"?>
-<p:sld xmlns:a="http://schemas.openxmlformats.org/drawingml/2006/main" xmlns:p="http://schemas.openxmlformats.org/presentationml/2006/main" xmlns:r="http://schemas.openxmlformats.org/officeDocument/2006/relationships">
-  <p:cSld>
-    <p:bg>
-      <p:bgPr>
-        <a:solidFill>
-          <a:srgbClr val="0E1A24"/>
-        </a:solidFill>
-        <a:effectLst/>
-      </p:bgPr>
-    </p:bg>
-    <p:spTree>
-      <p:nvGrpSpPr>
-        <p:cNvPr id="1" name=""/>
-        <p:cNvGrpSpPr/>
-        <p:nvPr/>
-      </p:nvGrpSpPr>
-      <p:grpSpPr/>
-      <p:sp>
-        <p:nvSpPr>
-          <p:cNvPr id="2" name="TextBox 1"/>
-          <p:cNvSpPr txBox="1"/>
-          <p:nvPr/>
-        </p:nvSpPr>
-        <p:spPr>
-          <a:xfrm>
-            <a:off x="457200" y="320040"/>
-            <a:ext cx="8412480" cy="1097280"/>
-          </a:xfrm>
-          <a:prstGeom prst="rect">
-            <a:avLst/>
-          </a:prstGeom>
-          <a:noFill/>
-        </p:spPr>
-        <p:txBody>
-          <a:bodyPr wrap="square">
-            <a:spAutoFit/>
-          </a:bodyPr>
-          <a:lstStyle/>
-          <a:p>
-            <a:pPr>
-              <a:defRPr sz="4000" b="1">
-                <a:solidFill>
-                  <a:srgbClr val="F5F8FC"/>
-                </a:solidFill>
-              </a:defRPr>
-            </a:pPr>
-            <a:r>
-              <a:t>lesson five explain the sequence framing before showing the model output...</a:t>
-            </a:r>
-          </a:p>
-        </p:txBody>
-      </p:sp>
-      <p:sp>
-        <p:nvSpPr>
-          <p:cNvPr id="3" name="TextBox 2"/>
-          <p:cNvSpPr txBox="1"/>
-          <p:nvPr/>
-        </p:nvSpPr>
-        <p:spPr>
-          <a:xfrm>
-            <a:off x="640080" y="1463040"/>
-            <a:ext cx="7863840" cy="4389120"/>
-          </a:xfrm>
-          <a:prstGeom prst="rect">
-            <a:avLst/>
-          </a:prstGeom>
-          <a:noFill/>
-        </p:spPr>
-        <p:txBody>
-          <a:bodyPr wrap="square">
-            <a:spAutoFit/>
-          </a:bodyPr>
-          <a:lstStyle/>
-          <a:p>
-            <a:pPr>
-              <a:spcAft>
-                <a:spcPts val="400"/>
-              </a:spcAft>
-              <a:defRPr sz="2600">
-                <a:solidFill>
-                  <a:srgbClr val="E0E8F0"/>
-                </a:solidFill>
-              </a:defRPr>
-            </a:pPr>
-            <a:r>
-              <a:t>seven day sliding window feeds the lstm with one hundred sixty eight hourly rows</a:t>
-            </a:r>
-          </a:p>
-          <a:p>
-            <a:pPr>
-              <a:spcAft>
-                <a:spcPts val="400"/>
-              </a:spcAft>
-              <a:defRPr sz="2600">
-                <a:solidFill>
-                  <a:srgbClr val="E0E8F0"/>
-                </a:solidFill>
-              </a:defRPr>
-            </a:pPr>
-            <a:r>
-              <a:t>forecast horizon of ninety six hours covers the next irrigation visit cycle</a:t>
-            </a:r>
-          </a:p>
-          <a:p>
-            <a:pPr>
-              <a:spcAft>
-                <a:spcPts val="400"/>
-              </a:spcAft>
-              <a:defRPr sz="2600">
-                <a:solidFill>
-                  <a:srgbClr val="E0E8F0"/>
-                </a:solidFill>
-              </a:defRPr>
-            </a:pPr>
-            <a:r>
-              <a:t>diagram makes the input output relation obvious to both data folks and agronomists</a:t>
-            </a:r>
-          </a:p>
-        </p:txBody>
-      </p:sp>
-    </p:spTree>
-  </p:cSld>
-  <p:clrMapOvr>
-    <a:masterClrMapping/>
-  </p:clrMapOvr>
-</p:sld>
-</file>
-
-<file path=ppt/slides/slide7.xml><?xml version="1.0" encoding="utf-8"?>
-<p:sld xmlns:a="http://schemas.openxmlformats.org/drawingml/2006/main" xmlns:p="http://schemas.openxmlformats.org/presentationml/2006/main" xmlns:r="http://schemas.openxmlformats.org/officeDocument/2006/relationships">
-  <p:cSld>
-    <p:bg>
-      <p:bgPr>
-        <a:solidFill>
-          <a:srgbClr val="0E1A24"/>
-        </a:solidFill>
-        <a:effectLst/>
-      </p:bgPr>
-    </p:bg>
-    <p:spTree>
-      <p:nvGrpSpPr>
-        <p:cNvPr id="1" name=""/>
-        <p:cNvGrpSpPr/>
-        <p:nvPr/>
-      </p:nvGrpSpPr>
-      <p:grpSpPr/>
-      <p:sp>
-        <p:nvSpPr>
-          <p:cNvPr id="2" name="TextBox 1"/>
-          <p:cNvSpPr txBox="1"/>
-          <p:nvPr/>
-        </p:nvSpPr>
-        <p:spPr>
-          <a:xfrm>
-            <a:off x="457200" y="320040"/>
-            <a:ext cx="8412480" cy="1097280"/>
-          </a:xfrm>
-          <a:prstGeom prst="rect">
-            <a:avLst/>
-          </a:prstGeom>
-          <a:noFill/>
-        </p:spPr>
-        <p:txBody>
-          <a:bodyPr wrap="square">
-            <a:spAutoFit/>
-          </a:bodyPr>
-          <a:lstStyle/>
-          <a:p>
-            <a:pPr>
-              <a:defRPr sz="4000" b="1">
-                <a:solidFill>
-                  <a:srgbClr val="F5F8FC"/>
-                </a:solidFill>
-              </a:defRPr>
-            </a:pPr>
-            <a:r>
-              <a:t>lesson six show case studies so audiences see what the model gets right and wrong...</a:t>
-            </a:r>
-          </a:p>
-        </p:txBody>
-      </p:sp>
-      <p:sp>
-        <p:nvSpPr>
-          <p:cNvPr id="3" name="TextBox 2"/>
-          <p:cNvSpPr txBox="1"/>
-          <p:nvPr/>
-        </p:nvSpPr>
-        <p:spPr>
-          <a:xfrm>
-            <a:off x="457200" y="1463040"/>
-            <a:ext cx="8229600" cy="1463040"/>
-          </a:xfrm>
-          <a:prstGeom prst="rect">
-            <a:avLst/>
-          </a:prstGeom>
-          <a:noFill/>
-        </p:spPr>
-        <p:txBody>
-          <a:bodyPr wrap="square">
-            <a:spAutoFit/>
-          </a:bodyPr>
-          <a:lstStyle/>
-          <a:p>
-            <a:pPr>
-              <a:spcAft>
-                <a:spcPts val="400"/>
-              </a:spcAft>
-              <a:defRPr sz="2600">
-                <a:solidFill>
-                  <a:srgbClr val="E0E8F0"/>
-                </a:solidFill>
-              </a:defRPr>
-            </a:pPr>
-            <a:r>
-              <a:t>plot two zero zero three surface layer tracks well yet deeper layers lag after irrigation</a:t>
-            </a:r>
-          </a:p>
-          <a:p>
-            <a:pPr>
-              <a:spcAft>
-                <a:spcPts val="400"/>
-              </a:spcAft>
-              <a:defRPr sz="2600">
-                <a:solidFill>
-                  <a:srgbClr val="E0E8F0"/>
-                </a:solidFill>
-              </a:defRPr>
-            </a:pPr>
-            <a:r>
-              <a:t>plot two zero one four bias high because dry down exemplars were missing in training</a:t>
-            </a:r>
-          </a:p>
-          <a:p>
-            <a:pPr>
-              <a:spcAft>
-                <a:spcPts val="400"/>
-              </a:spcAft>
-              <a:defRPr sz="2600">
-                <a:solidFill>
-                  <a:srgbClr val="E0E8F0"/>
-                </a:solidFill>
-              </a:defRPr>
-            </a:pPr>
-            <a:r>
-              <a:t>plot two zero one five lags forty eight hours proving the fold reuse bug and irrigation imbalance</a:t>
-            </a:r>
-          </a:p>
-        </p:txBody>
-      </p:sp>
-      <p:pic>
-        <p:nvPicPr>
-          <p:cNvPr id="4" name="Picture 3" descr="pred_vs_actual_plot2003.png"/>
-          <p:cNvPicPr>
-            <a:picLocks noChangeAspect="1"/>
-          </p:cNvPicPr>
-          <p:nvPr/>
-        </p:nvPicPr>
-        <p:blipFill>
-          <a:blip r:embed="rId2"/>
-          <a:stretch>
-            <a:fillRect/>
-          </a:stretch>
-        </p:blipFill>
-        <p:spPr>
-          <a:xfrm>
-            <a:off x="457200" y="2743200"/>
-            <a:ext cx="2651760" cy="1763091"/>
-          </a:xfrm>
-          <a:prstGeom prst="rect">
-            <a:avLst/>
-          </a:prstGeom>
-        </p:spPr>
-      </p:pic>
-      <p:pic>
-        <p:nvPicPr>
-          <p:cNvPr id="5" name="Picture 4" descr="pred_vs_actual_plot2014.png"/>
-          <p:cNvPicPr>
-            <a:picLocks noChangeAspect="1"/>
-          </p:cNvPicPr>
-          <p:nvPr/>
-        </p:nvPicPr>
-        <p:blipFill>
-          <a:blip r:embed="rId3"/>
-          <a:stretch>
-            <a:fillRect/>
-          </a:stretch>
-        </p:blipFill>
-        <p:spPr>
-          <a:xfrm>
-            <a:off x="3337560" y="2743200"/>
-            <a:ext cx="2651760" cy="1763091"/>
-          </a:xfrm>
-          <a:prstGeom prst="rect">
-            <a:avLst/>
-          </a:prstGeom>
-        </p:spPr>
-      </p:pic>
-      <p:pic>
-        <p:nvPicPr>
-          <p:cNvPr id="6" name="Picture 5" descr="pred_vs_actual_plot2015.png"/>
-          <p:cNvPicPr>
-            <a:picLocks noChangeAspect="1"/>
-          </p:cNvPicPr>
-          <p:nvPr/>
-        </p:nvPicPr>
-        <p:blipFill>
-          <a:blip r:embed="rId4"/>
-          <a:stretch>
-            <a:fillRect/>
-          </a:stretch>
-        </p:blipFill>
-        <p:spPr>
-          <a:xfrm>
-            <a:off x="6217920" y="2743200"/>
-            <a:ext cx="2651760" cy="1763091"/>
-          </a:xfrm>
-          <a:prstGeom prst="rect">
-            <a:avLst/>
-          </a:prstGeom>
-        </p:spPr>
-      </p:pic>
-    </p:spTree>
-  </p:cSld>
-  <p:clrMapOvr>
-    <a:masterClrMapping/>
-  </p:clrMapOvr>
-</p:sld>
-</file>
-
-<file path=ppt/slides/slide8.xml><?xml version="1.0" encoding="utf-8"?>
-<p:sld xmlns:a="http://schemas.openxmlformats.org/drawingml/2006/main" xmlns:p="http://schemas.openxmlformats.org/presentationml/2006/main" xmlns:r="http://schemas.openxmlformats.org/officeDocument/2006/relationships">
-  <p:cSld>
-    <p:bg>
-      <p:bgPr>
-        <a:solidFill>
-          <a:srgbClr val="0E1A24"/>
-        </a:solidFill>
-        <a:effectLst/>
-      </p:bgPr>
-    </p:bg>
-    <p:spTree>
-      <p:nvGrpSpPr>
-        <p:cNvPr id="1" name=""/>
-        <p:cNvGrpSpPr/>
-        <p:nvPr/>
-      </p:nvGrpSpPr>
-      <p:grpSpPr/>
-      <p:sp>
-        <p:nvSpPr>
-          <p:cNvPr id="2" name="TextBox 1"/>
-          <p:cNvSpPr txBox="1"/>
-          <p:nvPr/>
-        </p:nvSpPr>
-        <p:spPr>
-          <a:xfrm>
-            <a:off x="457200" y="320040"/>
-            <a:ext cx="8412480" cy="1097280"/>
-          </a:xfrm>
-          <a:prstGeom prst="rect">
-            <a:avLst/>
-          </a:prstGeom>
-          <a:noFill/>
-        </p:spPr>
-        <p:txBody>
-          <a:bodyPr wrap="square">
-            <a:spAutoFit/>
-          </a:bodyPr>
-          <a:lstStyle/>
-          <a:p>
-            <a:pPr>
-              <a:defRPr sz="4000" b="1">
-                <a:solidFill>
-                  <a:srgbClr val="F5F8FC"/>
-                </a:solidFill>
-              </a:defRPr>
-            </a:pPr>
-            <a:r>
-              <a:t>lesson seven dissect the failure so everyone learns how to avoid it next season...</a:t>
-            </a:r>
-          </a:p>
-        </p:txBody>
-      </p:sp>
-      <p:sp>
-        <p:nvSpPr>
-          <p:cNvPr id="3" name="TextBox 2"/>
-          <p:cNvSpPr txBox="1"/>
-          <p:nvPr/>
-        </p:nvSpPr>
-        <p:spPr>
-          <a:xfrm>
-            <a:off x="457200" y="1463040"/>
-            <a:ext cx="4206240" cy="4206240"/>
-          </a:xfrm>
-          <a:prstGeom prst="rect">
-            <a:avLst/>
-          </a:prstGeom>
-          <a:noFill/>
-        </p:spPr>
-        <p:txBody>
-          <a:bodyPr wrap="square">
-            <a:spAutoFit/>
-          </a:bodyPr>
-          <a:lstStyle/>
-          <a:p>
-            <a:pPr>
-              <a:spcAft>
-                <a:spcPts val="400"/>
-              </a:spcAft>
-              <a:defRPr sz="2600">
-                <a:solidFill>
-                  <a:srgbClr val="E0E8F0"/>
-                </a:solidFill>
-              </a:defRPr>
-            </a:pPr>
-            <a:r>
-              <a:t>injection happened after scaling so engineered features stayed frozen and the model saw no change</a:t>
-            </a:r>
-          </a:p>
-          <a:p>
-            <a:pPr>
-              <a:spcAft>
-                <a:spcPts val="400"/>
-              </a:spcAft>
-              <a:defRPr sz="2600">
-                <a:solidFill>
-                  <a:srgbClr val="E0E8F0"/>
-                </a:solidFill>
-              </a:defRPr>
-            </a:pPr>
-            <a:r>
-              <a:t>scaled precip irrigation exceeded buffered range which pushed the lstm off its training manifold</a:t>
-            </a:r>
-          </a:p>
-          <a:p>
-            <a:pPr>
-              <a:spcAft>
-                <a:spcPts val="400"/>
-              </a:spcAft>
-              <a:defRPr sz="2600">
-                <a:solidFill>
-                  <a:srgbClr val="E0E8F0"/>
-                </a:solidFill>
-              </a:defRPr>
-            </a:pPr>
-            <a:r>
-              <a:t>lack of cross plot diversity meant the network defaulted to trend continuation instead of reacting</a:t>
-            </a:r>
-          </a:p>
-        </p:txBody>
-      </p:sp>
-      <p:pic>
-        <p:nvPicPr>
-          <p:cNvPr id="4" name="Picture 3" descr="irrigation_injection_failure.png"/>
-          <p:cNvPicPr>
-            <a:picLocks noChangeAspect="1"/>
-          </p:cNvPicPr>
-          <p:nvPr/>
-        </p:nvPicPr>
-        <p:blipFill>
-          <a:blip r:embed="rId2"/>
-          <a:stretch>
-            <a:fillRect/>
-          </a:stretch>
-        </p:blipFill>
-        <p:spPr>
-          <a:xfrm>
-            <a:off x="4846320" y="1463040"/>
-            <a:ext cx="4297680" cy="4300082"/>
-          </a:xfrm>
-          <a:prstGeom prst="rect">
-            <a:avLst/>
-          </a:prstGeom>
-        </p:spPr>
-      </p:pic>
-    </p:spTree>
-  </p:cSld>
-  <p:clrMapOvr>
-    <a:masterClrMapping/>
-  </p:clrMapOvr>
-</p:sld>
-</file>
-
-<file path=ppt/slides/slide9.xml><?xml version="1.0" encoding="utf-8"?>
-<p:sld xmlns:a="http://schemas.openxmlformats.org/drawingml/2006/main" xmlns:p="http://schemas.openxmlformats.org/presentationml/2006/main" xmlns:r="http://schemas.openxmlformats.org/officeDocument/2006/relationships">
-  <p:cSld>
-    <p:bg>
-      <p:bgPr>
-        <a:solidFill>
-          <a:srgbClr val="0E1A24"/>
-        </a:solidFill>
-        <a:effectLst/>
-      </p:bgPr>
-    </p:bg>
-    <p:spTree>
-      <p:nvGrpSpPr>
-        <p:cNvPr id="1" name=""/>
-        <p:cNvGrpSpPr/>
-        <p:nvPr/>
-      </p:nvGrpSpPr>
-      <p:grpSpPr/>
-      <p:sp>
-        <p:nvSpPr>
-          <p:cNvPr id="2" name="TextBox 1"/>
-          <p:cNvSpPr txBox="1"/>
-          <p:nvPr/>
-        </p:nvSpPr>
-        <p:spPr>
-          <a:xfrm>
-            <a:off x="457200" y="320040"/>
-            <a:ext cx="8412480" cy="1097280"/>
-          </a:xfrm>
-          <a:prstGeom prst="rect">
-            <a:avLst/>
-          </a:prstGeom>
-          <a:noFill/>
-        </p:spPr>
-        <p:txBody>
-          <a:bodyPr wrap="square">
-            <a:spAutoFit/>
-          </a:bodyPr>
-          <a:lstStyle/>
-          <a:p>
-            <a:pPr>
-              <a:defRPr sz="4000" b="1">
-                <a:solidFill>
-                  <a:srgbClr val="F5F8FC"/>
-                </a:solidFill>
-              </a:defRPr>
-            </a:pPr>
-            <a:r>
-              <a:t>lesson eight close with the reusable kit and the two fixes queued for next season...</a:t>
-            </a:r>
-          </a:p>
-        </p:txBody>
-      </p:sp>
-      <p:sp>
-        <p:nvSpPr>
-          <p:cNvPr id="3" name="TextBox 2"/>
-          <p:cNvSpPr txBox="1"/>
-          <p:nvPr/>
-        </p:nvSpPr>
-        <p:spPr>
-          <a:xfrm>
-            <a:off x="640080" y="1463040"/>
-            <a:ext cx="7863840" cy="4389120"/>
-          </a:xfrm>
-          <a:prstGeom prst="rect">
-            <a:avLst/>
-          </a:prstGeom>
-          <a:noFill/>
-        </p:spPr>
-        <p:txBody>
-          <a:bodyPr wrap="square">
-            <a:spAutoFit/>
-          </a:bodyPr>
-          <a:lstStyle/>
-          <a:p>
-            <a:pPr>
-              <a:spcAft>
-                <a:spcPts val="400"/>
-              </a:spcAft>
-              <a:defRPr sz="2600">
-                <a:solidFill>
-                  <a:srgbClr val="E0E8F0"/>
-                </a:solidFill>
-              </a:defRPr>
-            </a:pPr>
-            <a:r>
-              <a:t>data cleaning and irrigation feature stack are production ready and already documented</a:t>
-            </a:r>
-          </a:p>
-          <a:p>
-            <a:pPr>
-              <a:spcAft>
-                <a:spcPts val="400"/>
-              </a:spcAft>
-              <a:defRPr sz="2600">
-                <a:solidFill>
-                  <a:srgbClr val="E0E8F0"/>
-                </a:solidFill>
-              </a:defRPr>
-            </a:pPr>
-            <a:r>
-              <a:t>next tasks: recompute features before sensitivity tests and repair the timeseries split logic</a:t>
-            </a:r>
-          </a:p>
-          <a:p>
-            <a:pPr>
-              <a:spcAft>
-                <a:spcPts val="400"/>
-              </a:spcAft>
-              <a:defRPr sz="2600">
-                <a:solidFill>
-                  <a:srgbClr val="E0E8F0"/>
-                </a:solidFill>
-              </a:defRPr>
-            </a:pPr>
-            <a:r>
-              <a:t>share the notebook and slides as onboarding material for agronomists and controls teammates</a:t>
-            </a:r>
-          </a:p>
-        </p:txBody>
-      </p:sp>
-    </p:spTree>
-  </p:cSld>
-  <p:clrMapOvr>
-    <a:masterClrMapping/>
-  </p:clrMapOvr>
-</p:sld>
 </file>
 
 <file path=ppt/theme/theme1.xml><?xml version="1.0" encoding="utf-8"?>
@@ -5090,324 +3393,4 @@
   </a:objectDefaults>
   <a:extraClrSchemeLst/>
 </a:theme>
-</file>
-
-<file path=ppt/theme/theme2.xml><?xml version="1.0" encoding="utf-8"?>
-<a:theme xmlns:a="http://schemas.openxmlformats.org/drawingml/2006/main" name="Office Theme">
-  <a:themeElements>
-    <a:clrScheme name="Office">
-      <a:dk1>
-        <a:sysClr val="windowText" lastClr="000000"/>
-      </a:dk1>
-      <a:lt1>
-        <a:sysClr val="window" lastClr="FFFFFF"/>
-      </a:lt1>
-      <a:dk2>
-        <a:srgbClr val="1F497D"/>
-      </a:dk2>
-      <a:lt2>
-        <a:srgbClr val="EEECE1"/>
-      </a:lt2>
-      <a:accent1>
-        <a:srgbClr val="4F81BD"/>
-      </a:accent1>
-      <a:accent2>
-        <a:srgbClr val="C0504D"/>
-      </a:accent2>
-      <a:accent3>
-        <a:srgbClr val="9BBB59"/>
-      </a:accent3>
-      <a:accent4>
-        <a:srgbClr val="8064A2"/>
-      </a:accent4>
-      <a:accent5>
-        <a:srgbClr val="4BACC6"/>
-      </a:accent5>
-      <a:accent6>
-        <a:srgbClr val="F79646"/>
-      </a:accent6>
-      <a:hlink>
-        <a:srgbClr val="0000FF"/>
-      </a:hlink>
-      <a:folHlink>
-        <a:srgbClr val="800080"/>
-      </a:folHlink>
-    </a:clrScheme>
-    <a:fontScheme name="Office">
-      <a:majorFont>
-        <a:latin typeface="Calibri"/>
-        <a:ea typeface=""/>
-        <a:cs typeface=""/>
-        <a:font script="Jpan" typeface="ＭＳ Ｐゴシック"/>
-        <a:font script="Hang" typeface="맑은 고딕"/>
-        <a:font script="Hans" typeface="宋体"/>
-        <a:font script="Hant" typeface="新細明體"/>
-        <a:font script="Arab" typeface="Times New Roman"/>
-        <a:font script="Hebr" typeface="Times New Roman"/>
-        <a:font script="Thai" typeface="Angsana New"/>
-        <a:font script="Ethi" typeface="Nyala"/>
-        <a:font script="Beng" typeface="Vrinda"/>
-        <a:font script="Gujr" typeface="Shruti"/>
-        <a:font script="Khmr" typeface="MoolBoran"/>
-        <a:font script="Knda" typeface="Tunga"/>
-        <a:font script="Guru" typeface="Raavi"/>
-        <a:font script="Cans" typeface="Euphemia"/>
-        <a:font script="Cher" typeface="Plantagenet Cherokee"/>
-        <a:font script="Yiii" typeface="Microsoft Yi Baiti"/>
-        <a:font script="Tibt" typeface="Microsoft Himalaya"/>
-        <a:font script="Thaa" typeface="MV Boli"/>
-        <a:font script="Deva" typeface="Mangal"/>
-        <a:font script="Telu" typeface="Gautami"/>
-        <a:font script="Taml" typeface="Latha"/>
-        <a:font script="Syrc" typeface="Estrangelo Edessa"/>
-        <a:font script="Orya" typeface="Kalinga"/>
-        <a:font script="Mlym" typeface="Kartika"/>
-        <a:font script="Laoo" typeface="DokChampa"/>
-        <a:font script="Sinh" typeface="Iskoola Pota"/>
-        <a:font script="Mong" typeface="Mongolian Baiti"/>
-        <a:font script="Viet" typeface="Times New Roman"/>
-        <a:font script="Uigh" typeface="Microsoft Uighur"/>
-        <a:font script="Geor" typeface="Sylfaen"/>
-      </a:majorFont>
-      <a:minorFont>
-        <a:latin typeface="Calibri"/>
-        <a:ea typeface=""/>
-        <a:cs typeface=""/>
-        <a:font script="Jpan" typeface="ＭＳ Ｐゴシック"/>
-        <a:font script="Hang" typeface="맑은 고딕"/>
-        <a:font script="Hans" typeface="宋体"/>
-        <a:font script="Hant" typeface="新細明體"/>
-        <a:font script="Arab" typeface="Arial"/>
-        <a:font script="Hebr" typeface="Arial"/>
-        <a:font script="Thai" typeface="Cordia New"/>
-        <a:font script="Ethi" typeface="Nyala"/>
-        <a:font script="Beng" typeface="Vrinda"/>
-        <a:font script="Gujr" typeface="Shruti"/>
-        <a:font script="Khmr" typeface="DaunPenh"/>
-        <a:font script="Knda" typeface="Tunga"/>
-        <a:font script="Guru" typeface="Raavi"/>
-        <a:font script="Cans" typeface="Euphemia"/>
-        <a:font script="Cher" typeface="Plantagenet Cherokee"/>
-        <a:font script="Yiii" typeface="Microsoft Yi Baiti"/>
-        <a:font script="Tibt" typeface="Microsoft Himalaya"/>
-        <a:font script="Thaa" typeface="MV Boli"/>
-        <a:font script="Deva" typeface="Mangal"/>
-        <a:font script="Telu" typeface="Gautami"/>
-        <a:font script="Taml" typeface="Latha"/>
-        <a:font script="Syrc" typeface="Estrangelo Edessa"/>
-        <a:font script="Orya" typeface="Kalinga"/>
-        <a:font script="Mlym" typeface="Kartika"/>
-        <a:font script="Laoo" typeface="DokChampa"/>
-        <a:font script="Sinh" typeface="Iskoola Pota"/>
-        <a:font script="Mong" typeface="Mongolian Baiti"/>
-        <a:font script="Viet" typeface="Arial"/>
-        <a:font script="Uigh" typeface="Microsoft Uighur"/>
-        <a:font script="Geor" typeface="Sylfaen"/>
-      </a:minorFont>
-    </a:fontScheme>
-    <a:fmtScheme name="Office">
-      <a:fillStyleLst>
-        <a:solidFill>
-          <a:schemeClr val="phClr"/>
-        </a:solidFill>
-        <a:gradFill rotWithShape="1">
-          <a:gsLst>
-            <a:gs pos="0">
-              <a:schemeClr val="phClr">
-                <a:tint val="50000"/>
-                <a:satMod val="300000"/>
-              </a:schemeClr>
-            </a:gs>
-            <a:gs pos="35000">
-              <a:schemeClr val="phClr">
-                <a:tint val="37000"/>
-                <a:satMod val="300000"/>
-              </a:schemeClr>
-            </a:gs>
-            <a:gs pos="100000">
-              <a:schemeClr val="phClr">
-                <a:tint val="15000"/>
-                <a:satMod val="350000"/>
-              </a:schemeClr>
-            </a:gs>
-          </a:gsLst>
-          <a:lin ang="16200000" scaled="1"/>
-        </a:gradFill>
-        <a:gradFill rotWithShape="1">
-          <a:gsLst>
-            <a:gs pos="0">
-              <a:schemeClr val="phClr">
-                <a:tint val="100000"/>
-                <a:shade val="100000"/>
-                <a:satMod val="130000"/>
-              </a:schemeClr>
-            </a:gs>
-            <a:gs pos="100000">
-              <a:schemeClr val="phClr">
-                <a:tint val="50000"/>
-                <a:shade val="100000"/>
-                <a:satMod val="350000"/>
-              </a:schemeClr>
-            </a:gs>
-          </a:gsLst>
-          <a:lin ang="16200000" scaled="0"/>
-        </a:gradFill>
-      </a:fillStyleLst>
-      <a:lnStyleLst>
-        <a:ln w="9525" cap="flat" cmpd="sng" algn="ctr">
-          <a:solidFill>
-            <a:schemeClr val="phClr">
-              <a:shade val="95000"/>
-              <a:satMod val="105000"/>
-            </a:schemeClr>
-          </a:solidFill>
-          <a:prstDash val="solid"/>
-        </a:ln>
-        <a:ln w="25400" cap="flat" cmpd="sng" algn="ctr">
-          <a:solidFill>
-            <a:schemeClr val="phClr"/>
-          </a:solidFill>
-          <a:prstDash val="solid"/>
-        </a:ln>
-        <a:ln w="38100" cap="flat" cmpd="sng" algn="ctr">
-          <a:solidFill>
-            <a:schemeClr val="phClr"/>
-          </a:solidFill>
-          <a:prstDash val="solid"/>
-        </a:ln>
-      </a:lnStyleLst>
-      <a:effectStyleLst>
-        <a:effectStyle>
-          <a:effectLst>
-            <a:outerShdw blurRad="40000" dist="20000" dir="5400000" rotWithShape="0">
-              <a:srgbClr val="000000">
-                <a:alpha val="38000"/>
-              </a:srgbClr>
-            </a:outerShdw>
-          </a:effectLst>
-        </a:effectStyle>
-        <a:effectStyle>
-          <a:effectLst>
-            <a:outerShdw blurRad="40000" dist="23000" dir="5400000" rotWithShape="0">
-              <a:srgbClr val="000000">
-                <a:alpha val="35000"/>
-              </a:srgbClr>
-            </a:outerShdw>
-          </a:effectLst>
-        </a:effectStyle>
-        <a:effectStyle>
-          <a:effectLst>
-            <a:outerShdw blurRad="40000" dist="23000" dir="5400000" rotWithShape="0">
-              <a:srgbClr val="000000">
-                <a:alpha val="35000"/>
-              </a:srgbClr>
-            </a:outerShdw>
-          </a:effectLst>
-          <a:scene3d>
-            <a:camera prst="orthographicFront">
-              <a:rot lat="0" lon="0" rev="0"/>
-            </a:camera>
-            <a:lightRig rig="threePt" dir="t">
-              <a:rot lat="0" lon="0" rev="1200000"/>
-            </a:lightRig>
-          </a:scene3d>
-          <a:sp3d>
-            <a:bevelT w="63500" h="25400"/>
-          </a:sp3d>
-        </a:effectStyle>
-      </a:effectStyleLst>
-      <a:bgFillStyleLst>
-        <a:solidFill>
-          <a:schemeClr val="phClr"/>
-        </a:solidFill>
-        <a:gradFill rotWithShape="1">
-          <a:gsLst>
-            <a:gs pos="0">
-              <a:schemeClr val="phClr">
-                <a:tint val="40000"/>
-                <a:satMod val="350000"/>
-              </a:schemeClr>
-            </a:gs>
-            <a:gs pos="40000">
-              <a:schemeClr val="phClr">
-                <a:tint val="45000"/>
-                <a:shade val="99000"/>
-                <a:satMod val="350000"/>
-              </a:schemeClr>
-            </a:gs>
-            <a:gs pos="100000">
-              <a:schemeClr val="phClr">
-                <a:shade val="20000"/>
-                <a:satMod val="255000"/>
-              </a:schemeClr>
-            </a:gs>
-          </a:gsLst>
-          <a:path path="circle">
-            <a:fillToRect l="50000" t="-80000" r="50000" b="180000"/>
-          </a:path>
-        </a:gradFill>
-        <a:gradFill rotWithShape="1">
-          <a:gsLst>
-            <a:gs pos="0">
-              <a:schemeClr val="phClr">
-                <a:tint val="80000"/>
-                <a:satMod val="300000"/>
-              </a:schemeClr>
-            </a:gs>
-            <a:gs pos="100000">
-              <a:schemeClr val="phClr">
-                <a:shade val="30000"/>
-                <a:satMod val="200000"/>
-              </a:schemeClr>
-            </a:gs>
-          </a:gsLst>
-          <a:path path="circle">
-            <a:fillToRect l="50000" t="50000" r="50000" b="50000"/>
-          </a:path>
-        </a:gradFill>
-      </a:bgFillStyleLst>
-    </a:fmtScheme>
-  </a:themeElements>
-  <a:objectDefaults>
-    <a:spDef>
-      <a:spPr/>
-      <a:bodyPr/>
-      <a:lstStyle/>
-      <a:style>
-        <a:lnRef idx="1">
-          <a:schemeClr val="accent1"/>
-        </a:lnRef>
-        <a:fillRef idx="3">
-          <a:schemeClr val="accent1"/>
-        </a:fillRef>
-        <a:effectRef idx="2">
-          <a:schemeClr val="accent1"/>
-        </a:effectRef>
-        <a:fontRef idx="minor">
-          <a:schemeClr val="lt1"/>
-        </a:fontRef>
-      </a:style>
-    </a:spDef>
-    <a:lnDef>
-      <a:spPr/>
-      <a:bodyPr/>
-      <a:lstStyle/>
-      <a:style>
-        <a:lnRef idx="2">
-          <a:schemeClr val="accent1"/>
-        </a:lnRef>
-        <a:fillRef idx="0">
-          <a:schemeClr val="accent1"/>
-        </a:fillRef>
-        <a:effectRef idx="1">
-          <a:schemeClr val="accent1"/>
-        </a:effectRef>
-        <a:fontRef idx="minor">
-          <a:schemeClr val="tx1"/>
-        </a:fontRef>
-      </a:style>
-    </a:lnDef>
-  </a:objectDefaults>
-  <a:extraClrSchemeLst/>
-</a:theme>
 </file>
</xml_diff>

<commit_message>
Recreate EDA presentation deck with updated slides
</commit_message>
<xml_diff>
--- a/presentation/eda_story/eda_story.pptx
+++ b/presentation/eda_story/eda_story.pptx
@@ -4,6 +4,22 @@
   <p:sldMasterIdLst>
     <p:sldMasterId id="2147483648" r:id="rId1"/>
   </p:sldMasterIdLst>
+  <p:sldIdLst>
+    <p:sldId id="256" r:id="rId7"/>
+    <p:sldId id="257" r:id="rId8"/>
+    <p:sldId id="258" r:id="rId9"/>
+    <p:sldId id="259" r:id="rId10"/>
+    <p:sldId id="260" r:id="rId11"/>
+    <p:sldId id="261" r:id="rId12"/>
+    <p:sldId id="262" r:id="rId13"/>
+    <p:sldId id="263" r:id="rId14"/>
+    <p:sldId id="264" r:id="rId15"/>
+    <p:sldId id="265" r:id="rId16"/>
+    <p:sldId id="266" r:id="rId17"/>
+    <p:sldId id="267" r:id="rId18"/>
+    <p:sldId id="268" r:id="rId19"/>
+    <p:sldId id="269" r:id="rId20"/>
+  </p:sldIdLst>
   <p:sldSz cx="9144000" cy="6858000" type="screen4x3"/>
   <p:notesSz cx="6858000" cy="9144000"/>
   <p:defaultTextStyle>
@@ -3073,6 +3089,1737 @@
     </p:otherStyle>
   </p:txStyles>
 </p:sldMaster>
+</file>
+
+<file path=ppt/slides/slide1.xml><?xml version="1.0" encoding="utf-8"?>
+<p:sld xmlns:a="http://schemas.openxmlformats.org/drawingml/2006/main" xmlns:p="http://schemas.openxmlformats.org/presentationml/2006/main" xmlns:r="http://schemas.openxmlformats.org/officeDocument/2006/relationships">
+  <p:cSld>
+    <p:bg>
+      <p:bgPr>
+        <a:solidFill>
+          <a:srgbClr val="0C1822"/>
+        </a:solidFill>
+        <a:effectLst/>
+      </p:bgPr>
+    </p:bg>
+    <p:spTree>
+      <p:nvGrpSpPr>
+        <p:cNvPr id="1" name=""/>
+        <p:cNvGrpSpPr/>
+        <p:nvPr/>
+      </p:nvGrpSpPr>
+      <p:grpSpPr/>
+      <p:sp>
+        <p:nvSpPr>
+          <p:cNvPr id="2" name="TextBox 1"/>
+          <p:cNvSpPr txBox="1"/>
+          <p:nvPr/>
+        </p:nvSpPr>
+        <p:spPr>
+          <a:xfrm>
+            <a:off x="548640" y="365760"/>
+            <a:ext cx="8412480" cy="1097280"/>
+          </a:xfrm>
+          <a:prstGeom prst="rect">
+            <a:avLst/>
+          </a:prstGeom>
+          <a:noFill/>
+        </p:spPr>
+        <p:txBody>
+          <a:bodyPr wrap="none">
+            <a:spAutoFit/>
+          </a:bodyPr>
+          <a:lstStyle/>
+          <a:p>
+            <a:pPr>
+              <a:defRPr sz="4000" b="1">
+                <a:solidFill>
+                  <a:srgbClr val="F5F8FC"/>
+                </a:solidFill>
+              </a:defRPr>
+            </a:pPr>
+            <a:r>
+              <a:t>soil moisture automation flows from field sensors through lorawan into our sqlite project...</a:t>
+            </a:r>
+          </a:p>
+        </p:txBody>
+      </p:sp>
+      <p:sp>
+        <p:nvSpPr>
+          <p:cNvPr id="3" name="TextBox 2"/>
+          <p:cNvSpPr txBox="1"/>
+          <p:nvPr/>
+        </p:nvSpPr>
+        <p:spPr>
+          <a:xfrm>
+            <a:off x="640080" y="1645920"/>
+            <a:ext cx="4114800" cy="4389120"/>
+          </a:xfrm>
+          <a:prstGeom prst="rect">
+            <a:avLst/>
+          </a:prstGeom>
+          <a:noFill/>
+        </p:spPr>
+        <p:txBody>
+          <a:bodyPr wrap="none">
+            <a:spAutoFit/>
+          </a:bodyPr>
+          <a:lstStyle/>
+          <a:p>
+            <a:pPr>
+              <a:spcAft>
+                <a:spcPts val="600"/>
+              </a:spcAft>
+              <a:defRPr sz="2600">
+                <a:solidFill>
+                  <a:srgbClr val="DCE6EE"/>
+                </a:solidFill>
+              </a:defRPr>
+            </a:pPr>
+            <a:r>
+              <a:t>replace this placeholder with your sensor photos and pipeline schematic</a:t>
+            </a:r>
+          </a:p>
+          <a:p/>
+        </p:txBody>
+      </p:sp>
+      <p:pic>
+        <p:nvPicPr>
+          <p:cNvPr id="4" name="Picture 3" descr="sensor_pipeline_placeholder.png"/>
+          <p:cNvPicPr>
+            <a:picLocks noChangeAspect="1"/>
+          </p:cNvPicPr>
+          <p:nvPr/>
+        </p:nvPicPr>
+        <p:blipFill>
+          <a:blip r:embed="rId2"/>
+          <a:stretch>
+            <a:fillRect/>
+          </a:stretch>
+        </p:blipFill>
+        <p:spPr>
+          <a:xfrm>
+            <a:off x="4846320" y="1645920"/>
+            <a:ext cx="4297680" cy="2578608"/>
+          </a:xfrm>
+          <a:prstGeom prst="rect">
+            <a:avLst/>
+          </a:prstGeom>
+        </p:spPr>
+      </p:pic>
+    </p:spTree>
+  </p:cSld>
+  <p:clrMapOvr>
+    <a:masterClrMapping/>
+  </p:clrMapOvr>
+</p:sld>
+</file>
+
+<file path=ppt/slides/slide10.xml><?xml version="1.0" encoding="utf-8"?>
+<p:sld xmlns:a="http://schemas.openxmlformats.org/drawingml/2006/main" xmlns:p="http://schemas.openxmlformats.org/presentationml/2006/main" xmlns:r="http://schemas.openxmlformats.org/officeDocument/2006/relationships">
+  <p:cSld>
+    <p:bg>
+      <p:bgPr>
+        <a:solidFill>
+          <a:srgbClr val="0C1822"/>
+        </a:solidFill>
+        <a:effectLst/>
+      </p:bgPr>
+    </p:bg>
+    <p:spTree>
+      <p:nvGrpSpPr>
+        <p:cNvPr id="1" name=""/>
+        <p:cNvGrpSpPr/>
+        <p:nvPr/>
+      </p:nvGrpSpPr>
+      <p:grpSpPr/>
+      <p:sp>
+        <p:nvSpPr>
+          <p:cNvPr id="2" name="TextBox 1"/>
+          <p:cNvSpPr txBox="1"/>
+          <p:nvPr/>
+        </p:nvSpPr>
+        <p:spPr>
+          <a:xfrm>
+            <a:off x="548640" y="365760"/>
+            <a:ext cx="8412480" cy="1097280"/>
+          </a:xfrm>
+          <a:prstGeom prst="rect">
+            <a:avLst/>
+          </a:prstGeom>
+          <a:noFill/>
+        </p:spPr>
+        <p:txBody>
+          <a:bodyPr wrap="none">
+            <a:spAutoFit/>
+          </a:bodyPr>
+          <a:lstStyle/>
+          <a:p>
+            <a:pPr>
+              <a:defRPr sz="4000" b="1">
+                <a:solidFill>
+                  <a:srgbClr val="F5F8FC"/>
+                </a:solidFill>
+              </a:defRPr>
+            </a:pPr>
+            <a:r>
+              <a:t>plot two zero zero three tracks surface moisture yet deeper layers lag after irrigation...</a:t>
+            </a:r>
+          </a:p>
+        </p:txBody>
+      </p:sp>
+      <p:sp>
+        <p:nvSpPr>
+          <p:cNvPr id="3" name="TextBox 2"/>
+          <p:cNvSpPr txBox="1"/>
+          <p:nvPr/>
+        </p:nvSpPr>
+        <p:spPr>
+          <a:xfrm>
+            <a:off x="640080" y="1645920"/>
+            <a:ext cx="4114800" cy="4389120"/>
+          </a:xfrm>
+          <a:prstGeom prst="rect">
+            <a:avLst/>
+          </a:prstGeom>
+          <a:noFill/>
+        </p:spPr>
+        <p:txBody>
+          <a:bodyPr wrap="none">
+            <a:spAutoFit/>
+          </a:bodyPr>
+          <a:lstStyle/>
+          <a:p>
+            <a:pPr>
+              <a:spcAft>
+                <a:spcPts val="600"/>
+              </a:spcAft>
+              <a:defRPr sz="2600">
+                <a:solidFill>
+                  <a:srgbClr val="DCE6EE"/>
+                </a:solidFill>
+              </a:defRPr>
+            </a:pPr>
+            <a:r>
+              <a:t>use this to discuss missing irrigation sensitivity below six inches</a:t>
+            </a:r>
+          </a:p>
+          <a:p/>
+        </p:txBody>
+      </p:sp>
+      <p:pic>
+        <p:nvPicPr>
+          <p:cNvPr id="4" name="Picture 3" descr="pred_vs_actual_plot2003.png"/>
+          <p:cNvPicPr>
+            <a:picLocks noChangeAspect="1"/>
+          </p:cNvPicPr>
+          <p:nvPr/>
+        </p:nvPicPr>
+        <p:blipFill>
+          <a:blip r:embed="rId2"/>
+          <a:stretch>
+            <a:fillRect/>
+          </a:stretch>
+        </p:blipFill>
+        <p:spPr>
+          <a:xfrm>
+            <a:off x="4846320" y="1645920"/>
+            <a:ext cx="4297680" cy="2857423"/>
+          </a:xfrm>
+          <a:prstGeom prst="rect">
+            <a:avLst/>
+          </a:prstGeom>
+        </p:spPr>
+      </p:pic>
+    </p:spTree>
+  </p:cSld>
+  <p:clrMapOvr>
+    <a:masterClrMapping/>
+  </p:clrMapOvr>
+</p:sld>
+</file>
+
+<file path=ppt/slides/slide11.xml><?xml version="1.0" encoding="utf-8"?>
+<p:sld xmlns:a="http://schemas.openxmlformats.org/drawingml/2006/main" xmlns:p="http://schemas.openxmlformats.org/presentationml/2006/main" xmlns:r="http://schemas.openxmlformats.org/officeDocument/2006/relationships">
+  <p:cSld>
+    <p:bg>
+      <p:bgPr>
+        <a:solidFill>
+          <a:srgbClr val="0C1822"/>
+        </a:solidFill>
+        <a:effectLst/>
+      </p:bgPr>
+    </p:bg>
+    <p:spTree>
+      <p:nvGrpSpPr>
+        <p:cNvPr id="1" name=""/>
+        <p:cNvGrpSpPr/>
+        <p:nvPr/>
+      </p:nvGrpSpPr>
+      <p:grpSpPr/>
+      <p:sp>
+        <p:nvSpPr>
+          <p:cNvPr id="2" name="TextBox 1"/>
+          <p:cNvSpPr txBox="1"/>
+          <p:nvPr/>
+        </p:nvSpPr>
+        <p:spPr>
+          <a:xfrm>
+            <a:off x="548640" y="365760"/>
+            <a:ext cx="8412480" cy="1097280"/>
+          </a:xfrm>
+          <a:prstGeom prst="rect">
+            <a:avLst/>
+          </a:prstGeom>
+          <a:noFill/>
+        </p:spPr>
+        <p:txBody>
+          <a:bodyPr wrap="none">
+            <a:spAutoFit/>
+          </a:bodyPr>
+          <a:lstStyle/>
+          <a:p>
+            <a:pPr>
+              <a:defRPr sz="4000" b="1">
+                <a:solidFill>
+                  <a:srgbClr val="F5F8FC"/>
+                </a:solidFill>
+              </a:defRPr>
+            </a:pPr>
+            <a:r>
+              <a:t>plot two zero one four stays biased high because dry down exemplars never hit training...</a:t>
+            </a:r>
+          </a:p>
+        </p:txBody>
+      </p:sp>
+      <p:sp>
+        <p:nvSpPr>
+          <p:cNvPr id="3" name="TextBox 2"/>
+          <p:cNvSpPr txBox="1"/>
+          <p:nvPr/>
+        </p:nvSpPr>
+        <p:spPr>
+          <a:xfrm>
+            <a:off x="640080" y="1645920"/>
+            <a:ext cx="4114800" cy="4389120"/>
+          </a:xfrm>
+          <a:prstGeom prst="rect">
+            <a:avLst/>
+          </a:prstGeom>
+          <a:noFill/>
+        </p:spPr>
+        <p:txBody>
+          <a:bodyPr wrap="none">
+            <a:spAutoFit/>
+          </a:bodyPr>
+          <a:lstStyle/>
+          <a:p>
+            <a:pPr>
+              <a:spcAft>
+                <a:spcPts val="600"/>
+              </a:spcAft>
+              <a:defRPr sz="2600">
+                <a:solidFill>
+                  <a:srgbClr val="DCE6EE"/>
+                </a:solidFill>
+              </a:defRPr>
+            </a:pPr>
+            <a:r>
+              <a:t>prime example of imbalance across plots and need for cross validation fix</a:t>
+            </a:r>
+          </a:p>
+          <a:p/>
+        </p:txBody>
+      </p:sp>
+      <p:pic>
+        <p:nvPicPr>
+          <p:cNvPr id="4" name="Picture 3" descr="pred_vs_actual_plot2014.png"/>
+          <p:cNvPicPr>
+            <a:picLocks noChangeAspect="1"/>
+          </p:cNvPicPr>
+          <p:nvPr/>
+        </p:nvPicPr>
+        <p:blipFill>
+          <a:blip r:embed="rId2"/>
+          <a:stretch>
+            <a:fillRect/>
+          </a:stretch>
+        </p:blipFill>
+        <p:spPr>
+          <a:xfrm>
+            <a:off x="4846320" y="1645920"/>
+            <a:ext cx="4297680" cy="2857423"/>
+          </a:xfrm>
+          <a:prstGeom prst="rect">
+            <a:avLst/>
+          </a:prstGeom>
+        </p:spPr>
+      </p:pic>
+    </p:spTree>
+  </p:cSld>
+  <p:clrMapOvr>
+    <a:masterClrMapping/>
+  </p:clrMapOvr>
+</p:sld>
+</file>
+
+<file path=ppt/slides/slide12.xml><?xml version="1.0" encoding="utf-8"?>
+<p:sld xmlns:a="http://schemas.openxmlformats.org/drawingml/2006/main" xmlns:p="http://schemas.openxmlformats.org/presentationml/2006/main" xmlns:r="http://schemas.openxmlformats.org/officeDocument/2006/relationships">
+  <p:cSld>
+    <p:bg>
+      <p:bgPr>
+        <a:solidFill>
+          <a:srgbClr val="0C1822"/>
+        </a:solidFill>
+        <a:effectLst/>
+      </p:bgPr>
+    </p:bg>
+    <p:spTree>
+      <p:nvGrpSpPr>
+        <p:cNvPr id="1" name=""/>
+        <p:cNvGrpSpPr/>
+        <p:nvPr/>
+      </p:nvGrpSpPr>
+      <p:grpSpPr/>
+      <p:sp>
+        <p:nvSpPr>
+          <p:cNvPr id="2" name="TextBox 1"/>
+          <p:cNvSpPr txBox="1"/>
+          <p:nvPr/>
+        </p:nvSpPr>
+        <p:spPr>
+          <a:xfrm>
+            <a:off x="548640" y="365760"/>
+            <a:ext cx="8412480" cy="1097280"/>
+          </a:xfrm>
+          <a:prstGeom prst="rect">
+            <a:avLst/>
+          </a:prstGeom>
+          <a:noFill/>
+        </p:spPr>
+        <p:txBody>
+          <a:bodyPr wrap="none">
+            <a:spAutoFit/>
+          </a:bodyPr>
+          <a:lstStyle/>
+          <a:p>
+            <a:pPr>
+              <a:defRPr sz="4000" b="1">
+                <a:solidFill>
+                  <a:srgbClr val="F5F8FC"/>
+                </a:solidFill>
+              </a:defRPr>
+            </a:pPr>
+            <a:r>
+              <a:t>plot two zero one five lags forty eight hours exposing the fold reuse bug and irrigation imbalance...</a:t>
+            </a:r>
+          </a:p>
+        </p:txBody>
+      </p:sp>
+      <p:sp>
+        <p:nvSpPr>
+          <p:cNvPr id="3" name="TextBox 2"/>
+          <p:cNvSpPr txBox="1"/>
+          <p:nvPr/>
+        </p:nvSpPr>
+        <p:spPr>
+          <a:xfrm>
+            <a:off x="640080" y="1645920"/>
+            <a:ext cx="4114800" cy="4389120"/>
+          </a:xfrm>
+          <a:prstGeom prst="rect">
+            <a:avLst/>
+          </a:prstGeom>
+          <a:noFill/>
+        </p:spPr>
+        <p:txBody>
+          <a:bodyPr wrap="none">
+            <a:spAutoFit/>
+          </a:bodyPr>
+          <a:lstStyle/>
+          <a:p>
+            <a:pPr>
+              <a:spcAft>
+                <a:spcPts val="600"/>
+              </a:spcAft>
+              <a:defRPr sz="2600">
+                <a:solidFill>
+                  <a:srgbClr val="DCE6EE"/>
+                </a:solidFill>
+              </a:defRPr>
+            </a:pPr>
+            <a:r>
+              <a:t>reinforces why repairing timeseries split matters for responsiveness</a:t>
+            </a:r>
+          </a:p>
+          <a:p/>
+        </p:txBody>
+      </p:sp>
+      <p:pic>
+        <p:nvPicPr>
+          <p:cNvPr id="4" name="Picture 3" descr="pred_vs_actual_plot2015.png"/>
+          <p:cNvPicPr>
+            <a:picLocks noChangeAspect="1"/>
+          </p:cNvPicPr>
+          <p:nvPr/>
+        </p:nvPicPr>
+        <p:blipFill>
+          <a:blip r:embed="rId2"/>
+          <a:stretch>
+            <a:fillRect/>
+          </a:stretch>
+        </p:blipFill>
+        <p:spPr>
+          <a:xfrm>
+            <a:off x="4846320" y="1645920"/>
+            <a:ext cx="4297680" cy="2857423"/>
+          </a:xfrm>
+          <a:prstGeom prst="rect">
+            <a:avLst/>
+          </a:prstGeom>
+        </p:spPr>
+      </p:pic>
+    </p:spTree>
+  </p:cSld>
+  <p:clrMapOvr>
+    <a:masterClrMapping/>
+  </p:clrMapOvr>
+</p:sld>
+</file>
+
+<file path=ppt/slides/slide13.xml><?xml version="1.0" encoding="utf-8"?>
+<p:sld xmlns:a="http://schemas.openxmlformats.org/drawingml/2006/main" xmlns:p="http://schemas.openxmlformats.org/presentationml/2006/main" xmlns:r="http://schemas.openxmlformats.org/officeDocument/2006/relationships">
+  <p:cSld>
+    <p:bg>
+      <p:bgPr>
+        <a:solidFill>
+          <a:srgbClr val="0C1822"/>
+        </a:solidFill>
+        <a:effectLst/>
+      </p:bgPr>
+    </p:bg>
+    <p:spTree>
+      <p:nvGrpSpPr>
+        <p:cNvPr id="1" name=""/>
+        <p:cNvGrpSpPr/>
+        <p:nvPr/>
+      </p:nvGrpSpPr>
+      <p:grpSpPr/>
+      <p:sp>
+        <p:nvSpPr>
+          <p:cNvPr id="2" name="TextBox 1"/>
+          <p:cNvSpPr txBox="1"/>
+          <p:nvPr/>
+        </p:nvSpPr>
+        <p:spPr>
+          <a:xfrm>
+            <a:off x="548640" y="365760"/>
+            <a:ext cx="8412480" cy="1097280"/>
+          </a:xfrm>
+          <a:prstGeom prst="rect">
+            <a:avLst/>
+          </a:prstGeom>
+          <a:noFill/>
+        </p:spPr>
+        <p:txBody>
+          <a:bodyPr wrap="none">
+            <a:spAutoFit/>
+          </a:bodyPr>
+          <a:lstStyle/>
+          <a:p>
+            <a:pPr>
+              <a:defRPr sz="4000" b="1">
+                <a:solidFill>
+                  <a:srgbClr val="F5F8FC"/>
+                </a:solidFill>
+              </a:defRPr>
+            </a:pPr>
+            <a:r>
+              <a:t>injection stress test froze features and pushed inputs off manifold so forecasts stayed flat...</a:t>
+            </a:r>
+          </a:p>
+        </p:txBody>
+      </p:sp>
+      <p:sp>
+        <p:nvSpPr>
+          <p:cNvPr id="3" name="TextBox 2"/>
+          <p:cNvSpPr txBox="1"/>
+          <p:nvPr/>
+        </p:nvSpPr>
+        <p:spPr>
+          <a:xfrm>
+            <a:off x="640080" y="1645920"/>
+            <a:ext cx="4114800" cy="4389120"/>
+          </a:xfrm>
+          <a:prstGeom prst="rect">
+            <a:avLst/>
+          </a:prstGeom>
+          <a:noFill/>
+        </p:spPr>
+        <p:txBody>
+          <a:bodyPr wrap="none">
+            <a:spAutoFit/>
+          </a:bodyPr>
+          <a:lstStyle/>
+          <a:p>
+            <a:pPr>
+              <a:spcAft>
+                <a:spcPts val="600"/>
+              </a:spcAft>
+              <a:defRPr sz="2600">
+                <a:solidFill>
+                  <a:srgbClr val="DCE6EE"/>
+                </a:solidFill>
+              </a:defRPr>
+            </a:pPr>
+            <a:r>
+              <a:t>next iteration recomputes engineered signals pre injection and respects scaler bounds</a:t>
+            </a:r>
+          </a:p>
+          <a:p/>
+        </p:txBody>
+      </p:sp>
+      <p:pic>
+        <p:nvPicPr>
+          <p:cNvPr id="4" name="Picture 3" descr="irrigation_injection_failure.png"/>
+          <p:cNvPicPr>
+            <a:picLocks noChangeAspect="1"/>
+          </p:cNvPicPr>
+          <p:nvPr/>
+        </p:nvPicPr>
+        <p:blipFill>
+          <a:blip r:embed="rId2"/>
+          <a:stretch>
+            <a:fillRect/>
+          </a:stretch>
+        </p:blipFill>
+        <p:spPr>
+          <a:xfrm>
+            <a:off x="4846320" y="1645920"/>
+            <a:ext cx="4297680" cy="4300082"/>
+          </a:xfrm>
+          <a:prstGeom prst="rect">
+            <a:avLst/>
+          </a:prstGeom>
+        </p:spPr>
+      </p:pic>
+    </p:spTree>
+  </p:cSld>
+  <p:clrMapOvr>
+    <a:masterClrMapping/>
+  </p:clrMapOvr>
+</p:sld>
+</file>
+
+<file path=ppt/slides/slide14.xml><?xml version="1.0" encoding="utf-8"?>
+<p:sld xmlns:a="http://schemas.openxmlformats.org/drawingml/2006/main" xmlns:p="http://schemas.openxmlformats.org/presentationml/2006/main" xmlns:r="http://schemas.openxmlformats.org/officeDocument/2006/relationships">
+  <p:cSld>
+    <p:bg>
+      <p:bgPr>
+        <a:solidFill>
+          <a:srgbClr val="0C1822"/>
+        </a:solidFill>
+        <a:effectLst/>
+      </p:bgPr>
+    </p:bg>
+    <p:spTree>
+      <p:nvGrpSpPr>
+        <p:cNvPr id="1" name=""/>
+        <p:cNvGrpSpPr/>
+        <p:nvPr/>
+      </p:nvGrpSpPr>
+      <p:grpSpPr/>
+      <p:sp>
+        <p:nvSpPr>
+          <p:cNvPr id="2" name="TextBox 1"/>
+          <p:cNvSpPr txBox="1"/>
+          <p:nvPr/>
+        </p:nvSpPr>
+        <p:spPr>
+          <a:xfrm>
+            <a:off x="548640" y="365760"/>
+            <a:ext cx="8412480" cy="1097280"/>
+          </a:xfrm>
+          <a:prstGeom prst="rect">
+            <a:avLst/>
+          </a:prstGeom>
+          <a:noFill/>
+        </p:spPr>
+        <p:txBody>
+          <a:bodyPr wrap="none">
+            <a:spAutoFit/>
+          </a:bodyPr>
+          <a:lstStyle/>
+          <a:p>
+            <a:pPr>
+              <a:defRPr sz="4000" b="1">
+                <a:solidFill>
+                  <a:srgbClr val="F5F8FC"/>
+                </a:solidFill>
+              </a:defRPr>
+            </a:pPr>
+            <a:r>
+              <a:t>wrap with reusable cleaning kit and the two fixes queued for next season...</a:t>
+            </a:r>
+          </a:p>
+        </p:txBody>
+      </p:sp>
+      <p:sp>
+        <p:nvSpPr>
+          <p:cNvPr id="3" name="TextBox 2"/>
+          <p:cNvSpPr txBox="1"/>
+          <p:nvPr/>
+        </p:nvSpPr>
+        <p:spPr>
+          <a:xfrm>
+            <a:off x="640080" y="1645920"/>
+            <a:ext cx="4114800" cy="4389120"/>
+          </a:xfrm>
+          <a:prstGeom prst="rect">
+            <a:avLst/>
+          </a:prstGeom>
+          <a:noFill/>
+        </p:spPr>
+        <p:txBody>
+          <a:bodyPr wrap="none">
+            <a:spAutoFit/>
+          </a:bodyPr>
+          <a:lstStyle/>
+          <a:p>
+            <a:pPr>
+              <a:spcAft>
+                <a:spcPts val="600"/>
+              </a:spcAft>
+              <a:defRPr sz="2600">
+                <a:solidFill>
+                  <a:srgbClr val="DCE6EE"/>
+                </a:solidFill>
+              </a:defRPr>
+            </a:pPr>
+            <a:r>
+              <a:t>hand off the documented preprocessing and feature pipeline</a:t>
+            </a:r>
+          </a:p>
+          <a:p/>
+          <a:p>
+            <a:pPr>
+              <a:spcAft>
+                <a:spcPts val="600"/>
+              </a:spcAft>
+              <a:defRPr sz="2600">
+                <a:solidFill>
+                  <a:srgbClr val="DCE6EE"/>
+                </a:solidFill>
+              </a:defRPr>
+            </a:pPr>
+            <a:r>
+              <a:t>repair timeseries split bug and sensitivity workflow before retraining</a:t>
+            </a:r>
+          </a:p>
+          <a:p/>
+          <a:p>
+            <a:pPr>
+              <a:spcAft>
+                <a:spcPts val="600"/>
+              </a:spcAft>
+              <a:defRPr sz="2600">
+                <a:solidFill>
+                  <a:srgbClr val="DCE6EE"/>
+                </a:solidFill>
+              </a:defRPr>
+            </a:pPr>
+            <a:r>
+              <a:t>use this deck and notebook for agronomy and controls onboarding</a:t>
+            </a:r>
+          </a:p>
+          <a:p/>
+        </p:txBody>
+      </p:sp>
+    </p:spTree>
+  </p:cSld>
+  <p:clrMapOvr>
+    <a:masterClrMapping/>
+  </p:clrMapOvr>
+</p:sld>
+</file>
+
+<file path=ppt/slides/slide2.xml><?xml version="1.0" encoding="utf-8"?>
+<p:sld xmlns:a="http://schemas.openxmlformats.org/drawingml/2006/main" xmlns:p="http://schemas.openxmlformats.org/presentationml/2006/main" xmlns:r="http://schemas.openxmlformats.org/officeDocument/2006/relationships">
+  <p:cSld>
+    <p:bg>
+      <p:bgPr>
+        <a:solidFill>
+          <a:srgbClr val="0C1822"/>
+        </a:solidFill>
+        <a:effectLst/>
+      </p:bgPr>
+    </p:bg>
+    <p:spTree>
+      <p:nvGrpSpPr>
+        <p:cNvPr id="1" name=""/>
+        <p:cNvGrpSpPr/>
+        <p:nvPr/>
+      </p:nvGrpSpPr>
+      <p:grpSpPr/>
+      <p:sp>
+        <p:nvSpPr>
+          <p:cNvPr id="2" name="TextBox 1"/>
+          <p:cNvSpPr txBox="1"/>
+          <p:nvPr/>
+        </p:nvSpPr>
+        <p:spPr>
+          <a:xfrm>
+            <a:off x="548640" y="365760"/>
+            <a:ext cx="8412480" cy="1097280"/>
+          </a:xfrm>
+          <a:prstGeom prst="rect">
+            <a:avLst/>
+          </a:prstGeom>
+          <a:noFill/>
+        </p:spPr>
+        <p:txBody>
+          <a:bodyPr wrap="none">
+            <a:spAutoFit/>
+          </a:bodyPr>
+          <a:lstStyle/>
+          <a:p>
+            <a:pPr>
+              <a:defRPr sz="4000" b="1">
+                <a:solidFill>
+                  <a:srgbClr val="F5F8FC"/>
+                </a:solidFill>
+              </a:defRPr>
+            </a:pPr>
+            <a:r>
+              <a:t>our july to october ingest covers thirty six plots of hourly soil moisture and weather...</a:t>
+            </a:r>
+          </a:p>
+        </p:txBody>
+      </p:sp>
+      <p:sp>
+        <p:nvSpPr>
+          <p:cNvPr id="3" name="TextBox 2"/>
+          <p:cNvSpPr txBox="1"/>
+          <p:nvPr/>
+        </p:nvSpPr>
+        <p:spPr>
+          <a:xfrm>
+            <a:off x="640080" y="1645920"/>
+            <a:ext cx="4114800" cy="4389120"/>
+          </a:xfrm>
+          <a:prstGeom prst="rect">
+            <a:avLst/>
+          </a:prstGeom>
+          <a:noFill/>
+        </p:spPr>
+        <p:txBody>
+          <a:bodyPr wrap="none">
+            <a:spAutoFit/>
+          </a:bodyPr>
+          <a:lstStyle/>
+          <a:p>
+            <a:pPr>
+              <a:spcAft>
+                <a:spcPts val="600"/>
+              </a:spcAft>
+              <a:defRPr sz="2600">
+                <a:solidFill>
+                  <a:srgbClr val="DCE6EE"/>
+                </a:solidFill>
+              </a:defRPr>
+            </a:pPr>
+            <a:r>
+              <a:t>dataset spans july 19 – october 13 2023 with 37k hourly records</a:t>
+            </a:r>
+          </a:p>
+          <a:p/>
+          <a:p>
+            <a:pPr>
+              <a:spcAft>
+                <a:spcPts val="600"/>
+              </a:spcAft>
+              <a:defRPr sz="2600">
+                <a:solidFill>
+                  <a:srgbClr val="DCE6EE"/>
+                </a:solidFill>
+              </a:defRPr>
+            </a:pPr>
+            <a:r>
+              <a:t>targets include vwc at 6 18 30 inches plus irrigation totals and canopy weather channels</a:t>
+            </a:r>
+          </a:p>
+          <a:p/>
+        </p:txBody>
+      </p:sp>
+      <p:pic>
+        <p:nvPicPr>
+          <p:cNvPr id="4" name="Picture 3" descr="data_audit_card.png"/>
+          <p:cNvPicPr>
+            <a:picLocks noChangeAspect="1"/>
+          </p:cNvPicPr>
+          <p:nvPr/>
+        </p:nvPicPr>
+        <p:blipFill>
+          <a:blip r:embed="rId2"/>
+          <a:stretch>
+            <a:fillRect/>
+          </a:stretch>
+        </p:blipFill>
+        <p:spPr>
+          <a:xfrm>
+            <a:off x="4846320" y="1645920"/>
+            <a:ext cx="4297680" cy="2506980"/>
+          </a:xfrm>
+          <a:prstGeom prst="rect">
+            <a:avLst/>
+          </a:prstGeom>
+        </p:spPr>
+      </p:pic>
+    </p:spTree>
+  </p:cSld>
+  <p:clrMapOvr>
+    <a:masterClrMapping/>
+  </p:clrMapOvr>
+</p:sld>
+</file>
+
+<file path=ppt/slides/slide3.xml><?xml version="1.0" encoding="utf-8"?>
+<p:sld xmlns:a="http://schemas.openxmlformats.org/drawingml/2006/main" xmlns:p="http://schemas.openxmlformats.org/presentationml/2006/main" xmlns:r="http://schemas.openxmlformats.org/officeDocument/2006/relationships">
+  <p:cSld>
+    <p:bg>
+      <p:bgPr>
+        <a:solidFill>
+          <a:srgbClr val="0C1822"/>
+        </a:solidFill>
+        <a:effectLst/>
+      </p:bgPr>
+    </p:bg>
+    <p:spTree>
+      <p:nvGrpSpPr>
+        <p:cNvPr id="1" name=""/>
+        <p:cNvGrpSpPr/>
+        <p:nvPr/>
+      </p:nvGrpSpPr>
+      <p:grpSpPr/>
+      <p:sp>
+        <p:nvSpPr>
+          <p:cNvPr id="2" name="TextBox 1"/>
+          <p:cNvSpPr txBox="1"/>
+          <p:nvPr/>
+        </p:nvSpPr>
+        <p:spPr>
+          <a:xfrm>
+            <a:off x="548640" y="365760"/>
+            <a:ext cx="8412480" cy="1097280"/>
+          </a:xfrm>
+          <a:prstGeom prst="rect">
+            <a:avLst/>
+          </a:prstGeom>
+          <a:noFill/>
+        </p:spPr>
+        <p:txBody>
+          <a:bodyPr wrap="none">
+            <a:spAutoFit/>
+          </a:bodyPr>
+          <a:lstStyle/>
+          <a:p>
+            <a:pPr>
+              <a:defRPr sz="4000" b="1">
+                <a:solidFill>
+                  <a:srgbClr val="F5F8FC"/>
+                </a:solidFill>
+              </a:defRPr>
+            </a:pPr>
+            <a:r>
+              <a:t>raw feed shows duplicates and flatlines so we trim resample and interpolate before modeling...</a:t>
+            </a:r>
+          </a:p>
+        </p:txBody>
+      </p:sp>
+      <p:sp>
+        <p:nvSpPr>
+          <p:cNvPr id="3" name="TextBox 2"/>
+          <p:cNvSpPr txBox="1"/>
+          <p:nvPr/>
+        </p:nvSpPr>
+        <p:spPr>
+          <a:xfrm>
+            <a:off x="640080" y="1645920"/>
+            <a:ext cx="4114800" cy="4389120"/>
+          </a:xfrm>
+          <a:prstGeom prst="rect">
+            <a:avLst/>
+          </a:prstGeom>
+          <a:noFill/>
+        </p:spPr>
+        <p:txBody>
+          <a:bodyPr wrap="none">
+            <a:spAutoFit/>
+          </a:bodyPr>
+          <a:lstStyle/>
+          <a:p>
+            <a:pPr>
+              <a:spcAft>
+                <a:spcPts val="600"/>
+              </a:spcAft>
+              <a:defRPr sz="2600">
+                <a:solidFill>
+                  <a:srgbClr val="DCE6EE"/>
+                </a:solidFill>
+              </a:defRPr>
+            </a:pPr>
+            <a:r>
+              <a:t>audited extract contrasts raw hourlies with cleaned daily series ready for features</a:t>
+            </a:r>
+          </a:p>
+          <a:p/>
+        </p:txBody>
+      </p:sp>
+      <p:pic>
+        <p:nvPicPr>
+          <p:cNvPr id="4" name="Picture 3" descr="vwc_cleaning_highlight.png"/>
+          <p:cNvPicPr>
+            <a:picLocks noChangeAspect="1"/>
+          </p:cNvPicPr>
+          <p:nvPr/>
+        </p:nvPicPr>
+        <p:blipFill>
+          <a:blip r:embed="rId2"/>
+          <a:stretch>
+            <a:fillRect/>
+          </a:stretch>
+        </p:blipFill>
+        <p:spPr>
+          <a:xfrm>
+            <a:off x="4846320" y="1645920"/>
+            <a:ext cx="4297680" cy="2148840"/>
+          </a:xfrm>
+          <a:prstGeom prst="rect">
+            <a:avLst/>
+          </a:prstGeom>
+        </p:spPr>
+      </p:pic>
+    </p:spTree>
+  </p:cSld>
+  <p:clrMapOvr>
+    <a:masterClrMapping/>
+  </p:clrMapOvr>
+</p:sld>
+</file>
+
+<file path=ppt/slides/slide4.xml><?xml version="1.0" encoding="utf-8"?>
+<p:sld xmlns:a="http://schemas.openxmlformats.org/drawingml/2006/main" xmlns:p="http://schemas.openxmlformats.org/presentationml/2006/main" xmlns:r="http://schemas.openxmlformats.org/officeDocument/2006/relationships">
+  <p:cSld>
+    <p:bg>
+      <p:bgPr>
+        <a:solidFill>
+          <a:srgbClr val="0C1822"/>
+        </a:solidFill>
+        <a:effectLst/>
+      </p:bgPr>
+    </p:bg>
+    <p:spTree>
+      <p:nvGrpSpPr>
+        <p:cNvPr id="1" name=""/>
+        <p:cNvGrpSpPr/>
+        <p:nvPr/>
+      </p:nvGrpSpPr>
+      <p:grpSpPr/>
+      <p:sp>
+        <p:nvSpPr>
+          <p:cNvPr id="2" name="TextBox 1"/>
+          <p:cNvSpPr txBox="1"/>
+          <p:nvPr/>
+        </p:nvSpPr>
+        <p:spPr>
+          <a:xfrm>
+            <a:off x="548640" y="365760"/>
+            <a:ext cx="8412480" cy="1097280"/>
+          </a:xfrm>
+          <a:prstGeom prst="rect">
+            <a:avLst/>
+          </a:prstGeom>
+          <a:noFill/>
+        </p:spPr>
+        <p:txBody>
+          <a:bodyPr wrap="none">
+            <a:spAutoFit/>
+          </a:bodyPr>
+          <a:lstStyle/>
+          <a:p>
+            <a:pPr>
+              <a:defRPr sz="4000" b="1">
+                <a:solidFill>
+                  <a:srgbClr val="F5F8FC"/>
+                </a:solidFill>
+              </a:defRPr>
+            </a:pPr>
+            <a:r>
+              <a:t>savitzky golay smoothing on the daily curve keeps irrigation pulses while calming probe noise...</a:t>
+            </a:r>
+          </a:p>
+        </p:txBody>
+      </p:sp>
+      <p:sp>
+        <p:nvSpPr>
+          <p:cNvPr id="3" name="TextBox 2"/>
+          <p:cNvSpPr txBox="1"/>
+          <p:nvPr/>
+        </p:nvSpPr>
+        <p:spPr>
+          <a:xfrm>
+            <a:off x="731520" y="1645920"/>
+            <a:ext cx="7680960" cy="457200"/>
+          </a:xfrm>
+          <a:prstGeom prst="rect">
+            <a:avLst/>
+          </a:prstGeom>
+          <a:noFill/>
+        </p:spPr>
+        <p:txBody>
+          <a:bodyPr wrap="none">
+            <a:spAutoFit/>
+          </a:bodyPr>
+          <a:lstStyle/>
+          <a:p/>
+        </p:txBody>
+      </p:sp>
+      <p:pic>
+        <p:nvPicPr>
+          <p:cNvPr id="4" name="Picture 3" descr="eq_savgol.png"/>
+          <p:cNvPicPr>
+            <a:picLocks noChangeAspect="1"/>
+          </p:cNvPicPr>
+          <p:nvPr/>
+        </p:nvPicPr>
+        <p:blipFill>
+          <a:blip r:embed="rId2"/>
+          <a:stretch>
+            <a:fillRect/>
+          </a:stretch>
+        </p:blipFill>
+        <p:spPr>
+          <a:xfrm>
+            <a:off x="914400" y="1645920"/>
+            <a:ext cx="5486400" cy="2811780"/>
+          </a:xfrm>
+          <a:prstGeom prst="rect">
+            <a:avLst/>
+          </a:prstGeom>
+        </p:spPr>
+      </p:pic>
+    </p:spTree>
+  </p:cSld>
+  <p:clrMapOvr>
+    <a:masterClrMapping/>
+  </p:clrMapOvr>
+</p:sld>
+</file>
+
+<file path=ppt/slides/slide5.xml><?xml version="1.0" encoding="utf-8"?>
+<p:sld xmlns:a="http://schemas.openxmlformats.org/drawingml/2006/main" xmlns:p="http://schemas.openxmlformats.org/presentationml/2006/main" xmlns:r="http://schemas.openxmlformats.org/officeDocument/2006/relationships">
+  <p:cSld>
+    <p:bg>
+      <p:bgPr>
+        <a:solidFill>
+          <a:srgbClr val="0C1822"/>
+        </a:solidFill>
+        <a:effectLst/>
+      </p:bgPr>
+    </p:bg>
+    <p:spTree>
+      <p:nvGrpSpPr>
+        <p:cNvPr id="1" name=""/>
+        <p:cNvGrpSpPr/>
+        <p:nvPr/>
+      </p:nvGrpSpPr>
+      <p:grpSpPr/>
+      <p:sp>
+        <p:nvSpPr>
+          <p:cNvPr id="2" name="TextBox 1"/>
+          <p:cNvSpPr txBox="1"/>
+          <p:nvPr/>
+        </p:nvSpPr>
+        <p:spPr>
+          <a:xfrm>
+            <a:off x="548640" y="365760"/>
+            <a:ext cx="8412480" cy="1097280"/>
+          </a:xfrm>
+          <a:prstGeom prst="rect">
+            <a:avLst/>
+          </a:prstGeom>
+          <a:noFill/>
+        </p:spPr>
+        <p:txBody>
+          <a:bodyPr wrap="none">
+            <a:spAutoFit/>
+          </a:bodyPr>
+          <a:lstStyle/>
+          <a:p>
+            <a:pPr>
+              <a:defRPr sz="4000" b="1">
+                <a:solidFill>
+                  <a:srgbClr val="F5F8FC"/>
+                </a:solidFill>
+              </a:defRPr>
+            </a:pPr>
+            <a:r>
+              <a:t>derivative transform captures drying velocity so the model senses rate not absolute level...</a:t>
+            </a:r>
+          </a:p>
+        </p:txBody>
+      </p:sp>
+      <p:sp>
+        <p:nvSpPr>
+          <p:cNvPr id="3" name="TextBox 2"/>
+          <p:cNvSpPr txBox="1"/>
+          <p:nvPr/>
+        </p:nvSpPr>
+        <p:spPr>
+          <a:xfrm>
+            <a:off x="731520" y="1645920"/>
+            <a:ext cx="7680960" cy="457200"/>
+          </a:xfrm>
+          <a:prstGeom prst="rect">
+            <a:avLst/>
+          </a:prstGeom>
+          <a:noFill/>
+        </p:spPr>
+        <p:txBody>
+          <a:bodyPr wrap="none">
+            <a:spAutoFit/>
+          </a:bodyPr>
+          <a:lstStyle/>
+          <a:p/>
+        </p:txBody>
+      </p:sp>
+      <p:pic>
+        <p:nvPicPr>
+          <p:cNvPr id="4" name="Picture 3" descr="eq_derivative.png"/>
+          <p:cNvPicPr>
+            <a:picLocks noChangeAspect="1"/>
+          </p:cNvPicPr>
+          <p:nvPr/>
+        </p:nvPicPr>
+        <p:blipFill>
+          <a:blip r:embed="rId2"/>
+          <a:stretch>
+            <a:fillRect/>
+          </a:stretch>
+        </p:blipFill>
+        <p:spPr>
+          <a:xfrm>
+            <a:off x="914400" y="1645920"/>
+            <a:ext cx="5486400" cy="2811780"/>
+          </a:xfrm>
+          <a:prstGeom prst="rect">
+            <a:avLst/>
+          </a:prstGeom>
+        </p:spPr>
+      </p:pic>
+    </p:spTree>
+  </p:cSld>
+  <p:clrMapOvr>
+    <a:masterClrMapping/>
+  </p:clrMapOvr>
+</p:sld>
+</file>
+
+<file path=ppt/slides/slide6.xml><?xml version="1.0" encoding="utf-8"?>
+<p:sld xmlns:a="http://schemas.openxmlformats.org/drawingml/2006/main" xmlns:p="http://schemas.openxmlformats.org/presentationml/2006/main" xmlns:r="http://schemas.openxmlformats.org/officeDocument/2006/relationships">
+  <p:cSld>
+    <p:bg>
+      <p:bgPr>
+        <a:solidFill>
+          <a:srgbClr val="0C1822"/>
+        </a:solidFill>
+        <a:effectLst/>
+      </p:bgPr>
+    </p:bg>
+    <p:spTree>
+      <p:nvGrpSpPr>
+        <p:cNvPr id="1" name=""/>
+        <p:cNvGrpSpPr/>
+        <p:nvPr/>
+      </p:nvGrpSpPr>
+      <p:grpSpPr/>
+      <p:sp>
+        <p:nvSpPr>
+          <p:cNvPr id="2" name="TextBox 1"/>
+          <p:cNvSpPr txBox="1"/>
+          <p:nvPr/>
+        </p:nvSpPr>
+        <p:spPr>
+          <a:xfrm>
+            <a:off x="548640" y="365760"/>
+            <a:ext cx="8412480" cy="1097280"/>
+          </a:xfrm>
+          <a:prstGeom prst="rect">
+            <a:avLst/>
+          </a:prstGeom>
+          <a:noFill/>
+        </p:spPr>
+        <p:txBody>
+          <a:bodyPr wrap="none">
+            <a:spAutoFit/>
+          </a:bodyPr>
+          <a:lstStyle/>
+          <a:p>
+            <a:pPr>
+              <a:defRPr sz="4000" b="1">
+                <a:solidFill>
+                  <a:srgbClr val="F5F8FC"/>
+                </a:solidFill>
+              </a:defRPr>
+            </a:pPr>
+            <a:r>
+              <a:t>irrigation feature stack mirrors agronomist thinking about weekly water budget...</a:t>
+            </a:r>
+          </a:p>
+        </p:txBody>
+      </p:sp>
+      <p:sp>
+        <p:nvSpPr>
+          <p:cNvPr id="3" name="TextBox 2"/>
+          <p:cNvSpPr txBox="1"/>
+          <p:nvPr/>
+        </p:nvSpPr>
+        <p:spPr>
+          <a:xfrm>
+            <a:off x="640080" y="1645920"/>
+            <a:ext cx="4114800" cy="4389120"/>
+          </a:xfrm>
+          <a:prstGeom prst="rect">
+            <a:avLst/>
+          </a:prstGeom>
+          <a:noFill/>
+        </p:spPr>
+        <p:txBody>
+          <a:bodyPr wrap="none">
+            <a:spAutoFit/>
+          </a:bodyPr>
+          <a:lstStyle/>
+          <a:p>
+            <a:pPr>
+              <a:spcAft>
+                <a:spcPts val="600"/>
+              </a:spcAft>
+              <a:defRPr sz="2600">
+                <a:solidFill>
+                  <a:srgbClr val="DCE6EE"/>
+                </a:solidFill>
+              </a:defRPr>
+            </a:pPr>
+            <a:r>
+              <a:t>panel shows raw totals, log scaling, seven day sum, and actuator flag together</a:t>
+            </a:r>
+          </a:p>
+          <a:p/>
+        </p:txBody>
+      </p:sp>
+      <p:pic>
+        <p:nvPicPr>
+          <p:cNvPr id="4" name="Picture 3" descr="irrigation_feature_stack.png"/>
+          <p:cNvPicPr>
+            <a:picLocks noChangeAspect="1"/>
+          </p:cNvPicPr>
+          <p:nvPr/>
+        </p:nvPicPr>
+        <p:blipFill>
+          <a:blip r:embed="rId2"/>
+          <a:stretch>
+            <a:fillRect/>
+          </a:stretch>
+        </p:blipFill>
+        <p:spPr>
+          <a:xfrm>
+            <a:off x="4846320" y="1645920"/>
+            <a:ext cx="4297680" cy="3581400"/>
+          </a:xfrm>
+          <a:prstGeom prst="rect">
+            <a:avLst/>
+          </a:prstGeom>
+        </p:spPr>
+      </p:pic>
+    </p:spTree>
+  </p:cSld>
+  <p:clrMapOvr>
+    <a:masterClrMapping/>
+  </p:clrMapOvr>
+</p:sld>
+</file>
+
+<file path=ppt/slides/slide7.xml><?xml version="1.0" encoding="utf-8"?>
+<p:sld xmlns:a="http://schemas.openxmlformats.org/drawingml/2006/main" xmlns:p="http://schemas.openxmlformats.org/presentationml/2006/main" xmlns:r="http://schemas.openxmlformats.org/officeDocument/2006/relationships">
+  <p:cSld>
+    <p:bg>
+      <p:bgPr>
+        <a:solidFill>
+          <a:srgbClr val="0C1822"/>
+        </a:solidFill>
+        <a:effectLst/>
+      </p:bgPr>
+    </p:bg>
+    <p:spTree>
+      <p:nvGrpSpPr>
+        <p:cNvPr id="1" name=""/>
+        <p:cNvGrpSpPr/>
+        <p:nvPr/>
+      </p:nvGrpSpPr>
+      <p:grpSpPr/>
+      <p:sp>
+        <p:nvSpPr>
+          <p:cNvPr id="2" name="TextBox 1"/>
+          <p:cNvSpPr txBox="1"/>
+          <p:nvPr/>
+        </p:nvSpPr>
+        <p:spPr>
+          <a:xfrm>
+            <a:off x="548640" y="365760"/>
+            <a:ext cx="8412480" cy="1097280"/>
+          </a:xfrm>
+          <a:prstGeom prst="rect">
+            <a:avLst/>
+          </a:prstGeom>
+          <a:noFill/>
+        </p:spPr>
+        <p:txBody>
+          <a:bodyPr wrap="none">
+            <a:spAutoFit/>
+          </a:bodyPr>
+          <a:lstStyle/>
+          <a:p>
+            <a:pPr>
+              <a:defRPr sz="4000" b="1">
+                <a:solidFill>
+                  <a:srgbClr val="F5F8FC"/>
+                </a:solidFill>
+              </a:defRPr>
+            </a:pPr>
+            <a:r>
+              <a:t>log sum and time since equations document the rare event signals feeding the network...</a:t>
+            </a:r>
+          </a:p>
+        </p:txBody>
+      </p:sp>
+      <p:sp>
+        <p:nvSpPr>
+          <p:cNvPr id="3" name="TextBox 2"/>
+          <p:cNvSpPr txBox="1"/>
+          <p:nvPr/>
+        </p:nvSpPr>
+        <p:spPr>
+          <a:xfrm>
+            <a:off x="731520" y="1645920"/>
+            <a:ext cx="7680960" cy="457200"/>
+          </a:xfrm>
+          <a:prstGeom prst="rect">
+            <a:avLst/>
+          </a:prstGeom>
+          <a:noFill/>
+        </p:spPr>
+        <p:txBody>
+          <a:bodyPr wrap="none">
+            <a:spAutoFit/>
+          </a:bodyPr>
+          <a:lstStyle/>
+          <a:p/>
+        </p:txBody>
+      </p:sp>
+      <p:pic>
+        <p:nvPicPr>
+          <p:cNvPr id="4" name="Picture 3" descr="eq_irrigation.png"/>
+          <p:cNvPicPr>
+            <a:picLocks noChangeAspect="1"/>
+          </p:cNvPicPr>
+          <p:nvPr/>
+        </p:nvPicPr>
+        <p:blipFill>
+          <a:blip r:embed="rId2"/>
+          <a:stretch>
+            <a:fillRect/>
+          </a:stretch>
+        </p:blipFill>
+        <p:spPr>
+          <a:xfrm>
+            <a:off x="914400" y="1645920"/>
+            <a:ext cx="6400800" cy="3348004"/>
+          </a:xfrm>
+          <a:prstGeom prst="rect">
+            <a:avLst/>
+          </a:prstGeom>
+        </p:spPr>
+      </p:pic>
+    </p:spTree>
+  </p:cSld>
+  <p:clrMapOvr>
+    <a:masterClrMapping/>
+  </p:clrMapOvr>
+</p:sld>
+</file>
+
+<file path=ppt/slides/slide8.xml><?xml version="1.0" encoding="utf-8"?>
+<p:sld xmlns:a="http://schemas.openxmlformats.org/drawingml/2006/main" xmlns:p="http://schemas.openxmlformats.org/presentationml/2006/main" xmlns:r="http://schemas.openxmlformats.org/officeDocument/2006/relationships">
+  <p:cSld>
+    <p:bg>
+      <p:bgPr>
+        <a:solidFill>
+          <a:srgbClr val="0C1822"/>
+        </a:solidFill>
+        <a:effectLst/>
+      </p:bgPr>
+    </p:bg>
+    <p:spTree>
+      <p:nvGrpSpPr>
+        <p:cNvPr id="1" name=""/>
+        <p:cNvGrpSpPr/>
+        <p:nvPr/>
+      </p:nvGrpSpPr>
+      <p:grpSpPr/>
+      <p:sp>
+        <p:nvSpPr>
+          <p:cNvPr id="2" name="TextBox 1"/>
+          <p:cNvSpPr txBox="1"/>
+          <p:nvPr/>
+        </p:nvSpPr>
+        <p:spPr>
+          <a:xfrm>
+            <a:off x="548640" y="365760"/>
+            <a:ext cx="8412480" cy="1097280"/>
+          </a:xfrm>
+          <a:prstGeom prst="rect">
+            <a:avLst/>
+          </a:prstGeom>
+          <a:noFill/>
+        </p:spPr>
+        <p:txBody>
+          <a:bodyPr wrap="none">
+            <a:spAutoFit/>
+          </a:bodyPr>
+          <a:lstStyle/>
+          <a:p>
+            <a:pPr>
+              <a:defRPr sz="4000" b="1">
+                <a:solidFill>
+                  <a:srgbClr val="F5F8FC"/>
+                </a:solidFill>
+              </a:defRPr>
+            </a:pPr>
+            <a:r>
+              <a:t>feature buffet slide calls out what stayed and what was documented for removal...</a:t>
+            </a:r>
+          </a:p>
+        </p:txBody>
+      </p:sp>
+      <p:sp>
+        <p:nvSpPr>
+          <p:cNvPr id="3" name="TextBox 2"/>
+          <p:cNvSpPr txBox="1"/>
+          <p:nvPr/>
+        </p:nvSpPr>
+        <p:spPr>
+          <a:xfrm>
+            <a:off x="640080" y="1645920"/>
+            <a:ext cx="4114800" cy="4389120"/>
+          </a:xfrm>
+          <a:prstGeom prst="rect">
+            <a:avLst/>
+          </a:prstGeom>
+          <a:noFill/>
+        </p:spPr>
+        <p:txBody>
+          <a:bodyPr wrap="none">
+            <a:spAutoFit/>
+          </a:bodyPr>
+          <a:lstStyle/>
+          <a:p>
+            <a:pPr>
+              <a:spcAft>
+                <a:spcPts val="600"/>
+              </a:spcAft>
+              <a:defRPr sz="2600">
+                <a:solidFill>
+                  <a:srgbClr val="DCE6EE"/>
+                </a:solidFill>
+              </a:defRPr>
+            </a:pPr>
+            <a:r>
+              <a:t>kept buckets: soil layers, temporal encoding, weather load, irrigation context</a:t>
+            </a:r>
+          </a:p>
+          <a:p/>
+          <a:p>
+            <a:pPr>
+              <a:spcAft>
+                <a:spcPts val="600"/>
+              </a:spcAft>
+              <a:defRPr sz="2600">
+                <a:solidFill>
+                  <a:srgbClr val="DCE6EE"/>
+                </a:solidFill>
+              </a:defRPr>
+            </a:pPr>
+            <a:r>
+              <a:t>documented cuts: 42 inch probe flatlines, sparse crop metadata, redundant stress metrics</a:t>
+            </a:r>
+          </a:p>
+          <a:p/>
+        </p:txBody>
+      </p:sp>
+      <p:pic>
+        <p:nvPicPr>
+          <p:cNvPr id="4" name="Picture 3" descr="feature_story.png"/>
+          <p:cNvPicPr>
+            <a:picLocks noChangeAspect="1"/>
+          </p:cNvPicPr>
+          <p:nvPr/>
+        </p:nvPicPr>
+        <p:blipFill>
+          <a:blip r:embed="rId2"/>
+          <a:stretch>
+            <a:fillRect/>
+          </a:stretch>
+        </p:blipFill>
+        <p:spPr>
+          <a:xfrm>
+            <a:off x="4846320" y="1645920"/>
+            <a:ext cx="4297680" cy="2506980"/>
+          </a:xfrm>
+          <a:prstGeom prst="rect">
+            <a:avLst/>
+          </a:prstGeom>
+        </p:spPr>
+      </p:pic>
+    </p:spTree>
+  </p:cSld>
+  <p:clrMapOvr>
+    <a:masterClrMapping/>
+  </p:clrMapOvr>
+</p:sld>
+</file>
+
+<file path=ppt/slides/slide9.xml><?xml version="1.0" encoding="utf-8"?>
+<p:sld xmlns:a="http://schemas.openxmlformats.org/drawingml/2006/main" xmlns:p="http://schemas.openxmlformats.org/presentationml/2006/main" xmlns:r="http://schemas.openxmlformats.org/officeDocument/2006/relationships">
+  <p:cSld>
+    <p:bg>
+      <p:bgPr>
+        <a:solidFill>
+          <a:srgbClr val="0C1822"/>
+        </a:solidFill>
+        <a:effectLst/>
+      </p:bgPr>
+    </p:bg>
+    <p:spTree>
+      <p:nvGrpSpPr>
+        <p:cNvPr id="1" name=""/>
+        <p:cNvGrpSpPr/>
+        <p:nvPr/>
+      </p:nvGrpSpPr>
+      <p:grpSpPr/>
+      <p:sp>
+        <p:nvSpPr>
+          <p:cNvPr id="2" name="TextBox 1"/>
+          <p:cNvSpPr txBox="1"/>
+          <p:nvPr/>
+        </p:nvSpPr>
+        <p:spPr>
+          <a:xfrm>
+            <a:off x="548640" y="365760"/>
+            <a:ext cx="8412480" cy="1097280"/>
+          </a:xfrm>
+          <a:prstGeom prst="rect">
+            <a:avLst/>
+          </a:prstGeom>
+          <a:noFill/>
+        </p:spPr>
+        <p:txBody>
+          <a:bodyPr wrap="none">
+            <a:spAutoFit/>
+          </a:bodyPr>
+          <a:lstStyle/>
+          <a:p>
+            <a:pPr>
+              <a:defRPr sz="4000" b="1">
+                <a:solidFill>
+                  <a:srgbClr val="F5F8FC"/>
+                </a:solidFill>
+              </a:defRPr>
+            </a:pPr>
+            <a:r>
+              <a:t>sliding window diagram shows the seven day input feeding a four day forecast horizon...</a:t>
+            </a:r>
+          </a:p>
+        </p:txBody>
+      </p:sp>
+      <p:sp>
+        <p:nvSpPr>
+          <p:cNvPr id="3" name="TextBox 2"/>
+          <p:cNvSpPr txBox="1"/>
+          <p:nvPr/>
+        </p:nvSpPr>
+        <p:spPr>
+          <a:xfrm>
+            <a:off x="640080" y="1645920"/>
+            <a:ext cx="4114800" cy="4389120"/>
+          </a:xfrm>
+          <a:prstGeom prst="rect">
+            <a:avLst/>
+          </a:prstGeom>
+          <a:noFill/>
+        </p:spPr>
+        <p:txBody>
+          <a:bodyPr wrap="none">
+            <a:spAutoFit/>
+          </a:bodyPr>
+          <a:lstStyle/>
+          <a:p>
+            <a:pPr>
+              <a:spcAft>
+                <a:spcPts val="600"/>
+              </a:spcAft>
+              <a:defRPr sz="2600">
+                <a:solidFill>
+                  <a:srgbClr val="DCE6EE"/>
+                </a:solidFill>
+              </a:defRPr>
+            </a:pPr>
+            <a:r>
+              <a:t>diagram explains 168 hourly inputs rolling into 96 hour predictions</a:t>
+            </a:r>
+          </a:p>
+          <a:p/>
+        </p:txBody>
+      </p:sp>
+      <p:pic>
+        <p:nvPicPr>
+          <p:cNvPr id="4" name="Picture 3" descr="sliding_window_diagram.png"/>
+          <p:cNvPicPr>
+            <a:picLocks noChangeAspect="1"/>
+          </p:cNvPicPr>
+          <p:nvPr/>
+        </p:nvPicPr>
+        <p:blipFill>
+          <a:blip r:embed="rId2"/>
+          <a:stretch>
+            <a:fillRect/>
+          </a:stretch>
+        </p:blipFill>
+        <p:spPr>
+          <a:xfrm>
+            <a:off x="4846320" y="1645920"/>
+            <a:ext cx="4297680" cy="2148840"/>
+          </a:xfrm>
+          <a:prstGeom prst="rect">
+            <a:avLst/>
+          </a:prstGeom>
+        </p:spPr>
+      </p:pic>
+    </p:spTree>
+  </p:cSld>
+  <p:clrMapOvr>
+    <a:masterClrMapping/>
+  </p:clrMapOvr>
+</p:sld>
 </file>
 
 <file path=ppt/theme/theme1.xml><?xml version="1.0" encoding="utf-8"?>

</xml_diff>